<commit_message>
fixing figures and tables.
</commit_message>
<xml_diff>
--- a/editing_images/PICO_CAD_annotated.pptx
+++ b/editing_images/PICO_CAD_annotated.pptx
@@ -111,7 +111,7 @@
   </p:defaultTextStyle>
   <p:extLst>
     <p:ext uri="{EFAFB233-063F-42B5-8137-9DF3F51BA10A}">
-      <p15:sldGuideLst xmlns="" xmlns:p15="http://schemas.microsoft.com/office/powerpoint/2012/main"/>
+      <p15:sldGuideLst xmlns:p15="http://schemas.microsoft.com/office/powerpoint/2012/main" xmlns=""/>
     </p:ext>
   </p:extLst>
 </p:presentation>
@@ -199,7 +199,7 @@
           <a:p>
             <a:fld id="{15E540B6-5492-5F45-8A4D-C94C54089F3B}" type="datetimeFigureOut">
               <a:rPr lang="en-US" smtClean="0"/>
-              <a:t>5/10/2018</a:t>
+              <a:t>5/17/2018</a:t>
             </a:fld>
             <a:endParaRPr lang="en-US"/>
           </a:p>
@@ -578,7 +578,7 @@
           <p:cNvPr id="2" name="Title 1">
             <a:extLst>
               <a:ext uri="{FF2B5EF4-FFF2-40B4-BE49-F238E27FC236}">
-                <a16:creationId xmlns="" xmlns:a16="http://schemas.microsoft.com/office/drawing/2014/main" id="{7D26DE11-C2D0-A04D-AAA5-352E1CD3A5DF}"/>
+                <a16:creationId xmlns:a16="http://schemas.microsoft.com/office/drawing/2014/main" xmlns="" id="{7D26DE11-C2D0-A04D-AAA5-352E1CD3A5DF}"/>
               </a:ext>
             </a:extLst>
           </p:cNvPr>
@@ -615,7 +615,7 @@
           <p:cNvPr id="3" name="Subtitle 2">
             <a:extLst>
               <a:ext uri="{FF2B5EF4-FFF2-40B4-BE49-F238E27FC236}">
-                <a16:creationId xmlns="" xmlns:a16="http://schemas.microsoft.com/office/drawing/2014/main" id="{F98D45B8-F61C-4349-8A30-0459531132B0}"/>
+                <a16:creationId xmlns:a16="http://schemas.microsoft.com/office/drawing/2014/main" xmlns="" id="{F98D45B8-F61C-4349-8A30-0459531132B0}"/>
               </a:ext>
             </a:extLst>
           </p:cNvPr>
@@ -685,7 +685,7 @@
           <p:cNvPr id="4" name="Date Placeholder 3">
             <a:extLst>
               <a:ext uri="{FF2B5EF4-FFF2-40B4-BE49-F238E27FC236}">
-                <a16:creationId xmlns="" xmlns:a16="http://schemas.microsoft.com/office/drawing/2014/main" id="{E9EBFB5D-0D36-EC44-B943-38537D237438}"/>
+                <a16:creationId xmlns:a16="http://schemas.microsoft.com/office/drawing/2014/main" xmlns="" id="{E9EBFB5D-0D36-EC44-B943-38537D237438}"/>
               </a:ext>
             </a:extLst>
           </p:cNvPr>
@@ -703,7 +703,7 @@
           <a:p>
             <a:fld id="{78B47234-53AC-8043-A516-617C886D296F}" type="datetimeFigureOut">
               <a:rPr lang="en-US" smtClean="0"/>
-              <a:t>5/10/2018</a:t>
+              <a:t>5/17/2018</a:t>
             </a:fld>
             <a:endParaRPr lang="en-US"/>
           </a:p>
@@ -714,7 +714,7 @@
           <p:cNvPr id="5" name="Footer Placeholder 4">
             <a:extLst>
               <a:ext uri="{FF2B5EF4-FFF2-40B4-BE49-F238E27FC236}">
-                <a16:creationId xmlns="" xmlns:a16="http://schemas.microsoft.com/office/drawing/2014/main" id="{7002E74C-A8AE-A048-9D29-50D6F4D9FC35}"/>
+                <a16:creationId xmlns:a16="http://schemas.microsoft.com/office/drawing/2014/main" xmlns="" id="{7002E74C-A8AE-A048-9D29-50D6F4D9FC35}"/>
               </a:ext>
             </a:extLst>
           </p:cNvPr>
@@ -739,7 +739,7 @@
           <p:cNvPr id="6" name="Slide Number Placeholder 5">
             <a:extLst>
               <a:ext uri="{FF2B5EF4-FFF2-40B4-BE49-F238E27FC236}">
-                <a16:creationId xmlns="" xmlns:a16="http://schemas.microsoft.com/office/drawing/2014/main" id="{7E84B2E6-2754-594B-AD4C-D84140FE4CCF}"/>
+                <a16:creationId xmlns:a16="http://schemas.microsoft.com/office/drawing/2014/main" xmlns="" id="{7E84B2E6-2754-594B-AD4C-D84140FE4CCF}"/>
               </a:ext>
             </a:extLst>
           </p:cNvPr>
@@ -798,7 +798,7 @@
           <p:cNvPr id="2" name="Title 1">
             <a:extLst>
               <a:ext uri="{FF2B5EF4-FFF2-40B4-BE49-F238E27FC236}">
-                <a16:creationId xmlns="" xmlns:a16="http://schemas.microsoft.com/office/drawing/2014/main" id="{DDB358CB-6BB5-D045-9867-D8C1F8C298A8}"/>
+                <a16:creationId xmlns:a16="http://schemas.microsoft.com/office/drawing/2014/main" xmlns="" id="{DDB358CB-6BB5-D045-9867-D8C1F8C298A8}"/>
               </a:ext>
             </a:extLst>
           </p:cNvPr>
@@ -826,7 +826,7 @@
           <p:cNvPr id="3" name="Vertical Text Placeholder 2">
             <a:extLst>
               <a:ext uri="{FF2B5EF4-FFF2-40B4-BE49-F238E27FC236}">
-                <a16:creationId xmlns="" xmlns:a16="http://schemas.microsoft.com/office/drawing/2014/main" id="{F287ED2E-22D9-2342-839E-400CEEFA5E40}"/>
+                <a16:creationId xmlns:a16="http://schemas.microsoft.com/office/drawing/2014/main" xmlns="" id="{F287ED2E-22D9-2342-839E-400CEEFA5E40}"/>
               </a:ext>
             </a:extLst>
           </p:cNvPr>
@@ -883,7 +883,7 @@
           <p:cNvPr id="4" name="Date Placeholder 3">
             <a:extLst>
               <a:ext uri="{FF2B5EF4-FFF2-40B4-BE49-F238E27FC236}">
-                <a16:creationId xmlns="" xmlns:a16="http://schemas.microsoft.com/office/drawing/2014/main" id="{1102A507-34CB-5D4C-90AD-DD1C5A77CA5B}"/>
+                <a16:creationId xmlns:a16="http://schemas.microsoft.com/office/drawing/2014/main" xmlns="" id="{1102A507-34CB-5D4C-90AD-DD1C5A77CA5B}"/>
               </a:ext>
             </a:extLst>
           </p:cNvPr>
@@ -901,7 +901,7 @@
           <a:p>
             <a:fld id="{78B47234-53AC-8043-A516-617C886D296F}" type="datetimeFigureOut">
               <a:rPr lang="en-US" smtClean="0"/>
-              <a:t>5/10/2018</a:t>
+              <a:t>5/17/2018</a:t>
             </a:fld>
             <a:endParaRPr lang="en-US"/>
           </a:p>
@@ -912,7 +912,7 @@
           <p:cNvPr id="5" name="Footer Placeholder 4">
             <a:extLst>
               <a:ext uri="{FF2B5EF4-FFF2-40B4-BE49-F238E27FC236}">
-                <a16:creationId xmlns="" xmlns:a16="http://schemas.microsoft.com/office/drawing/2014/main" id="{6432A15C-7EE9-D94C-AD78-2FDA2DC9941D}"/>
+                <a16:creationId xmlns:a16="http://schemas.microsoft.com/office/drawing/2014/main" xmlns="" id="{6432A15C-7EE9-D94C-AD78-2FDA2DC9941D}"/>
               </a:ext>
             </a:extLst>
           </p:cNvPr>
@@ -937,7 +937,7 @@
           <p:cNvPr id="6" name="Slide Number Placeholder 5">
             <a:extLst>
               <a:ext uri="{FF2B5EF4-FFF2-40B4-BE49-F238E27FC236}">
-                <a16:creationId xmlns="" xmlns:a16="http://schemas.microsoft.com/office/drawing/2014/main" id="{99B6AF9E-504B-D043-97E6-6F7247C09234}"/>
+                <a16:creationId xmlns:a16="http://schemas.microsoft.com/office/drawing/2014/main" xmlns="" id="{99B6AF9E-504B-D043-97E6-6F7247C09234}"/>
               </a:ext>
             </a:extLst>
           </p:cNvPr>
@@ -996,7 +996,7 @@
           <p:cNvPr id="2" name="Vertical Title 1">
             <a:extLst>
               <a:ext uri="{FF2B5EF4-FFF2-40B4-BE49-F238E27FC236}">
-                <a16:creationId xmlns="" xmlns:a16="http://schemas.microsoft.com/office/drawing/2014/main" id="{04087C88-5CFE-514D-87A9-9352D53E3810}"/>
+                <a16:creationId xmlns:a16="http://schemas.microsoft.com/office/drawing/2014/main" xmlns="" id="{04087C88-5CFE-514D-87A9-9352D53E3810}"/>
               </a:ext>
             </a:extLst>
           </p:cNvPr>
@@ -1029,7 +1029,7 @@
           <p:cNvPr id="3" name="Vertical Text Placeholder 2">
             <a:extLst>
               <a:ext uri="{FF2B5EF4-FFF2-40B4-BE49-F238E27FC236}">
-                <a16:creationId xmlns="" xmlns:a16="http://schemas.microsoft.com/office/drawing/2014/main" id="{D9658494-9713-F545-AA57-A055A6FFF5A2}"/>
+                <a16:creationId xmlns:a16="http://schemas.microsoft.com/office/drawing/2014/main" xmlns="" id="{D9658494-9713-F545-AA57-A055A6FFF5A2}"/>
               </a:ext>
             </a:extLst>
           </p:cNvPr>
@@ -1091,7 +1091,7 @@
           <p:cNvPr id="4" name="Date Placeholder 3">
             <a:extLst>
               <a:ext uri="{FF2B5EF4-FFF2-40B4-BE49-F238E27FC236}">
-                <a16:creationId xmlns="" xmlns:a16="http://schemas.microsoft.com/office/drawing/2014/main" id="{22EA964D-F634-E444-82F7-49D55FF0EFFB}"/>
+                <a16:creationId xmlns:a16="http://schemas.microsoft.com/office/drawing/2014/main" xmlns="" id="{22EA964D-F634-E444-82F7-49D55FF0EFFB}"/>
               </a:ext>
             </a:extLst>
           </p:cNvPr>
@@ -1109,7 +1109,7 @@
           <a:p>
             <a:fld id="{78B47234-53AC-8043-A516-617C886D296F}" type="datetimeFigureOut">
               <a:rPr lang="en-US" smtClean="0"/>
-              <a:t>5/10/2018</a:t>
+              <a:t>5/17/2018</a:t>
             </a:fld>
             <a:endParaRPr lang="en-US"/>
           </a:p>
@@ -1120,7 +1120,7 @@
           <p:cNvPr id="5" name="Footer Placeholder 4">
             <a:extLst>
               <a:ext uri="{FF2B5EF4-FFF2-40B4-BE49-F238E27FC236}">
-                <a16:creationId xmlns="" xmlns:a16="http://schemas.microsoft.com/office/drawing/2014/main" id="{BB75E0F3-ECBD-5F41-B349-40597982E274}"/>
+                <a16:creationId xmlns:a16="http://schemas.microsoft.com/office/drawing/2014/main" xmlns="" id="{BB75E0F3-ECBD-5F41-B349-40597982E274}"/>
               </a:ext>
             </a:extLst>
           </p:cNvPr>
@@ -1145,7 +1145,7 @@
           <p:cNvPr id="6" name="Slide Number Placeholder 5">
             <a:extLst>
               <a:ext uri="{FF2B5EF4-FFF2-40B4-BE49-F238E27FC236}">
-                <a16:creationId xmlns="" xmlns:a16="http://schemas.microsoft.com/office/drawing/2014/main" id="{0DF2161A-FD23-F846-BCD1-A610E2003671}"/>
+                <a16:creationId xmlns:a16="http://schemas.microsoft.com/office/drawing/2014/main" xmlns="" id="{0DF2161A-FD23-F846-BCD1-A610E2003671}"/>
               </a:ext>
             </a:extLst>
           </p:cNvPr>
@@ -1488,7 +1488,7 @@
           <p:cNvPr id="2" name="Title 1">
             <a:extLst>
               <a:ext uri="{FF2B5EF4-FFF2-40B4-BE49-F238E27FC236}">
-                <a16:creationId xmlns="" xmlns:a16="http://schemas.microsoft.com/office/drawing/2014/main" id="{72223BF0-B6D5-FC40-A508-79C964192ADF}"/>
+                <a16:creationId xmlns:a16="http://schemas.microsoft.com/office/drawing/2014/main" xmlns="" id="{72223BF0-B6D5-FC40-A508-79C964192ADF}"/>
               </a:ext>
             </a:extLst>
           </p:cNvPr>
@@ -1516,7 +1516,7 @@
           <p:cNvPr id="3" name="Content Placeholder 2">
             <a:extLst>
               <a:ext uri="{FF2B5EF4-FFF2-40B4-BE49-F238E27FC236}">
-                <a16:creationId xmlns="" xmlns:a16="http://schemas.microsoft.com/office/drawing/2014/main" id="{E04DEF9F-3D52-EA42-A251-6BBC68CA2840}"/>
+                <a16:creationId xmlns:a16="http://schemas.microsoft.com/office/drawing/2014/main" xmlns="" id="{E04DEF9F-3D52-EA42-A251-6BBC68CA2840}"/>
               </a:ext>
             </a:extLst>
           </p:cNvPr>
@@ -1573,7 +1573,7 @@
           <p:cNvPr id="4" name="Date Placeholder 3">
             <a:extLst>
               <a:ext uri="{FF2B5EF4-FFF2-40B4-BE49-F238E27FC236}">
-                <a16:creationId xmlns="" xmlns:a16="http://schemas.microsoft.com/office/drawing/2014/main" id="{8CCF364C-9E01-AC4B-8956-A3CA7F933DC5}"/>
+                <a16:creationId xmlns:a16="http://schemas.microsoft.com/office/drawing/2014/main" xmlns="" id="{8CCF364C-9E01-AC4B-8956-A3CA7F933DC5}"/>
               </a:ext>
             </a:extLst>
           </p:cNvPr>
@@ -1591,7 +1591,7 @@
           <a:p>
             <a:fld id="{78B47234-53AC-8043-A516-617C886D296F}" type="datetimeFigureOut">
               <a:rPr lang="en-US" smtClean="0"/>
-              <a:t>5/10/2018</a:t>
+              <a:t>5/17/2018</a:t>
             </a:fld>
             <a:endParaRPr lang="en-US"/>
           </a:p>
@@ -1602,7 +1602,7 @@
           <p:cNvPr id="5" name="Footer Placeholder 4">
             <a:extLst>
               <a:ext uri="{FF2B5EF4-FFF2-40B4-BE49-F238E27FC236}">
-                <a16:creationId xmlns="" xmlns:a16="http://schemas.microsoft.com/office/drawing/2014/main" id="{F9491D2F-6667-2045-B0E3-3B59533F60B8}"/>
+                <a16:creationId xmlns:a16="http://schemas.microsoft.com/office/drawing/2014/main" xmlns="" id="{F9491D2F-6667-2045-B0E3-3B59533F60B8}"/>
               </a:ext>
             </a:extLst>
           </p:cNvPr>
@@ -1627,7 +1627,7 @@
           <p:cNvPr id="6" name="Slide Number Placeholder 5">
             <a:extLst>
               <a:ext uri="{FF2B5EF4-FFF2-40B4-BE49-F238E27FC236}">
-                <a16:creationId xmlns="" xmlns:a16="http://schemas.microsoft.com/office/drawing/2014/main" id="{09C9B69E-23BA-C249-810D-D2E9E59ED31A}"/>
+                <a16:creationId xmlns:a16="http://schemas.microsoft.com/office/drawing/2014/main" xmlns="" id="{09C9B69E-23BA-C249-810D-D2E9E59ED31A}"/>
               </a:ext>
             </a:extLst>
           </p:cNvPr>
@@ -1686,7 +1686,7 @@
           <p:cNvPr id="2" name="Title 1">
             <a:extLst>
               <a:ext uri="{FF2B5EF4-FFF2-40B4-BE49-F238E27FC236}">
-                <a16:creationId xmlns="" xmlns:a16="http://schemas.microsoft.com/office/drawing/2014/main" id="{5B8B828C-D880-F249-BE16-570D9024F9B0}"/>
+                <a16:creationId xmlns:a16="http://schemas.microsoft.com/office/drawing/2014/main" xmlns="" id="{5B8B828C-D880-F249-BE16-570D9024F9B0}"/>
               </a:ext>
             </a:extLst>
           </p:cNvPr>
@@ -1723,7 +1723,7 @@
           <p:cNvPr id="3" name="Text Placeholder 2">
             <a:extLst>
               <a:ext uri="{FF2B5EF4-FFF2-40B4-BE49-F238E27FC236}">
-                <a16:creationId xmlns="" xmlns:a16="http://schemas.microsoft.com/office/drawing/2014/main" id="{4C7D967E-A3BC-704C-8BE0-47E50CF4A6D1}"/>
+                <a16:creationId xmlns:a16="http://schemas.microsoft.com/office/drawing/2014/main" xmlns="" id="{4C7D967E-A3BC-704C-8BE0-47E50CF4A6D1}"/>
               </a:ext>
             </a:extLst>
           </p:cNvPr>
@@ -1848,7 +1848,7 @@
           <p:cNvPr id="4" name="Date Placeholder 3">
             <a:extLst>
               <a:ext uri="{FF2B5EF4-FFF2-40B4-BE49-F238E27FC236}">
-                <a16:creationId xmlns="" xmlns:a16="http://schemas.microsoft.com/office/drawing/2014/main" id="{9CD24214-1CEB-924E-BA0F-678FDDC63234}"/>
+                <a16:creationId xmlns:a16="http://schemas.microsoft.com/office/drawing/2014/main" xmlns="" id="{9CD24214-1CEB-924E-BA0F-678FDDC63234}"/>
               </a:ext>
             </a:extLst>
           </p:cNvPr>
@@ -1866,7 +1866,7 @@
           <a:p>
             <a:fld id="{78B47234-53AC-8043-A516-617C886D296F}" type="datetimeFigureOut">
               <a:rPr lang="en-US" smtClean="0"/>
-              <a:t>5/10/2018</a:t>
+              <a:t>5/17/2018</a:t>
             </a:fld>
             <a:endParaRPr lang="en-US"/>
           </a:p>
@@ -1877,7 +1877,7 @@
           <p:cNvPr id="5" name="Footer Placeholder 4">
             <a:extLst>
               <a:ext uri="{FF2B5EF4-FFF2-40B4-BE49-F238E27FC236}">
-                <a16:creationId xmlns="" xmlns:a16="http://schemas.microsoft.com/office/drawing/2014/main" id="{9C51C64C-C860-6642-B490-152F1A5D2DBB}"/>
+                <a16:creationId xmlns:a16="http://schemas.microsoft.com/office/drawing/2014/main" xmlns="" id="{9C51C64C-C860-6642-B490-152F1A5D2DBB}"/>
               </a:ext>
             </a:extLst>
           </p:cNvPr>
@@ -1902,7 +1902,7 @@
           <p:cNvPr id="6" name="Slide Number Placeholder 5">
             <a:extLst>
               <a:ext uri="{FF2B5EF4-FFF2-40B4-BE49-F238E27FC236}">
-                <a16:creationId xmlns="" xmlns:a16="http://schemas.microsoft.com/office/drawing/2014/main" id="{9D8E4ACB-F6AA-8D4F-827E-ED0A9BA97A20}"/>
+                <a16:creationId xmlns:a16="http://schemas.microsoft.com/office/drawing/2014/main" xmlns="" id="{9D8E4ACB-F6AA-8D4F-827E-ED0A9BA97A20}"/>
               </a:ext>
             </a:extLst>
           </p:cNvPr>
@@ -1961,7 +1961,7 @@
           <p:cNvPr id="2" name="Title 1">
             <a:extLst>
               <a:ext uri="{FF2B5EF4-FFF2-40B4-BE49-F238E27FC236}">
-                <a16:creationId xmlns="" xmlns:a16="http://schemas.microsoft.com/office/drawing/2014/main" id="{A04E8F34-342F-B24F-9215-4B63484C289F}"/>
+                <a16:creationId xmlns:a16="http://schemas.microsoft.com/office/drawing/2014/main" xmlns="" id="{A04E8F34-342F-B24F-9215-4B63484C289F}"/>
               </a:ext>
             </a:extLst>
           </p:cNvPr>
@@ -1989,7 +1989,7 @@
           <p:cNvPr id="3" name="Content Placeholder 2">
             <a:extLst>
               <a:ext uri="{FF2B5EF4-FFF2-40B4-BE49-F238E27FC236}">
-                <a16:creationId xmlns="" xmlns:a16="http://schemas.microsoft.com/office/drawing/2014/main" id="{211DE7C9-B278-8243-B037-39F354F55D5B}"/>
+                <a16:creationId xmlns:a16="http://schemas.microsoft.com/office/drawing/2014/main" xmlns="" id="{211DE7C9-B278-8243-B037-39F354F55D5B}"/>
               </a:ext>
             </a:extLst>
           </p:cNvPr>
@@ -2051,7 +2051,7 @@
           <p:cNvPr id="4" name="Content Placeholder 3">
             <a:extLst>
               <a:ext uri="{FF2B5EF4-FFF2-40B4-BE49-F238E27FC236}">
-                <a16:creationId xmlns="" xmlns:a16="http://schemas.microsoft.com/office/drawing/2014/main" id="{37612CA0-CF97-034C-BDBC-05D6E5D06ED7}"/>
+                <a16:creationId xmlns:a16="http://schemas.microsoft.com/office/drawing/2014/main" xmlns="" id="{37612CA0-CF97-034C-BDBC-05D6E5D06ED7}"/>
               </a:ext>
             </a:extLst>
           </p:cNvPr>
@@ -2113,7 +2113,7 @@
           <p:cNvPr id="5" name="Date Placeholder 4">
             <a:extLst>
               <a:ext uri="{FF2B5EF4-FFF2-40B4-BE49-F238E27FC236}">
-                <a16:creationId xmlns="" xmlns:a16="http://schemas.microsoft.com/office/drawing/2014/main" id="{C7CC72AB-88BC-9440-A593-C5B2FD5D3089}"/>
+                <a16:creationId xmlns:a16="http://schemas.microsoft.com/office/drawing/2014/main" xmlns="" id="{C7CC72AB-88BC-9440-A593-C5B2FD5D3089}"/>
               </a:ext>
             </a:extLst>
           </p:cNvPr>
@@ -2131,7 +2131,7 @@
           <a:p>
             <a:fld id="{78B47234-53AC-8043-A516-617C886D296F}" type="datetimeFigureOut">
               <a:rPr lang="en-US" smtClean="0"/>
-              <a:t>5/10/2018</a:t>
+              <a:t>5/17/2018</a:t>
             </a:fld>
             <a:endParaRPr lang="en-US"/>
           </a:p>
@@ -2142,7 +2142,7 @@
           <p:cNvPr id="6" name="Footer Placeholder 5">
             <a:extLst>
               <a:ext uri="{FF2B5EF4-FFF2-40B4-BE49-F238E27FC236}">
-                <a16:creationId xmlns="" xmlns:a16="http://schemas.microsoft.com/office/drawing/2014/main" id="{D576DC99-D148-A846-A641-77C6C6A9386A}"/>
+                <a16:creationId xmlns:a16="http://schemas.microsoft.com/office/drawing/2014/main" xmlns="" id="{D576DC99-D148-A846-A641-77C6C6A9386A}"/>
               </a:ext>
             </a:extLst>
           </p:cNvPr>
@@ -2167,7 +2167,7 @@
           <p:cNvPr id="7" name="Slide Number Placeholder 6">
             <a:extLst>
               <a:ext uri="{FF2B5EF4-FFF2-40B4-BE49-F238E27FC236}">
-                <a16:creationId xmlns="" xmlns:a16="http://schemas.microsoft.com/office/drawing/2014/main" id="{25271D62-6C05-E44F-9D92-80BC423C6E54}"/>
+                <a16:creationId xmlns:a16="http://schemas.microsoft.com/office/drawing/2014/main" xmlns="" id="{25271D62-6C05-E44F-9D92-80BC423C6E54}"/>
               </a:ext>
             </a:extLst>
           </p:cNvPr>
@@ -2226,7 +2226,7 @@
           <p:cNvPr id="2" name="Title 1">
             <a:extLst>
               <a:ext uri="{FF2B5EF4-FFF2-40B4-BE49-F238E27FC236}">
-                <a16:creationId xmlns="" xmlns:a16="http://schemas.microsoft.com/office/drawing/2014/main" id="{FEB2632A-9528-AD4A-97DD-D29E6A41B71E}"/>
+                <a16:creationId xmlns:a16="http://schemas.microsoft.com/office/drawing/2014/main" xmlns="" id="{FEB2632A-9528-AD4A-97DD-D29E6A41B71E}"/>
               </a:ext>
             </a:extLst>
           </p:cNvPr>
@@ -2259,7 +2259,7 @@
           <p:cNvPr id="3" name="Text Placeholder 2">
             <a:extLst>
               <a:ext uri="{FF2B5EF4-FFF2-40B4-BE49-F238E27FC236}">
-                <a16:creationId xmlns="" xmlns:a16="http://schemas.microsoft.com/office/drawing/2014/main" id="{2C87BFCF-EABB-594F-8195-CED98CDCACB2}"/>
+                <a16:creationId xmlns:a16="http://schemas.microsoft.com/office/drawing/2014/main" xmlns="" id="{2C87BFCF-EABB-594F-8195-CED98CDCACB2}"/>
               </a:ext>
             </a:extLst>
           </p:cNvPr>
@@ -2330,7 +2330,7 @@
           <p:cNvPr id="4" name="Content Placeholder 3">
             <a:extLst>
               <a:ext uri="{FF2B5EF4-FFF2-40B4-BE49-F238E27FC236}">
-                <a16:creationId xmlns="" xmlns:a16="http://schemas.microsoft.com/office/drawing/2014/main" id="{CCE2A19C-E5AE-2E44-A284-492D44FDCBE3}"/>
+                <a16:creationId xmlns:a16="http://schemas.microsoft.com/office/drawing/2014/main" xmlns="" id="{CCE2A19C-E5AE-2E44-A284-492D44FDCBE3}"/>
               </a:ext>
             </a:extLst>
           </p:cNvPr>
@@ -2392,7 +2392,7 @@
           <p:cNvPr id="5" name="Text Placeholder 4">
             <a:extLst>
               <a:ext uri="{FF2B5EF4-FFF2-40B4-BE49-F238E27FC236}">
-                <a16:creationId xmlns="" xmlns:a16="http://schemas.microsoft.com/office/drawing/2014/main" id="{27CD3272-96BA-2B40-9FD6-4DEAF845E9BF}"/>
+                <a16:creationId xmlns:a16="http://schemas.microsoft.com/office/drawing/2014/main" xmlns="" id="{27CD3272-96BA-2B40-9FD6-4DEAF845E9BF}"/>
               </a:ext>
             </a:extLst>
           </p:cNvPr>
@@ -2463,7 +2463,7 @@
           <p:cNvPr id="6" name="Content Placeholder 5">
             <a:extLst>
               <a:ext uri="{FF2B5EF4-FFF2-40B4-BE49-F238E27FC236}">
-                <a16:creationId xmlns="" xmlns:a16="http://schemas.microsoft.com/office/drawing/2014/main" id="{C3D4691F-CD87-774F-9D27-562FF4234DAE}"/>
+                <a16:creationId xmlns:a16="http://schemas.microsoft.com/office/drawing/2014/main" xmlns="" id="{C3D4691F-CD87-774F-9D27-562FF4234DAE}"/>
               </a:ext>
             </a:extLst>
           </p:cNvPr>
@@ -2525,7 +2525,7 @@
           <p:cNvPr id="7" name="Date Placeholder 6">
             <a:extLst>
               <a:ext uri="{FF2B5EF4-FFF2-40B4-BE49-F238E27FC236}">
-                <a16:creationId xmlns="" xmlns:a16="http://schemas.microsoft.com/office/drawing/2014/main" id="{066E261A-BC8C-9949-8DC7-FF512E3047E3}"/>
+                <a16:creationId xmlns:a16="http://schemas.microsoft.com/office/drawing/2014/main" xmlns="" id="{066E261A-BC8C-9949-8DC7-FF512E3047E3}"/>
               </a:ext>
             </a:extLst>
           </p:cNvPr>
@@ -2543,7 +2543,7 @@
           <a:p>
             <a:fld id="{78B47234-53AC-8043-A516-617C886D296F}" type="datetimeFigureOut">
               <a:rPr lang="en-US" smtClean="0"/>
-              <a:t>5/10/2018</a:t>
+              <a:t>5/17/2018</a:t>
             </a:fld>
             <a:endParaRPr lang="en-US"/>
           </a:p>
@@ -2554,7 +2554,7 @@
           <p:cNvPr id="8" name="Footer Placeholder 7">
             <a:extLst>
               <a:ext uri="{FF2B5EF4-FFF2-40B4-BE49-F238E27FC236}">
-                <a16:creationId xmlns="" xmlns:a16="http://schemas.microsoft.com/office/drawing/2014/main" id="{F634FFE3-D327-CF46-82F8-54436D3BD616}"/>
+                <a16:creationId xmlns:a16="http://schemas.microsoft.com/office/drawing/2014/main" xmlns="" id="{F634FFE3-D327-CF46-82F8-54436D3BD616}"/>
               </a:ext>
             </a:extLst>
           </p:cNvPr>
@@ -2579,7 +2579,7 @@
           <p:cNvPr id="9" name="Slide Number Placeholder 8">
             <a:extLst>
               <a:ext uri="{FF2B5EF4-FFF2-40B4-BE49-F238E27FC236}">
-                <a16:creationId xmlns="" xmlns:a16="http://schemas.microsoft.com/office/drawing/2014/main" id="{88CCD6E9-BDD1-A740-9E6B-61D9C14818B4}"/>
+                <a16:creationId xmlns:a16="http://schemas.microsoft.com/office/drawing/2014/main" xmlns="" id="{88CCD6E9-BDD1-A740-9E6B-61D9C14818B4}"/>
               </a:ext>
             </a:extLst>
           </p:cNvPr>
@@ -2638,7 +2638,7 @@
           <p:cNvPr id="2" name="Title 1">
             <a:extLst>
               <a:ext uri="{FF2B5EF4-FFF2-40B4-BE49-F238E27FC236}">
-                <a16:creationId xmlns="" xmlns:a16="http://schemas.microsoft.com/office/drawing/2014/main" id="{1A61B9ED-E5EE-FF44-9FAD-9C8F18497869}"/>
+                <a16:creationId xmlns:a16="http://schemas.microsoft.com/office/drawing/2014/main" xmlns="" id="{1A61B9ED-E5EE-FF44-9FAD-9C8F18497869}"/>
               </a:ext>
             </a:extLst>
           </p:cNvPr>
@@ -2666,7 +2666,7 @@
           <p:cNvPr id="3" name="Date Placeholder 2">
             <a:extLst>
               <a:ext uri="{FF2B5EF4-FFF2-40B4-BE49-F238E27FC236}">
-                <a16:creationId xmlns="" xmlns:a16="http://schemas.microsoft.com/office/drawing/2014/main" id="{D0697767-373A-8746-8C34-2819E756DB40}"/>
+                <a16:creationId xmlns:a16="http://schemas.microsoft.com/office/drawing/2014/main" xmlns="" id="{D0697767-373A-8746-8C34-2819E756DB40}"/>
               </a:ext>
             </a:extLst>
           </p:cNvPr>
@@ -2684,7 +2684,7 @@
           <a:p>
             <a:fld id="{78B47234-53AC-8043-A516-617C886D296F}" type="datetimeFigureOut">
               <a:rPr lang="en-US" smtClean="0"/>
-              <a:t>5/10/2018</a:t>
+              <a:t>5/17/2018</a:t>
             </a:fld>
             <a:endParaRPr lang="en-US"/>
           </a:p>
@@ -2695,7 +2695,7 @@
           <p:cNvPr id="4" name="Footer Placeholder 3">
             <a:extLst>
               <a:ext uri="{FF2B5EF4-FFF2-40B4-BE49-F238E27FC236}">
-                <a16:creationId xmlns="" xmlns:a16="http://schemas.microsoft.com/office/drawing/2014/main" id="{510C92D9-5C9E-D944-A177-8B77A7A885E5}"/>
+                <a16:creationId xmlns:a16="http://schemas.microsoft.com/office/drawing/2014/main" xmlns="" id="{510C92D9-5C9E-D944-A177-8B77A7A885E5}"/>
               </a:ext>
             </a:extLst>
           </p:cNvPr>
@@ -2720,7 +2720,7 @@
           <p:cNvPr id="5" name="Slide Number Placeholder 4">
             <a:extLst>
               <a:ext uri="{FF2B5EF4-FFF2-40B4-BE49-F238E27FC236}">
-                <a16:creationId xmlns="" xmlns:a16="http://schemas.microsoft.com/office/drawing/2014/main" id="{01AD7849-60FD-254E-8FB7-49BDBC771602}"/>
+                <a16:creationId xmlns:a16="http://schemas.microsoft.com/office/drawing/2014/main" xmlns="" id="{01AD7849-60FD-254E-8FB7-49BDBC771602}"/>
               </a:ext>
             </a:extLst>
           </p:cNvPr>
@@ -2779,7 +2779,7 @@
           <p:cNvPr id="2" name="Date Placeholder 1">
             <a:extLst>
               <a:ext uri="{FF2B5EF4-FFF2-40B4-BE49-F238E27FC236}">
-                <a16:creationId xmlns="" xmlns:a16="http://schemas.microsoft.com/office/drawing/2014/main" id="{208D5D25-5BBB-1D43-B957-A648B6FCE440}"/>
+                <a16:creationId xmlns:a16="http://schemas.microsoft.com/office/drawing/2014/main" xmlns="" id="{208D5D25-5BBB-1D43-B957-A648B6FCE440}"/>
               </a:ext>
             </a:extLst>
           </p:cNvPr>
@@ -2797,7 +2797,7 @@
           <a:p>
             <a:fld id="{78B47234-53AC-8043-A516-617C886D296F}" type="datetimeFigureOut">
               <a:rPr lang="en-US" smtClean="0"/>
-              <a:t>5/10/2018</a:t>
+              <a:t>5/17/2018</a:t>
             </a:fld>
             <a:endParaRPr lang="en-US"/>
           </a:p>
@@ -2808,7 +2808,7 @@
           <p:cNvPr id="3" name="Footer Placeholder 2">
             <a:extLst>
               <a:ext uri="{FF2B5EF4-FFF2-40B4-BE49-F238E27FC236}">
-                <a16:creationId xmlns="" xmlns:a16="http://schemas.microsoft.com/office/drawing/2014/main" id="{7310285F-9A07-5448-B8B6-34CB4A65BDB9}"/>
+                <a16:creationId xmlns:a16="http://schemas.microsoft.com/office/drawing/2014/main" xmlns="" id="{7310285F-9A07-5448-B8B6-34CB4A65BDB9}"/>
               </a:ext>
             </a:extLst>
           </p:cNvPr>
@@ -2833,7 +2833,7 @@
           <p:cNvPr id="4" name="Slide Number Placeholder 3">
             <a:extLst>
               <a:ext uri="{FF2B5EF4-FFF2-40B4-BE49-F238E27FC236}">
-                <a16:creationId xmlns="" xmlns:a16="http://schemas.microsoft.com/office/drawing/2014/main" id="{FBC69B27-BC7F-A94B-A487-83F9BEEB6D33}"/>
+                <a16:creationId xmlns:a16="http://schemas.microsoft.com/office/drawing/2014/main" xmlns="" id="{FBC69B27-BC7F-A94B-A487-83F9BEEB6D33}"/>
               </a:ext>
             </a:extLst>
           </p:cNvPr>
@@ -2892,7 +2892,7 @@
           <p:cNvPr id="2" name="Title 1">
             <a:extLst>
               <a:ext uri="{FF2B5EF4-FFF2-40B4-BE49-F238E27FC236}">
-                <a16:creationId xmlns="" xmlns:a16="http://schemas.microsoft.com/office/drawing/2014/main" id="{E338C7EC-EA5F-2F48-BBA4-5F5CB2725401}"/>
+                <a16:creationId xmlns:a16="http://schemas.microsoft.com/office/drawing/2014/main" xmlns="" id="{E338C7EC-EA5F-2F48-BBA4-5F5CB2725401}"/>
               </a:ext>
             </a:extLst>
           </p:cNvPr>
@@ -2929,7 +2929,7 @@
           <p:cNvPr id="3" name="Content Placeholder 2">
             <a:extLst>
               <a:ext uri="{FF2B5EF4-FFF2-40B4-BE49-F238E27FC236}">
-                <a16:creationId xmlns="" xmlns:a16="http://schemas.microsoft.com/office/drawing/2014/main" id="{49C82EEC-9455-274A-8AC0-6708B79C01A3}"/>
+                <a16:creationId xmlns:a16="http://schemas.microsoft.com/office/drawing/2014/main" xmlns="" id="{49C82EEC-9455-274A-8AC0-6708B79C01A3}"/>
               </a:ext>
             </a:extLst>
           </p:cNvPr>
@@ -3019,7 +3019,7 @@
           <p:cNvPr id="4" name="Text Placeholder 3">
             <a:extLst>
               <a:ext uri="{FF2B5EF4-FFF2-40B4-BE49-F238E27FC236}">
-                <a16:creationId xmlns="" xmlns:a16="http://schemas.microsoft.com/office/drawing/2014/main" id="{6A1CA6A7-37E1-6745-80FB-57BF13EAA4A9}"/>
+                <a16:creationId xmlns:a16="http://schemas.microsoft.com/office/drawing/2014/main" xmlns="" id="{6A1CA6A7-37E1-6745-80FB-57BF13EAA4A9}"/>
               </a:ext>
             </a:extLst>
           </p:cNvPr>
@@ -3090,7 +3090,7 @@
           <p:cNvPr id="5" name="Date Placeholder 4">
             <a:extLst>
               <a:ext uri="{FF2B5EF4-FFF2-40B4-BE49-F238E27FC236}">
-                <a16:creationId xmlns="" xmlns:a16="http://schemas.microsoft.com/office/drawing/2014/main" id="{4DB4A479-6736-C243-8DAD-312D47569788}"/>
+                <a16:creationId xmlns:a16="http://schemas.microsoft.com/office/drawing/2014/main" xmlns="" id="{4DB4A479-6736-C243-8DAD-312D47569788}"/>
               </a:ext>
             </a:extLst>
           </p:cNvPr>
@@ -3108,7 +3108,7 @@
           <a:p>
             <a:fld id="{78B47234-53AC-8043-A516-617C886D296F}" type="datetimeFigureOut">
               <a:rPr lang="en-US" smtClean="0"/>
-              <a:t>5/10/2018</a:t>
+              <a:t>5/17/2018</a:t>
             </a:fld>
             <a:endParaRPr lang="en-US"/>
           </a:p>
@@ -3119,7 +3119,7 @@
           <p:cNvPr id="6" name="Footer Placeholder 5">
             <a:extLst>
               <a:ext uri="{FF2B5EF4-FFF2-40B4-BE49-F238E27FC236}">
-                <a16:creationId xmlns="" xmlns:a16="http://schemas.microsoft.com/office/drawing/2014/main" id="{FF664A04-96A0-E04F-8DB7-F0FE034DC578}"/>
+                <a16:creationId xmlns:a16="http://schemas.microsoft.com/office/drawing/2014/main" xmlns="" id="{FF664A04-96A0-E04F-8DB7-F0FE034DC578}"/>
               </a:ext>
             </a:extLst>
           </p:cNvPr>
@@ -3144,7 +3144,7 @@
           <p:cNvPr id="7" name="Slide Number Placeholder 6">
             <a:extLst>
               <a:ext uri="{FF2B5EF4-FFF2-40B4-BE49-F238E27FC236}">
-                <a16:creationId xmlns="" xmlns:a16="http://schemas.microsoft.com/office/drawing/2014/main" id="{DB92E314-6ADA-624D-8F8B-935A0C976A1B}"/>
+                <a16:creationId xmlns:a16="http://schemas.microsoft.com/office/drawing/2014/main" xmlns="" id="{DB92E314-6ADA-624D-8F8B-935A0C976A1B}"/>
               </a:ext>
             </a:extLst>
           </p:cNvPr>
@@ -3203,7 +3203,7 @@
           <p:cNvPr id="2" name="Title 1">
             <a:extLst>
               <a:ext uri="{FF2B5EF4-FFF2-40B4-BE49-F238E27FC236}">
-                <a16:creationId xmlns="" xmlns:a16="http://schemas.microsoft.com/office/drawing/2014/main" id="{C890D1E4-1EB2-B644-AB64-3E7CE9687CC8}"/>
+                <a16:creationId xmlns:a16="http://schemas.microsoft.com/office/drawing/2014/main" xmlns="" id="{C890D1E4-1EB2-B644-AB64-3E7CE9687CC8}"/>
               </a:ext>
             </a:extLst>
           </p:cNvPr>
@@ -3240,7 +3240,7 @@
           <p:cNvPr id="3" name="Picture Placeholder 2">
             <a:extLst>
               <a:ext uri="{FF2B5EF4-FFF2-40B4-BE49-F238E27FC236}">
-                <a16:creationId xmlns="" xmlns:a16="http://schemas.microsoft.com/office/drawing/2014/main" id="{53B71092-2B32-C742-A558-4F5FC6C3CEF8}"/>
+                <a16:creationId xmlns:a16="http://schemas.microsoft.com/office/drawing/2014/main" xmlns="" id="{53B71092-2B32-C742-A558-4F5FC6C3CEF8}"/>
               </a:ext>
             </a:extLst>
           </p:cNvPr>
@@ -3307,7 +3307,7 @@
           <p:cNvPr id="4" name="Text Placeholder 3">
             <a:extLst>
               <a:ext uri="{FF2B5EF4-FFF2-40B4-BE49-F238E27FC236}">
-                <a16:creationId xmlns="" xmlns:a16="http://schemas.microsoft.com/office/drawing/2014/main" id="{393E7232-314C-6A4E-A3B6-F7D0B784631A}"/>
+                <a16:creationId xmlns:a16="http://schemas.microsoft.com/office/drawing/2014/main" xmlns="" id="{393E7232-314C-6A4E-A3B6-F7D0B784631A}"/>
               </a:ext>
             </a:extLst>
           </p:cNvPr>
@@ -3378,7 +3378,7 @@
           <p:cNvPr id="5" name="Date Placeholder 4">
             <a:extLst>
               <a:ext uri="{FF2B5EF4-FFF2-40B4-BE49-F238E27FC236}">
-                <a16:creationId xmlns="" xmlns:a16="http://schemas.microsoft.com/office/drawing/2014/main" id="{5194B589-8520-9D46-AF98-3339E6B190CD}"/>
+                <a16:creationId xmlns:a16="http://schemas.microsoft.com/office/drawing/2014/main" xmlns="" id="{5194B589-8520-9D46-AF98-3339E6B190CD}"/>
               </a:ext>
             </a:extLst>
           </p:cNvPr>
@@ -3396,7 +3396,7 @@
           <a:p>
             <a:fld id="{78B47234-53AC-8043-A516-617C886D296F}" type="datetimeFigureOut">
               <a:rPr lang="en-US" smtClean="0"/>
-              <a:t>5/10/2018</a:t>
+              <a:t>5/17/2018</a:t>
             </a:fld>
             <a:endParaRPr lang="en-US"/>
           </a:p>
@@ -3407,7 +3407,7 @@
           <p:cNvPr id="6" name="Footer Placeholder 5">
             <a:extLst>
               <a:ext uri="{FF2B5EF4-FFF2-40B4-BE49-F238E27FC236}">
-                <a16:creationId xmlns="" xmlns:a16="http://schemas.microsoft.com/office/drawing/2014/main" id="{F8F589D9-28F4-BB44-9A49-B477821FDA2E}"/>
+                <a16:creationId xmlns:a16="http://schemas.microsoft.com/office/drawing/2014/main" xmlns="" id="{F8F589D9-28F4-BB44-9A49-B477821FDA2E}"/>
               </a:ext>
             </a:extLst>
           </p:cNvPr>
@@ -3432,7 +3432,7 @@
           <p:cNvPr id="7" name="Slide Number Placeholder 6">
             <a:extLst>
               <a:ext uri="{FF2B5EF4-FFF2-40B4-BE49-F238E27FC236}">
-                <a16:creationId xmlns="" xmlns:a16="http://schemas.microsoft.com/office/drawing/2014/main" id="{AE0D1EF8-B587-AA40-8886-205AFAC5A93E}"/>
+                <a16:creationId xmlns:a16="http://schemas.microsoft.com/office/drawing/2014/main" xmlns="" id="{AE0D1EF8-B587-AA40-8886-205AFAC5A93E}"/>
               </a:ext>
             </a:extLst>
           </p:cNvPr>
@@ -3496,7 +3496,7 @@
           <p:cNvPr id="2" name="Title Placeholder 1">
             <a:extLst>
               <a:ext uri="{FF2B5EF4-FFF2-40B4-BE49-F238E27FC236}">
-                <a16:creationId xmlns="" xmlns:a16="http://schemas.microsoft.com/office/drawing/2014/main" id="{D2BE094A-6476-5F48-8E35-EE84223201CE}"/>
+                <a16:creationId xmlns:a16="http://schemas.microsoft.com/office/drawing/2014/main" xmlns="" id="{D2BE094A-6476-5F48-8E35-EE84223201CE}"/>
               </a:ext>
             </a:extLst>
           </p:cNvPr>
@@ -3534,7 +3534,7 @@
           <p:cNvPr id="3" name="Text Placeholder 2">
             <a:extLst>
               <a:ext uri="{FF2B5EF4-FFF2-40B4-BE49-F238E27FC236}">
-                <a16:creationId xmlns="" xmlns:a16="http://schemas.microsoft.com/office/drawing/2014/main" id="{5CFCC1FB-0387-A149-AD84-D2FB087FF41F}"/>
+                <a16:creationId xmlns:a16="http://schemas.microsoft.com/office/drawing/2014/main" xmlns="" id="{5CFCC1FB-0387-A149-AD84-D2FB087FF41F}"/>
               </a:ext>
             </a:extLst>
           </p:cNvPr>
@@ -3601,7 +3601,7 @@
           <p:cNvPr id="4" name="Date Placeholder 3">
             <a:extLst>
               <a:ext uri="{FF2B5EF4-FFF2-40B4-BE49-F238E27FC236}">
-                <a16:creationId xmlns="" xmlns:a16="http://schemas.microsoft.com/office/drawing/2014/main" id="{B24634F2-42F1-DD4F-947A-9674AD4FC865}"/>
+                <a16:creationId xmlns:a16="http://schemas.microsoft.com/office/drawing/2014/main" xmlns="" id="{B24634F2-42F1-DD4F-947A-9674AD4FC865}"/>
               </a:ext>
             </a:extLst>
           </p:cNvPr>
@@ -3637,7 +3637,7 @@
           <a:p>
             <a:fld id="{78B47234-53AC-8043-A516-617C886D296F}" type="datetimeFigureOut">
               <a:rPr lang="en-US" smtClean="0"/>
-              <a:t>5/10/2018</a:t>
+              <a:t>5/17/2018</a:t>
             </a:fld>
             <a:endParaRPr lang="en-US"/>
           </a:p>
@@ -3648,7 +3648,7 @@
           <p:cNvPr id="5" name="Footer Placeholder 4">
             <a:extLst>
               <a:ext uri="{FF2B5EF4-FFF2-40B4-BE49-F238E27FC236}">
-                <a16:creationId xmlns="" xmlns:a16="http://schemas.microsoft.com/office/drawing/2014/main" id="{1F3B806D-A4D8-DF49-8359-8656490D6726}"/>
+                <a16:creationId xmlns:a16="http://schemas.microsoft.com/office/drawing/2014/main" xmlns="" id="{1F3B806D-A4D8-DF49-8359-8656490D6726}"/>
               </a:ext>
             </a:extLst>
           </p:cNvPr>
@@ -3691,7 +3691,7 @@
           <p:cNvPr id="6" name="Slide Number Placeholder 5">
             <a:extLst>
               <a:ext uri="{FF2B5EF4-FFF2-40B4-BE49-F238E27FC236}">
-                <a16:creationId xmlns="" xmlns:a16="http://schemas.microsoft.com/office/drawing/2014/main" id="{1C073CC9-A5AE-5649-8C77-6AB016C10589}"/>
+                <a16:creationId xmlns:a16="http://schemas.microsoft.com/office/drawing/2014/main" xmlns="" id="{1C073CC9-A5AE-5649-8C77-6AB016C10589}"/>
               </a:ext>
             </a:extLst>
           </p:cNvPr>
@@ -4088,7 +4088,7 @@
               <p:cNvPr id="24" name="Picture 23">
                 <a:extLst>
                   <a:ext uri="{FF2B5EF4-FFF2-40B4-BE49-F238E27FC236}">
-                    <a16:creationId xmlns="" xmlns:a16="http://schemas.microsoft.com/office/drawing/2014/main" id="{34E0CED9-750C-2D41-9BB7-17026667CCE9}"/>
+                    <a16:creationId xmlns:a16="http://schemas.microsoft.com/office/drawing/2014/main" xmlns="" id="{34E0CED9-750C-2D41-9BB7-17026667CCE9}"/>
                   </a:ext>
                 </a:extLst>
               </p:cNvPr>
@@ -4118,7 +4118,7 @@
               <p:cNvPr id="25" name="Straight Arrow Connector 24">
                 <a:extLst>
                   <a:ext uri="{FF2B5EF4-FFF2-40B4-BE49-F238E27FC236}">
-                    <a16:creationId xmlns="" xmlns:a16="http://schemas.microsoft.com/office/drawing/2014/main" id="{F27EDF7D-9821-124F-BFAC-296397795C0B}"/>
+                    <a16:creationId xmlns:a16="http://schemas.microsoft.com/office/drawing/2014/main" xmlns="" id="{F27EDF7D-9821-124F-BFAC-296397795C0B}"/>
                   </a:ext>
                 </a:extLst>
               </p:cNvPr>
@@ -4163,7 +4163,7 @@
               <p:cNvPr id="26" name="Straight Arrow Connector 25">
                 <a:extLst>
                   <a:ext uri="{FF2B5EF4-FFF2-40B4-BE49-F238E27FC236}">
-                    <a16:creationId xmlns="" xmlns:a16="http://schemas.microsoft.com/office/drawing/2014/main" id="{5FB60EE6-D5F0-CF4E-90B2-7E7F694AF255}"/>
+                    <a16:creationId xmlns:a16="http://schemas.microsoft.com/office/drawing/2014/main" xmlns="" id="{5FB60EE6-D5F0-CF4E-90B2-7E7F694AF255}"/>
                   </a:ext>
                 </a:extLst>
               </p:cNvPr>
@@ -4207,7 +4207,7 @@
               <p:cNvPr id="27" name="Straight Arrow Connector 26">
                 <a:extLst>
                   <a:ext uri="{FF2B5EF4-FFF2-40B4-BE49-F238E27FC236}">
-                    <a16:creationId xmlns="" xmlns:a16="http://schemas.microsoft.com/office/drawing/2014/main" id="{AD5AC55D-2189-FC44-A267-0F2F0D446C3C}"/>
+                    <a16:creationId xmlns:a16="http://schemas.microsoft.com/office/drawing/2014/main" xmlns="" id="{AD5AC55D-2189-FC44-A267-0F2F0D446C3C}"/>
                   </a:ext>
                 </a:extLst>
               </p:cNvPr>
@@ -4252,7 +4252,7 @@
               <p:cNvPr id="28" name="Straight Arrow Connector 27">
                 <a:extLst>
                   <a:ext uri="{FF2B5EF4-FFF2-40B4-BE49-F238E27FC236}">
-                    <a16:creationId xmlns="" xmlns:a16="http://schemas.microsoft.com/office/drawing/2014/main" id="{5E5BCC3D-0641-9940-9C9F-B07FE0D1B902}"/>
+                    <a16:creationId xmlns:a16="http://schemas.microsoft.com/office/drawing/2014/main" xmlns="" id="{5E5BCC3D-0641-9940-9C9F-B07FE0D1B902}"/>
                   </a:ext>
                 </a:extLst>
               </p:cNvPr>
@@ -4297,7 +4297,7 @@
               <p:cNvPr id="29" name="Straight Arrow Connector 28">
                 <a:extLst>
                   <a:ext uri="{FF2B5EF4-FFF2-40B4-BE49-F238E27FC236}">
-                    <a16:creationId xmlns="" xmlns:a16="http://schemas.microsoft.com/office/drawing/2014/main" id="{CB89DCB6-D9C8-BF44-AF0D-8A829FF9C9EC}"/>
+                    <a16:creationId xmlns:a16="http://schemas.microsoft.com/office/drawing/2014/main" xmlns="" id="{CB89DCB6-D9C8-BF44-AF0D-8A829FF9C9EC}"/>
                   </a:ext>
                 </a:extLst>
               </p:cNvPr>
@@ -4342,7 +4342,7 @@
               <p:cNvPr id="30" name="TextBox 29">
                 <a:extLst>
                   <a:ext uri="{FF2B5EF4-FFF2-40B4-BE49-F238E27FC236}">
-                    <a16:creationId xmlns="" xmlns:a16="http://schemas.microsoft.com/office/drawing/2014/main" id="{E9AFA60E-8F2C-1E45-BBEB-604E2B535E5F}"/>
+                    <a16:creationId xmlns:a16="http://schemas.microsoft.com/office/drawing/2014/main" xmlns="" id="{E9AFA60E-8F2C-1E45-BBEB-604E2B535E5F}"/>
                   </a:ext>
                 </a:extLst>
               </p:cNvPr>
@@ -4377,7 +4377,15 @@
                 </a:r>
                 <a:r>
                   <a:rPr lang="en-US" dirty="0" smtClean="0"/>
-                  <a:t>Reflector, 6 K</a:t>
+                  <a:t>Reflector, </a:t>
+                </a:r>
+                <a:r>
+                  <a:rPr lang="en-US" dirty="0" smtClean="0"/>
+                  <a:t>10 </a:t>
+                </a:r>
+                <a:r>
+                  <a:rPr lang="en-US" dirty="0" smtClean="0"/>
+                  <a:t>K</a:t>
                 </a:r>
                 <a:endParaRPr lang="en-US" dirty="0"/>
               </a:p>
@@ -4388,7 +4396,7 @@
               <p:cNvPr id="31" name="TextBox 30">
                 <a:extLst>
                   <a:ext uri="{FF2B5EF4-FFF2-40B4-BE49-F238E27FC236}">
-                    <a16:creationId xmlns="" xmlns:a16="http://schemas.microsoft.com/office/drawing/2014/main" id="{7C81964B-463F-7846-9E82-5CEB1DD032B1}"/>
+                    <a16:creationId xmlns:a16="http://schemas.microsoft.com/office/drawing/2014/main" xmlns="" id="{7C81964B-463F-7846-9E82-5CEB1DD032B1}"/>
                   </a:ext>
                 </a:extLst>
               </p:cNvPr>
@@ -4423,7 +4431,15 @@
                 </a:r>
                 <a:r>
                   <a:rPr lang="en-US" dirty="0" smtClean="0"/>
-                  <a:t>Reflector, 40 K</a:t>
+                  <a:t>Reflector, </a:t>
+                </a:r>
+                <a:r>
+                  <a:rPr lang="en-US" dirty="0" smtClean="0"/>
+                  <a:t>15 </a:t>
+                </a:r>
+                <a:r>
+                  <a:rPr lang="en-US" dirty="0" smtClean="0"/>
+                  <a:t>K</a:t>
                 </a:r>
                 <a:endParaRPr lang="en-US" dirty="0"/>
               </a:p>
@@ -4434,7 +4450,7 @@
               <p:cNvPr id="32" name="TextBox 31">
                 <a:extLst>
                   <a:ext uri="{FF2B5EF4-FFF2-40B4-BE49-F238E27FC236}">
-                    <a16:creationId xmlns="" xmlns:a16="http://schemas.microsoft.com/office/drawing/2014/main" id="{C8C064BC-BF2E-4D49-8022-E28B3775C626}"/>
+                    <a16:creationId xmlns:a16="http://schemas.microsoft.com/office/drawing/2014/main" xmlns="" id="{C8C064BC-BF2E-4D49-8022-E28B3775C626}"/>
                   </a:ext>
                 </a:extLst>
               </p:cNvPr>
@@ -4475,7 +4491,7 @@
               <p:cNvPr id="33" name="TextBox 32">
                 <a:extLst>
                   <a:ext uri="{FF2B5EF4-FFF2-40B4-BE49-F238E27FC236}">
-                    <a16:creationId xmlns="" xmlns:a16="http://schemas.microsoft.com/office/drawing/2014/main" id="{E4756D17-1F3F-E64B-AB67-230A59782D9A}"/>
+                    <a16:creationId xmlns:a16="http://schemas.microsoft.com/office/drawing/2014/main" xmlns="" id="{E4756D17-1F3F-E64B-AB67-230A59782D9A}"/>
                   </a:ext>
                 </a:extLst>
               </p:cNvPr>
@@ -4525,7 +4541,7 @@
               <p:cNvPr id="34" name="TextBox 33">
                 <a:extLst>
                   <a:ext uri="{FF2B5EF4-FFF2-40B4-BE49-F238E27FC236}">
-                    <a16:creationId xmlns="" xmlns:a16="http://schemas.microsoft.com/office/drawing/2014/main" id="{6221F280-C9B2-0646-9521-492845846219}"/>
+                    <a16:creationId xmlns:a16="http://schemas.microsoft.com/office/drawing/2014/main" xmlns="" id="{6221F280-C9B2-0646-9521-492845846219}"/>
                   </a:ext>
                 </a:extLst>
               </p:cNvPr>
@@ -4560,7 +4576,15 @@
                 </a:r>
                 <a:r>
                   <a:rPr lang="en-US" dirty="0" smtClean="0"/>
-                  <a:t>Stop, 4 K</a:t>
+                  <a:t>Stop, </a:t>
+                </a:r>
+                <a:r>
+                  <a:rPr lang="en-US" dirty="0" smtClean="0"/>
+                  <a:t>6 </a:t>
+                </a:r>
+                <a:r>
+                  <a:rPr lang="en-US" dirty="0" smtClean="0"/>
+                  <a:t>K</a:t>
                 </a:r>
                 <a:endParaRPr lang="en-US" dirty="0"/>
               </a:p>
@@ -4571,7 +4595,7 @@
               <p:cNvPr id="35" name="TextBox 34">
                 <a:extLst>
                   <a:ext uri="{FF2B5EF4-FFF2-40B4-BE49-F238E27FC236}">
-                    <a16:creationId xmlns="" xmlns:a16="http://schemas.microsoft.com/office/drawing/2014/main" id="{316E6191-DDC2-5047-A3F1-2CE068D8ED21}"/>
+                    <a16:creationId xmlns:a16="http://schemas.microsoft.com/office/drawing/2014/main" xmlns="" id="{316E6191-DDC2-5047-A3F1-2CE068D8ED21}"/>
                   </a:ext>
                 </a:extLst>
               </p:cNvPr>
@@ -4616,7 +4640,7 @@
               <p:cNvPr id="36" name="Straight Arrow Connector 35">
                 <a:extLst>
                   <a:ext uri="{FF2B5EF4-FFF2-40B4-BE49-F238E27FC236}">
-                    <a16:creationId xmlns="" xmlns:a16="http://schemas.microsoft.com/office/drawing/2014/main" id="{CB89DCB6-D9C8-BF44-AF0D-8A829FF9C9EC}"/>
+                    <a16:creationId xmlns:a16="http://schemas.microsoft.com/office/drawing/2014/main" xmlns="" id="{CB89DCB6-D9C8-BF44-AF0D-8A829FF9C9EC}"/>
                   </a:ext>
                 </a:extLst>
               </p:cNvPr>
@@ -4661,7 +4685,7 @@
               <p:cNvPr id="37" name="TextBox 36">
                 <a:extLst>
                   <a:ext uri="{FF2B5EF4-FFF2-40B4-BE49-F238E27FC236}">
-                    <a16:creationId xmlns="" xmlns:a16="http://schemas.microsoft.com/office/drawing/2014/main" id="{E4756D17-1F3F-E64B-AB67-230A59782D9A}"/>
+                    <a16:creationId xmlns:a16="http://schemas.microsoft.com/office/drawing/2014/main" xmlns="" id="{E4756D17-1F3F-E64B-AB67-230A59782D9A}"/>
                   </a:ext>
                 </a:extLst>
               </p:cNvPr>
@@ -4692,7 +4716,19 @@
                 <a:pPr algn="ctr"/>
                 <a:r>
                   <a:rPr lang="en-US" dirty="0" smtClean="0"/>
-                  <a:t>Optics Box, 4 K</a:t>
+                  <a:t>Optics Box, </a:t>
+                </a:r>
+                <a:r>
+                  <a:rPr lang="en-US" dirty="0"/>
+                  <a:t>6</a:t>
+                </a:r>
+                <a:r>
+                  <a:rPr lang="en-US" dirty="0" smtClean="0"/>
+                  <a:t> </a:t>
+                </a:r>
+                <a:r>
+                  <a:rPr lang="en-US" dirty="0" smtClean="0"/>
+                  <a:t>K</a:t>
                 </a:r>
                 <a:endParaRPr lang="en-US" dirty="0"/>
               </a:p>
@@ -4704,7 +4740,7 @@
             <p:cNvPr id="17" name="Straight Arrow Connector 16">
               <a:extLst>
                 <a:ext uri="{FF2B5EF4-FFF2-40B4-BE49-F238E27FC236}">
-                  <a16:creationId xmlns="" xmlns:a16="http://schemas.microsoft.com/office/drawing/2014/main" id="{5E5BCC3D-0641-9940-9C9F-B07FE0D1B902}"/>
+                  <a16:creationId xmlns:a16="http://schemas.microsoft.com/office/drawing/2014/main" xmlns="" id="{5E5BCC3D-0641-9940-9C9F-B07FE0D1B902}"/>
                 </a:ext>
               </a:extLst>
             </p:cNvPr>
@@ -4749,7 +4785,7 @@
             <p:cNvPr id="18" name="TextBox 17">
               <a:extLst>
                 <a:ext uri="{FF2B5EF4-FFF2-40B4-BE49-F238E27FC236}">
-                  <a16:creationId xmlns="" xmlns:a16="http://schemas.microsoft.com/office/drawing/2014/main" id="{E9AFA60E-8F2C-1E45-BBEB-604E2B535E5F}"/>
+                  <a16:creationId xmlns:a16="http://schemas.microsoft.com/office/drawing/2014/main" xmlns="" id="{E9AFA60E-8F2C-1E45-BBEB-604E2B535E5F}"/>
                 </a:ext>
               </a:extLst>
             </p:cNvPr>
@@ -4836,7 +4872,7 @@
             <p:cNvPr id="24" name="Picture 23">
               <a:extLst>
                 <a:ext uri="{FF2B5EF4-FFF2-40B4-BE49-F238E27FC236}">
-                  <a16:creationId xmlns="" xmlns:a16="http://schemas.microsoft.com/office/drawing/2014/main" id="{34E0CED9-750C-2D41-9BB7-17026667CCE9}"/>
+                  <a16:creationId xmlns:a16="http://schemas.microsoft.com/office/drawing/2014/main" xmlns="" id="{34E0CED9-750C-2D41-9BB7-17026667CCE9}"/>
                 </a:ext>
               </a:extLst>
             </p:cNvPr>
@@ -4872,7 +4908,7 @@
             <p:cNvPr id="25" name="Straight Arrow Connector 24">
               <a:extLst>
                 <a:ext uri="{FF2B5EF4-FFF2-40B4-BE49-F238E27FC236}">
-                  <a16:creationId xmlns="" xmlns:a16="http://schemas.microsoft.com/office/drawing/2014/main" id="{F27EDF7D-9821-124F-BFAC-296397795C0B}"/>
+                  <a16:creationId xmlns:a16="http://schemas.microsoft.com/office/drawing/2014/main" xmlns="" id="{F27EDF7D-9821-124F-BFAC-296397795C0B}"/>
                 </a:ext>
               </a:extLst>
             </p:cNvPr>
@@ -4917,7 +4953,7 @@
             <p:cNvPr id="26" name="Straight Arrow Connector 25">
               <a:extLst>
                 <a:ext uri="{FF2B5EF4-FFF2-40B4-BE49-F238E27FC236}">
-                  <a16:creationId xmlns="" xmlns:a16="http://schemas.microsoft.com/office/drawing/2014/main" id="{5FB60EE6-D5F0-CF4E-90B2-7E7F694AF255}"/>
+                  <a16:creationId xmlns:a16="http://schemas.microsoft.com/office/drawing/2014/main" xmlns="" id="{5FB60EE6-D5F0-CF4E-90B2-7E7F694AF255}"/>
                 </a:ext>
               </a:extLst>
             </p:cNvPr>
@@ -4961,7 +4997,7 @@
             <p:cNvPr id="27" name="Straight Arrow Connector 26">
               <a:extLst>
                 <a:ext uri="{FF2B5EF4-FFF2-40B4-BE49-F238E27FC236}">
-                  <a16:creationId xmlns="" xmlns:a16="http://schemas.microsoft.com/office/drawing/2014/main" id="{AD5AC55D-2189-FC44-A267-0F2F0D446C3C}"/>
+                  <a16:creationId xmlns:a16="http://schemas.microsoft.com/office/drawing/2014/main" xmlns="" id="{AD5AC55D-2189-FC44-A267-0F2F0D446C3C}"/>
                 </a:ext>
               </a:extLst>
             </p:cNvPr>
@@ -5006,7 +5042,7 @@
             <p:cNvPr id="28" name="Straight Arrow Connector 27">
               <a:extLst>
                 <a:ext uri="{FF2B5EF4-FFF2-40B4-BE49-F238E27FC236}">
-                  <a16:creationId xmlns="" xmlns:a16="http://schemas.microsoft.com/office/drawing/2014/main" id="{5E5BCC3D-0641-9940-9C9F-B07FE0D1B902}"/>
+                  <a16:creationId xmlns:a16="http://schemas.microsoft.com/office/drawing/2014/main" xmlns="" id="{5E5BCC3D-0641-9940-9C9F-B07FE0D1B902}"/>
                 </a:ext>
               </a:extLst>
             </p:cNvPr>
@@ -5051,7 +5087,7 @@
             <p:cNvPr id="29" name="Straight Arrow Connector 28">
               <a:extLst>
                 <a:ext uri="{FF2B5EF4-FFF2-40B4-BE49-F238E27FC236}">
-                  <a16:creationId xmlns="" xmlns:a16="http://schemas.microsoft.com/office/drawing/2014/main" id="{CB89DCB6-D9C8-BF44-AF0D-8A829FF9C9EC}"/>
+                  <a16:creationId xmlns:a16="http://schemas.microsoft.com/office/drawing/2014/main" xmlns="" id="{CB89DCB6-D9C8-BF44-AF0D-8A829FF9C9EC}"/>
                 </a:ext>
               </a:extLst>
             </p:cNvPr>
@@ -5096,7 +5132,7 @@
             <p:cNvPr id="30" name="TextBox 29">
               <a:extLst>
                 <a:ext uri="{FF2B5EF4-FFF2-40B4-BE49-F238E27FC236}">
-                  <a16:creationId xmlns="" xmlns:a16="http://schemas.microsoft.com/office/drawing/2014/main" id="{E9AFA60E-8F2C-1E45-BBEB-604E2B535E5F}"/>
+                  <a16:creationId xmlns:a16="http://schemas.microsoft.com/office/drawing/2014/main" xmlns="" id="{E9AFA60E-8F2C-1E45-BBEB-604E2B535E5F}"/>
                 </a:ext>
               </a:extLst>
             </p:cNvPr>
@@ -5135,7 +5171,7 @@
               </a:r>
               <a:r>
                 <a:rPr lang="en-US" dirty="0" smtClean="0"/>
-                <a:t>4 </a:t>
+                <a:t>10 </a:t>
               </a:r>
               <a:r>
                 <a:rPr lang="en-US" dirty="0" smtClean="0"/>
@@ -5150,7 +5186,7 @@
             <p:cNvPr id="31" name="TextBox 30">
               <a:extLst>
                 <a:ext uri="{FF2B5EF4-FFF2-40B4-BE49-F238E27FC236}">
-                  <a16:creationId xmlns="" xmlns:a16="http://schemas.microsoft.com/office/drawing/2014/main" id="{7C81964B-463F-7846-9E82-5CEB1DD032B1}"/>
+                  <a16:creationId xmlns:a16="http://schemas.microsoft.com/office/drawing/2014/main" xmlns="" id="{7C81964B-463F-7846-9E82-5CEB1DD032B1}"/>
                 </a:ext>
               </a:extLst>
             </p:cNvPr>
@@ -5185,7 +5221,15 @@
               </a:r>
               <a:r>
                 <a:rPr lang="en-US" dirty="0" smtClean="0"/>
-                <a:t>Reflector, 40 K</a:t>
+                <a:t>Reflector, </a:t>
+              </a:r>
+              <a:r>
+                <a:rPr lang="en-US" dirty="0" smtClean="0"/>
+                <a:t>15 </a:t>
+              </a:r>
+              <a:r>
+                <a:rPr lang="en-US" dirty="0" smtClean="0"/>
+                <a:t>K</a:t>
               </a:r>
               <a:endParaRPr lang="en-US" dirty="0"/>
             </a:p>
@@ -5196,7 +5240,7 @@
             <p:cNvPr id="32" name="TextBox 31">
               <a:extLst>
                 <a:ext uri="{FF2B5EF4-FFF2-40B4-BE49-F238E27FC236}">
-                  <a16:creationId xmlns="" xmlns:a16="http://schemas.microsoft.com/office/drawing/2014/main" id="{C8C064BC-BF2E-4D49-8022-E28B3775C626}"/>
+                  <a16:creationId xmlns:a16="http://schemas.microsoft.com/office/drawing/2014/main" xmlns="" id="{C8C064BC-BF2E-4D49-8022-E28B3775C626}"/>
                 </a:ext>
               </a:extLst>
             </p:cNvPr>
@@ -5237,7 +5281,7 @@
             <p:cNvPr id="33" name="TextBox 32">
               <a:extLst>
                 <a:ext uri="{FF2B5EF4-FFF2-40B4-BE49-F238E27FC236}">
-                  <a16:creationId xmlns="" xmlns:a16="http://schemas.microsoft.com/office/drawing/2014/main" id="{E4756D17-1F3F-E64B-AB67-230A59782D9A}"/>
+                  <a16:creationId xmlns:a16="http://schemas.microsoft.com/office/drawing/2014/main" xmlns="" id="{E4756D17-1F3F-E64B-AB67-230A59782D9A}"/>
                 </a:ext>
               </a:extLst>
             </p:cNvPr>
@@ -5287,7 +5331,7 @@
             <p:cNvPr id="34" name="TextBox 33">
               <a:extLst>
                 <a:ext uri="{FF2B5EF4-FFF2-40B4-BE49-F238E27FC236}">
-                  <a16:creationId xmlns="" xmlns:a16="http://schemas.microsoft.com/office/drawing/2014/main" id="{6221F280-C9B2-0646-9521-492845846219}"/>
+                  <a16:creationId xmlns:a16="http://schemas.microsoft.com/office/drawing/2014/main" xmlns="" id="{6221F280-C9B2-0646-9521-492845846219}"/>
                 </a:ext>
               </a:extLst>
             </p:cNvPr>
@@ -5322,7 +5366,15 @@
               </a:r>
               <a:r>
                 <a:rPr lang="en-US" dirty="0" smtClean="0"/>
-                <a:t>Stop, 4 K</a:t>
+                <a:t>Stop, </a:t>
+              </a:r>
+              <a:r>
+                <a:rPr lang="en-US" dirty="0" smtClean="0"/>
+                <a:t>6 </a:t>
+              </a:r>
+              <a:r>
+                <a:rPr lang="en-US" dirty="0" smtClean="0"/>
+                <a:t>K</a:t>
               </a:r>
               <a:endParaRPr lang="en-US" dirty="0"/>
             </a:p>
@@ -5333,7 +5385,7 @@
             <p:cNvPr id="36" name="Straight Arrow Connector 35">
               <a:extLst>
                 <a:ext uri="{FF2B5EF4-FFF2-40B4-BE49-F238E27FC236}">
-                  <a16:creationId xmlns="" xmlns:a16="http://schemas.microsoft.com/office/drawing/2014/main" id="{CB89DCB6-D9C8-BF44-AF0D-8A829FF9C9EC}"/>
+                  <a16:creationId xmlns:a16="http://schemas.microsoft.com/office/drawing/2014/main" xmlns="" id="{CB89DCB6-D9C8-BF44-AF0D-8A829FF9C9EC}"/>
                 </a:ext>
               </a:extLst>
             </p:cNvPr>
@@ -5378,7 +5430,7 @@
             <p:cNvPr id="37" name="TextBox 36">
               <a:extLst>
                 <a:ext uri="{FF2B5EF4-FFF2-40B4-BE49-F238E27FC236}">
-                  <a16:creationId xmlns="" xmlns:a16="http://schemas.microsoft.com/office/drawing/2014/main" id="{E4756D17-1F3F-E64B-AB67-230A59782D9A}"/>
+                  <a16:creationId xmlns:a16="http://schemas.microsoft.com/office/drawing/2014/main" xmlns="" id="{E4756D17-1F3F-E64B-AB67-230A59782D9A}"/>
                 </a:ext>
               </a:extLst>
             </p:cNvPr>
@@ -5409,7 +5461,15 @@
               <a:pPr algn="ctr"/>
               <a:r>
                 <a:rPr lang="en-US" dirty="0" smtClean="0"/>
-                <a:t>Optics Box, 4 K</a:t>
+                <a:t>Optics Box, </a:t>
+              </a:r>
+              <a:r>
+                <a:rPr lang="en-US" dirty="0" smtClean="0"/>
+                <a:t>6 </a:t>
+              </a:r>
+              <a:r>
+                <a:rPr lang="en-US" dirty="0" smtClean="0"/>
+                <a:t>K</a:t>
               </a:r>
               <a:endParaRPr lang="en-US" dirty="0"/>
             </a:p>
@@ -5420,7 +5480,7 @@
             <p:cNvPr id="17" name="Straight Arrow Connector 16">
               <a:extLst>
                 <a:ext uri="{FF2B5EF4-FFF2-40B4-BE49-F238E27FC236}">
-                  <a16:creationId xmlns="" xmlns:a16="http://schemas.microsoft.com/office/drawing/2014/main" id="{5E5BCC3D-0641-9940-9C9F-B07FE0D1B902}"/>
+                  <a16:creationId xmlns:a16="http://schemas.microsoft.com/office/drawing/2014/main" xmlns="" id="{5E5BCC3D-0641-9940-9C9F-B07FE0D1B902}"/>
                 </a:ext>
               </a:extLst>
             </p:cNvPr>
@@ -5465,7 +5525,7 @@
             <p:cNvPr id="18" name="TextBox 17">
               <a:extLst>
                 <a:ext uri="{FF2B5EF4-FFF2-40B4-BE49-F238E27FC236}">
-                  <a16:creationId xmlns="" xmlns:a16="http://schemas.microsoft.com/office/drawing/2014/main" id="{E9AFA60E-8F2C-1E45-BBEB-604E2B535E5F}"/>
+                  <a16:creationId xmlns:a16="http://schemas.microsoft.com/office/drawing/2014/main" xmlns="" id="{E9AFA60E-8F2C-1E45-BBEB-604E2B535E5F}"/>
                 </a:ext>
               </a:extLst>
             </p:cNvPr>
@@ -5596,7 +5656,7 @@
           <p:cNvPr id="5" name="TextBox 4">
             <a:extLst>
               <a:ext uri="{FF2B5EF4-FFF2-40B4-BE49-F238E27FC236}">
-                <a16:creationId xmlns="" xmlns:a16="http://schemas.microsoft.com/office/drawing/2014/main" id="{59926AD0-851B-CB41-A4FC-69794C44B8BD}"/>
+                <a16:creationId xmlns:a16="http://schemas.microsoft.com/office/drawing/2014/main" xmlns="" id="{59926AD0-851B-CB41-A4FC-69794C44B8BD}"/>
               </a:ext>
             </a:extLst>
           </p:cNvPr>
@@ -6080,7 +6140,7 @@
   <a:extraClrSchemeLst/>
   <a:extLst>
     <a:ext uri="{05A4C25C-085E-4340-85A3-A5531E510DB2}">
-      <thm15:themeFamily xmlns="" xmlns:thm15="http://schemas.microsoft.com/office/thememl/2012/main" name="Office Theme" id="{62F939B6-93AF-4DB8-9C6B-D6C7DFDC589F}" vid="{4A3C46E8-61CC-4603-A589-7422A47A8E4A}"/>
+      <thm15:themeFamily xmlns:thm15="http://schemas.microsoft.com/office/thememl/2012/main" xmlns="" name="Office Theme" id="{62F939B6-93AF-4DB8-9C6B-D6C7DFDC589F}" vid="{4A3C46E8-61CC-4603-A589-7422A47A8E4A}"/>
     </a:ext>
   </a:extLst>
 </a:theme>
@@ -6375,7 +6435,7 @@
   <a:extraClrSchemeLst/>
   <a:extLst>
     <a:ext uri="{05A4C25C-085E-4340-85A3-A5531E510DB2}">
-      <thm15:themeFamily xmlns="" xmlns:thm15="http://schemas.microsoft.com/office/thememl/2012/main" name="Office Theme" id="{62F939B6-93AF-4DB8-9C6B-D6C7DFDC589F}" vid="{4A3C46E8-61CC-4603-A589-7422A47A8E4A}"/>
+      <thm15:themeFamily xmlns:thm15="http://schemas.microsoft.com/office/thememl/2012/main" xmlns="" name="Office Theme" id="{62F939B6-93AF-4DB8-9C6B-D6C7DFDC589F}" vid="{4A3C46E8-61CC-4603-A589-7422A47A8E4A}"/>
     </a:ext>
   </a:extLst>
 </a:theme>

</xml_diff>

<commit_message>
paper edits, responding to Shaul
</commit_message>
<xml_diff>
--- a/editing_images/PICO_CAD_annotated.pptx
+++ b/editing_images/PICO_CAD_annotated.pptx
@@ -199,7 +199,7 @@
           <a:p>
             <a:fld id="{15E540B6-5492-5F45-8A4D-C94C54089F3B}" type="datetimeFigureOut">
               <a:rPr lang="en-US" smtClean="0"/>
-              <a:t>5/17/2018</a:t>
+              <a:t>6/3/2018</a:t>
             </a:fld>
             <a:endParaRPr lang="en-US"/>
           </a:p>
@@ -703,7 +703,7 @@
           <a:p>
             <a:fld id="{78B47234-53AC-8043-A516-617C886D296F}" type="datetimeFigureOut">
               <a:rPr lang="en-US" smtClean="0"/>
-              <a:t>5/17/2018</a:t>
+              <a:t>6/3/2018</a:t>
             </a:fld>
             <a:endParaRPr lang="en-US"/>
           </a:p>
@@ -901,7 +901,7 @@
           <a:p>
             <a:fld id="{78B47234-53AC-8043-A516-617C886D296F}" type="datetimeFigureOut">
               <a:rPr lang="en-US" smtClean="0"/>
-              <a:t>5/17/2018</a:t>
+              <a:t>6/3/2018</a:t>
             </a:fld>
             <a:endParaRPr lang="en-US"/>
           </a:p>
@@ -1109,7 +1109,7 @@
           <a:p>
             <a:fld id="{78B47234-53AC-8043-A516-617C886D296F}" type="datetimeFigureOut">
               <a:rPr lang="en-US" smtClean="0"/>
-              <a:t>5/17/2018</a:t>
+              <a:t>6/3/2018</a:t>
             </a:fld>
             <a:endParaRPr lang="en-US"/>
           </a:p>
@@ -1591,7 +1591,7 @@
           <a:p>
             <a:fld id="{78B47234-53AC-8043-A516-617C886D296F}" type="datetimeFigureOut">
               <a:rPr lang="en-US" smtClean="0"/>
-              <a:t>5/17/2018</a:t>
+              <a:t>6/3/2018</a:t>
             </a:fld>
             <a:endParaRPr lang="en-US"/>
           </a:p>
@@ -1866,7 +1866,7 @@
           <a:p>
             <a:fld id="{78B47234-53AC-8043-A516-617C886D296F}" type="datetimeFigureOut">
               <a:rPr lang="en-US" smtClean="0"/>
-              <a:t>5/17/2018</a:t>
+              <a:t>6/3/2018</a:t>
             </a:fld>
             <a:endParaRPr lang="en-US"/>
           </a:p>
@@ -2131,7 +2131,7 @@
           <a:p>
             <a:fld id="{78B47234-53AC-8043-A516-617C886D296F}" type="datetimeFigureOut">
               <a:rPr lang="en-US" smtClean="0"/>
-              <a:t>5/17/2018</a:t>
+              <a:t>6/3/2018</a:t>
             </a:fld>
             <a:endParaRPr lang="en-US"/>
           </a:p>
@@ -2543,7 +2543,7 @@
           <a:p>
             <a:fld id="{78B47234-53AC-8043-A516-617C886D296F}" type="datetimeFigureOut">
               <a:rPr lang="en-US" smtClean="0"/>
-              <a:t>5/17/2018</a:t>
+              <a:t>6/3/2018</a:t>
             </a:fld>
             <a:endParaRPr lang="en-US"/>
           </a:p>
@@ -2684,7 +2684,7 @@
           <a:p>
             <a:fld id="{78B47234-53AC-8043-A516-617C886D296F}" type="datetimeFigureOut">
               <a:rPr lang="en-US" smtClean="0"/>
-              <a:t>5/17/2018</a:t>
+              <a:t>6/3/2018</a:t>
             </a:fld>
             <a:endParaRPr lang="en-US"/>
           </a:p>
@@ -2797,7 +2797,7 @@
           <a:p>
             <a:fld id="{78B47234-53AC-8043-A516-617C886D296F}" type="datetimeFigureOut">
               <a:rPr lang="en-US" smtClean="0"/>
-              <a:t>5/17/2018</a:t>
+              <a:t>6/3/2018</a:t>
             </a:fld>
             <a:endParaRPr lang="en-US"/>
           </a:p>
@@ -3108,7 +3108,7 @@
           <a:p>
             <a:fld id="{78B47234-53AC-8043-A516-617C886D296F}" type="datetimeFigureOut">
               <a:rPr lang="en-US" smtClean="0"/>
-              <a:t>5/17/2018</a:t>
+              <a:t>6/3/2018</a:t>
             </a:fld>
             <a:endParaRPr lang="en-US"/>
           </a:p>
@@ -3396,7 +3396,7 @@
           <a:p>
             <a:fld id="{78B47234-53AC-8043-A516-617C886D296F}" type="datetimeFigureOut">
               <a:rPr lang="en-US" smtClean="0"/>
-              <a:t>5/17/2018</a:t>
+              <a:t>6/3/2018</a:t>
             </a:fld>
             <a:endParaRPr lang="en-US"/>
           </a:p>
@@ -3637,7 +3637,7 @@
           <a:p>
             <a:fld id="{78B47234-53AC-8043-A516-617C886D296F}" type="datetimeFigureOut">
               <a:rPr lang="en-US" smtClean="0"/>
-              <a:t>5/17/2018</a:t>
+              <a:t>6/3/2018</a:t>
             </a:fld>
             <a:endParaRPr lang="en-US"/>
           </a:p>
@@ -4377,15 +4377,7 @@
                 </a:r>
                 <a:r>
                   <a:rPr lang="en-US" dirty="0" smtClean="0"/>
-                  <a:t>Reflector, </a:t>
-                </a:r>
-                <a:r>
-                  <a:rPr lang="en-US" dirty="0" smtClean="0"/>
-                  <a:t>10 </a:t>
-                </a:r>
-                <a:r>
-                  <a:rPr lang="en-US" dirty="0" smtClean="0"/>
-                  <a:t>K</a:t>
+                  <a:t>Reflector, 10 K</a:t>
                 </a:r>
                 <a:endParaRPr lang="en-US" dirty="0"/>
               </a:p>
@@ -4431,15 +4423,7 @@
                 </a:r>
                 <a:r>
                   <a:rPr lang="en-US" dirty="0" smtClean="0"/>
-                  <a:t>Reflector, </a:t>
-                </a:r>
-                <a:r>
-                  <a:rPr lang="en-US" dirty="0" smtClean="0"/>
-                  <a:t>15 </a:t>
-                </a:r>
-                <a:r>
-                  <a:rPr lang="en-US" dirty="0" smtClean="0"/>
-                  <a:t>K</a:t>
+                  <a:t>Reflector, 15 K</a:t>
                 </a:r>
                 <a:endParaRPr lang="en-US" dirty="0"/>
               </a:p>
@@ -4576,15 +4560,7 @@
                 </a:r>
                 <a:r>
                   <a:rPr lang="en-US" dirty="0" smtClean="0"/>
-                  <a:t>Stop, </a:t>
-                </a:r>
-                <a:r>
-                  <a:rPr lang="en-US" dirty="0" smtClean="0"/>
-                  <a:t>6 </a:t>
-                </a:r>
-                <a:r>
-                  <a:rPr lang="en-US" dirty="0" smtClean="0"/>
-                  <a:t>K</a:t>
+                  <a:t>Stop, 6 K</a:t>
                 </a:r>
                 <a:endParaRPr lang="en-US" dirty="0"/>
               </a:p>
@@ -4724,11 +4700,7 @@
                 </a:r>
                 <a:r>
                   <a:rPr lang="en-US" dirty="0" smtClean="0"/>
-                  <a:t> </a:t>
-                </a:r>
-                <a:r>
-                  <a:rPr lang="en-US" dirty="0" smtClean="0"/>
-                  <a:t>K</a:t>
+                  <a:t> K</a:t>
                 </a:r>
                 <a:endParaRPr lang="en-US" dirty="0"/>
               </a:p>
@@ -5167,15 +5139,7 @@
               </a:r>
               <a:r>
                 <a:rPr lang="en-US" dirty="0" smtClean="0"/>
-                <a:t>Reflector, </a:t>
-              </a:r>
-              <a:r>
-                <a:rPr lang="en-US" dirty="0" smtClean="0"/>
-                <a:t>10 </a:t>
-              </a:r>
-              <a:r>
-                <a:rPr lang="en-US" dirty="0" smtClean="0"/>
-                <a:t>K</a:t>
+                <a:t>Reflector, 10 K</a:t>
               </a:r>
               <a:endParaRPr lang="en-US" dirty="0"/>
             </a:p>
@@ -5221,11 +5185,11 @@
               </a:r>
               <a:r>
                 <a:rPr lang="en-US" dirty="0" smtClean="0"/>
-                <a:t>Reflector, </a:t>
+                <a:t>Reflector</a:t>
               </a:r>
               <a:r>
-                <a:rPr lang="en-US" dirty="0" smtClean="0"/>
-                <a:t>15 </a:t>
+                <a:rPr lang="en-US" smtClean="0"/>
+                <a:t>, 17 </a:t>
               </a:r>
               <a:r>
                 <a:rPr lang="en-US" dirty="0" smtClean="0"/>
@@ -5366,15 +5330,7 @@
               </a:r>
               <a:r>
                 <a:rPr lang="en-US" dirty="0" smtClean="0"/>
-                <a:t>Stop, </a:t>
-              </a:r>
-              <a:r>
-                <a:rPr lang="en-US" dirty="0" smtClean="0"/>
-                <a:t>6 </a:t>
-              </a:r>
-              <a:r>
-                <a:rPr lang="en-US" dirty="0" smtClean="0"/>
-                <a:t>K</a:t>
+                <a:t>Stop, 6 K</a:t>
               </a:r>
               <a:endParaRPr lang="en-US" dirty="0"/>
             </a:p>
@@ -5461,15 +5417,7 @@
               <a:pPr algn="ctr"/>
               <a:r>
                 <a:rPr lang="en-US" dirty="0" smtClean="0"/>
-                <a:t>Optics Box, </a:t>
-              </a:r>
-              <a:r>
-                <a:rPr lang="en-US" dirty="0" smtClean="0"/>
-                <a:t>6 </a:t>
-              </a:r>
-              <a:r>
-                <a:rPr lang="en-US" dirty="0" smtClean="0"/>
-                <a:t>K</a:t>
+                <a:t>Optics Box, 6 K</a:t>
               </a:r>
               <a:endParaRPr lang="en-US" dirty="0"/>
             </a:p>
@@ -5563,6 +5511,136 @@
           </p:txBody>
         </p:sp>
       </p:grpSp>
+      <p:cxnSp>
+        <p:nvCxnSpPr>
+          <p:cNvPr id="19" name="Straight Arrow Connector 18">
+            <a:extLst>
+              <a:ext uri="{FF2B5EF4-FFF2-40B4-BE49-F238E27FC236}">
+                <a16:creationId xmlns:a16="http://schemas.microsoft.com/office/drawing/2014/main" xmlns="" id="{CB89DCB6-D9C8-BF44-AF0D-8A829FF9C9EC}"/>
+              </a:ext>
+            </a:extLst>
+          </p:cNvPr>
+          <p:cNvCxnSpPr>
+            <a:cxnSpLocks/>
+          </p:cNvCxnSpPr>
+          <p:nvPr/>
+        </p:nvCxnSpPr>
+        <p:spPr>
+          <a:xfrm rot="6180000">
+            <a:off x="724253" y="6174686"/>
+            <a:ext cx="711725" cy="206950"/>
+          </a:xfrm>
+          <a:prstGeom prst="straightConnector1">
+            <a:avLst/>
+          </a:prstGeom>
+          <a:ln w="28575">
+            <a:solidFill>
+              <a:srgbClr val="FFC000"/>
+            </a:solidFill>
+            <a:tailEnd type="triangle" w="lg" len="lg"/>
+          </a:ln>
+        </p:spPr>
+        <p:style>
+          <a:lnRef idx="1">
+            <a:schemeClr val="accent1"/>
+          </a:lnRef>
+          <a:fillRef idx="0">
+            <a:schemeClr val="accent1"/>
+          </a:fillRef>
+          <a:effectRef idx="0">
+            <a:schemeClr val="accent1"/>
+          </a:effectRef>
+          <a:fontRef idx="minor">
+            <a:schemeClr val="tx1"/>
+          </a:fontRef>
+        </p:style>
+      </p:cxnSp>
+      <p:cxnSp>
+        <p:nvCxnSpPr>
+          <p:cNvPr id="20" name="Straight Arrow Connector 19">
+            <a:extLst>
+              <a:ext uri="{FF2B5EF4-FFF2-40B4-BE49-F238E27FC236}">
+                <a16:creationId xmlns:a16="http://schemas.microsoft.com/office/drawing/2014/main" xmlns="" id="{CB89DCB6-D9C8-BF44-AF0D-8A829FF9C9EC}"/>
+              </a:ext>
+            </a:extLst>
+          </p:cNvPr>
+          <p:cNvCxnSpPr>
+            <a:cxnSpLocks/>
+          </p:cNvCxnSpPr>
+          <p:nvPr/>
+        </p:nvCxnSpPr>
+        <p:spPr>
+          <a:xfrm rot="2640000">
+            <a:off x="7079552" y="6114341"/>
+            <a:ext cx="711725" cy="206950"/>
+          </a:xfrm>
+          <a:prstGeom prst="straightConnector1">
+            <a:avLst/>
+          </a:prstGeom>
+          <a:ln w="28575">
+            <a:solidFill>
+              <a:srgbClr val="FFC000"/>
+            </a:solidFill>
+            <a:tailEnd type="triangle" w="lg" len="lg"/>
+          </a:ln>
+        </p:spPr>
+        <p:style>
+          <a:lnRef idx="1">
+            <a:schemeClr val="accent1"/>
+          </a:lnRef>
+          <a:fillRef idx="0">
+            <a:schemeClr val="accent1"/>
+          </a:fillRef>
+          <a:effectRef idx="0">
+            <a:schemeClr val="accent1"/>
+          </a:effectRef>
+          <a:fontRef idx="minor">
+            <a:schemeClr val="tx1"/>
+          </a:fontRef>
+        </p:style>
+      </p:cxnSp>
+      <p:sp>
+        <p:nvSpPr>
+          <p:cNvPr id="2" name="TextBox 1"/>
+          <p:cNvSpPr txBox="1"/>
+          <p:nvPr/>
+        </p:nvSpPr>
+        <p:spPr>
+          <a:xfrm>
+            <a:off x="617412" y="5541108"/>
+            <a:ext cx="1101969" cy="369332"/>
+          </a:xfrm>
+          <a:prstGeom prst="rect">
+            <a:avLst/>
+          </a:prstGeom>
+          <a:noFill/>
+          <a:ln>
+            <a:noFill/>
+          </a:ln>
+        </p:spPr>
+        <p:txBody>
+          <a:bodyPr wrap="square" rtlCol="0">
+            <a:spAutoFit/>
+          </a:bodyPr>
+          <a:lstStyle/>
+          <a:p>
+            <a:pPr algn="ctr"/>
+            <a:r>
+              <a:rPr lang="en-US" b="1" dirty="0" smtClean="0">
+                <a:solidFill>
+                  <a:srgbClr val="FFC000"/>
+                </a:solidFill>
+              </a:rPr>
+              <a:t>Sun</a:t>
+            </a:r>
+            <a:endParaRPr lang="en-US" b="1" dirty="0">
+              <a:solidFill>
+                <a:srgbClr val="FFC000"/>
+              </a:solidFill>
+            </a:endParaRPr>
+          </a:p>
+        </p:txBody>
+      </p:sp>
     </p:spTree>
     <p:extLst>
       <p:ext uri="{BB962C8B-B14F-4D97-AF65-F5344CB8AC3E}">

</xml_diff>

<commit_message>
new PICO CAD ppt
</commit_message>
<xml_diff>
--- a/editing_images/PICO_CAD_annotated.pptx
+++ b/editing_images/PICO_CAD_annotated.pptx
@@ -111,7 +111,7 @@
   </p:defaultTextStyle>
   <p:extLst>
     <p:ext uri="{EFAFB233-063F-42B5-8137-9DF3F51BA10A}">
-      <p15:sldGuideLst xmlns="" xmlns:p15="http://schemas.microsoft.com/office/powerpoint/2012/main"/>
+      <p15:sldGuideLst xmlns:p15="http://schemas.microsoft.com/office/powerpoint/2012/main" xmlns=""/>
     </p:ext>
   </p:extLst>
 </p:presentation>
@@ -199,7 +199,7 @@
           <a:p>
             <a:fld id="{15E540B6-5492-5F45-8A4D-C94C54089F3B}" type="datetimeFigureOut">
               <a:rPr lang="en-US" smtClean="0"/>
-              <a:t>7/14/2018</a:t>
+              <a:t>7/15/18</a:t>
             </a:fld>
             <a:endParaRPr lang="en-US"/>
           </a:p>
@@ -578,7 +578,7 @@
           <p:cNvPr id="2" name="Title 1">
             <a:extLst>
               <a:ext uri="{FF2B5EF4-FFF2-40B4-BE49-F238E27FC236}">
-                <a16:creationId xmlns="" xmlns:a16="http://schemas.microsoft.com/office/drawing/2014/main" id="{7D26DE11-C2D0-A04D-AAA5-352E1CD3A5DF}"/>
+                <a16:creationId xmlns:a16="http://schemas.microsoft.com/office/drawing/2014/main" xmlns="" id="{7D26DE11-C2D0-A04D-AAA5-352E1CD3A5DF}"/>
               </a:ext>
             </a:extLst>
           </p:cNvPr>
@@ -615,7 +615,7 @@
           <p:cNvPr id="3" name="Subtitle 2">
             <a:extLst>
               <a:ext uri="{FF2B5EF4-FFF2-40B4-BE49-F238E27FC236}">
-                <a16:creationId xmlns="" xmlns:a16="http://schemas.microsoft.com/office/drawing/2014/main" id="{F98D45B8-F61C-4349-8A30-0459531132B0}"/>
+                <a16:creationId xmlns:a16="http://schemas.microsoft.com/office/drawing/2014/main" xmlns="" id="{F98D45B8-F61C-4349-8A30-0459531132B0}"/>
               </a:ext>
             </a:extLst>
           </p:cNvPr>
@@ -685,7 +685,7 @@
           <p:cNvPr id="4" name="Date Placeholder 3">
             <a:extLst>
               <a:ext uri="{FF2B5EF4-FFF2-40B4-BE49-F238E27FC236}">
-                <a16:creationId xmlns="" xmlns:a16="http://schemas.microsoft.com/office/drawing/2014/main" id="{E9EBFB5D-0D36-EC44-B943-38537D237438}"/>
+                <a16:creationId xmlns:a16="http://schemas.microsoft.com/office/drawing/2014/main" xmlns="" id="{E9EBFB5D-0D36-EC44-B943-38537D237438}"/>
               </a:ext>
             </a:extLst>
           </p:cNvPr>
@@ -703,7 +703,7 @@
           <a:p>
             <a:fld id="{78B47234-53AC-8043-A516-617C886D296F}" type="datetimeFigureOut">
               <a:rPr lang="en-US" smtClean="0"/>
-              <a:t>7/14/2018</a:t>
+              <a:t>7/15/18</a:t>
             </a:fld>
             <a:endParaRPr lang="en-US"/>
           </a:p>
@@ -714,7 +714,7 @@
           <p:cNvPr id="5" name="Footer Placeholder 4">
             <a:extLst>
               <a:ext uri="{FF2B5EF4-FFF2-40B4-BE49-F238E27FC236}">
-                <a16:creationId xmlns="" xmlns:a16="http://schemas.microsoft.com/office/drawing/2014/main" id="{7002E74C-A8AE-A048-9D29-50D6F4D9FC35}"/>
+                <a16:creationId xmlns:a16="http://schemas.microsoft.com/office/drawing/2014/main" xmlns="" id="{7002E74C-A8AE-A048-9D29-50D6F4D9FC35}"/>
               </a:ext>
             </a:extLst>
           </p:cNvPr>
@@ -739,7 +739,7 @@
           <p:cNvPr id="6" name="Slide Number Placeholder 5">
             <a:extLst>
               <a:ext uri="{FF2B5EF4-FFF2-40B4-BE49-F238E27FC236}">
-                <a16:creationId xmlns="" xmlns:a16="http://schemas.microsoft.com/office/drawing/2014/main" id="{7E84B2E6-2754-594B-AD4C-D84140FE4CCF}"/>
+                <a16:creationId xmlns:a16="http://schemas.microsoft.com/office/drawing/2014/main" xmlns="" id="{7E84B2E6-2754-594B-AD4C-D84140FE4CCF}"/>
               </a:ext>
             </a:extLst>
           </p:cNvPr>
@@ -798,7 +798,7 @@
           <p:cNvPr id="2" name="Title 1">
             <a:extLst>
               <a:ext uri="{FF2B5EF4-FFF2-40B4-BE49-F238E27FC236}">
-                <a16:creationId xmlns="" xmlns:a16="http://schemas.microsoft.com/office/drawing/2014/main" id="{DDB358CB-6BB5-D045-9867-D8C1F8C298A8}"/>
+                <a16:creationId xmlns:a16="http://schemas.microsoft.com/office/drawing/2014/main" xmlns="" id="{DDB358CB-6BB5-D045-9867-D8C1F8C298A8}"/>
               </a:ext>
             </a:extLst>
           </p:cNvPr>
@@ -826,7 +826,7 @@
           <p:cNvPr id="3" name="Vertical Text Placeholder 2">
             <a:extLst>
               <a:ext uri="{FF2B5EF4-FFF2-40B4-BE49-F238E27FC236}">
-                <a16:creationId xmlns="" xmlns:a16="http://schemas.microsoft.com/office/drawing/2014/main" id="{F287ED2E-22D9-2342-839E-400CEEFA5E40}"/>
+                <a16:creationId xmlns:a16="http://schemas.microsoft.com/office/drawing/2014/main" xmlns="" id="{F287ED2E-22D9-2342-839E-400CEEFA5E40}"/>
               </a:ext>
             </a:extLst>
           </p:cNvPr>
@@ -883,7 +883,7 @@
           <p:cNvPr id="4" name="Date Placeholder 3">
             <a:extLst>
               <a:ext uri="{FF2B5EF4-FFF2-40B4-BE49-F238E27FC236}">
-                <a16:creationId xmlns="" xmlns:a16="http://schemas.microsoft.com/office/drawing/2014/main" id="{1102A507-34CB-5D4C-90AD-DD1C5A77CA5B}"/>
+                <a16:creationId xmlns:a16="http://schemas.microsoft.com/office/drawing/2014/main" xmlns="" id="{1102A507-34CB-5D4C-90AD-DD1C5A77CA5B}"/>
               </a:ext>
             </a:extLst>
           </p:cNvPr>
@@ -901,7 +901,7 @@
           <a:p>
             <a:fld id="{78B47234-53AC-8043-A516-617C886D296F}" type="datetimeFigureOut">
               <a:rPr lang="en-US" smtClean="0"/>
-              <a:t>7/14/2018</a:t>
+              <a:t>7/15/18</a:t>
             </a:fld>
             <a:endParaRPr lang="en-US"/>
           </a:p>
@@ -912,7 +912,7 @@
           <p:cNvPr id="5" name="Footer Placeholder 4">
             <a:extLst>
               <a:ext uri="{FF2B5EF4-FFF2-40B4-BE49-F238E27FC236}">
-                <a16:creationId xmlns="" xmlns:a16="http://schemas.microsoft.com/office/drawing/2014/main" id="{6432A15C-7EE9-D94C-AD78-2FDA2DC9941D}"/>
+                <a16:creationId xmlns:a16="http://schemas.microsoft.com/office/drawing/2014/main" xmlns="" id="{6432A15C-7EE9-D94C-AD78-2FDA2DC9941D}"/>
               </a:ext>
             </a:extLst>
           </p:cNvPr>
@@ -937,7 +937,7 @@
           <p:cNvPr id="6" name="Slide Number Placeholder 5">
             <a:extLst>
               <a:ext uri="{FF2B5EF4-FFF2-40B4-BE49-F238E27FC236}">
-                <a16:creationId xmlns="" xmlns:a16="http://schemas.microsoft.com/office/drawing/2014/main" id="{99B6AF9E-504B-D043-97E6-6F7247C09234}"/>
+                <a16:creationId xmlns:a16="http://schemas.microsoft.com/office/drawing/2014/main" xmlns="" id="{99B6AF9E-504B-D043-97E6-6F7247C09234}"/>
               </a:ext>
             </a:extLst>
           </p:cNvPr>
@@ -996,7 +996,7 @@
           <p:cNvPr id="2" name="Vertical Title 1">
             <a:extLst>
               <a:ext uri="{FF2B5EF4-FFF2-40B4-BE49-F238E27FC236}">
-                <a16:creationId xmlns="" xmlns:a16="http://schemas.microsoft.com/office/drawing/2014/main" id="{04087C88-5CFE-514D-87A9-9352D53E3810}"/>
+                <a16:creationId xmlns:a16="http://schemas.microsoft.com/office/drawing/2014/main" xmlns="" id="{04087C88-5CFE-514D-87A9-9352D53E3810}"/>
               </a:ext>
             </a:extLst>
           </p:cNvPr>
@@ -1029,7 +1029,7 @@
           <p:cNvPr id="3" name="Vertical Text Placeholder 2">
             <a:extLst>
               <a:ext uri="{FF2B5EF4-FFF2-40B4-BE49-F238E27FC236}">
-                <a16:creationId xmlns="" xmlns:a16="http://schemas.microsoft.com/office/drawing/2014/main" id="{D9658494-9713-F545-AA57-A055A6FFF5A2}"/>
+                <a16:creationId xmlns:a16="http://schemas.microsoft.com/office/drawing/2014/main" xmlns="" id="{D9658494-9713-F545-AA57-A055A6FFF5A2}"/>
               </a:ext>
             </a:extLst>
           </p:cNvPr>
@@ -1091,7 +1091,7 @@
           <p:cNvPr id="4" name="Date Placeholder 3">
             <a:extLst>
               <a:ext uri="{FF2B5EF4-FFF2-40B4-BE49-F238E27FC236}">
-                <a16:creationId xmlns="" xmlns:a16="http://schemas.microsoft.com/office/drawing/2014/main" id="{22EA964D-F634-E444-82F7-49D55FF0EFFB}"/>
+                <a16:creationId xmlns:a16="http://schemas.microsoft.com/office/drawing/2014/main" xmlns="" id="{22EA964D-F634-E444-82F7-49D55FF0EFFB}"/>
               </a:ext>
             </a:extLst>
           </p:cNvPr>
@@ -1109,7 +1109,7 @@
           <a:p>
             <a:fld id="{78B47234-53AC-8043-A516-617C886D296F}" type="datetimeFigureOut">
               <a:rPr lang="en-US" smtClean="0"/>
-              <a:t>7/14/2018</a:t>
+              <a:t>7/15/18</a:t>
             </a:fld>
             <a:endParaRPr lang="en-US"/>
           </a:p>
@@ -1120,7 +1120,7 @@
           <p:cNvPr id="5" name="Footer Placeholder 4">
             <a:extLst>
               <a:ext uri="{FF2B5EF4-FFF2-40B4-BE49-F238E27FC236}">
-                <a16:creationId xmlns="" xmlns:a16="http://schemas.microsoft.com/office/drawing/2014/main" id="{BB75E0F3-ECBD-5F41-B349-40597982E274}"/>
+                <a16:creationId xmlns:a16="http://schemas.microsoft.com/office/drawing/2014/main" xmlns="" id="{BB75E0F3-ECBD-5F41-B349-40597982E274}"/>
               </a:ext>
             </a:extLst>
           </p:cNvPr>
@@ -1145,7 +1145,7 @@
           <p:cNvPr id="6" name="Slide Number Placeholder 5">
             <a:extLst>
               <a:ext uri="{FF2B5EF4-FFF2-40B4-BE49-F238E27FC236}">
-                <a16:creationId xmlns="" xmlns:a16="http://schemas.microsoft.com/office/drawing/2014/main" id="{0DF2161A-FD23-F846-BCD1-A610E2003671}"/>
+                <a16:creationId xmlns:a16="http://schemas.microsoft.com/office/drawing/2014/main" xmlns="" id="{0DF2161A-FD23-F846-BCD1-A610E2003671}"/>
               </a:ext>
             </a:extLst>
           </p:cNvPr>
@@ -1488,7 +1488,7 @@
           <p:cNvPr id="2" name="Title 1">
             <a:extLst>
               <a:ext uri="{FF2B5EF4-FFF2-40B4-BE49-F238E27FC236}">
-                <a16:creationId xmlns="" xmlns:a16="http://schemas.microsoft.com/office/drawing/2014/main" id="{72223BF0-B6D5-FC40-A508-79C964192ADF}"/>
+                <a16:creationId xmlns:a16="http://schemas.microsoft.com/office/drawing/2014/main" xmlns="" id="{72223BF0-B6D5-FC40-A508-79C964192ADF}"/>
               </a:ext>
             </a:extLst>
           </p:cNvPr>
@@ -1516,7 +1516,7 @@
           <p:cNvPr id="3" name="Content Placeholder 2">
             <a:extLst>
               <a:ext uri="{FF2B5EF4-FFF2-40B4-BE49-F238E27FC236}">
-                <a16:creationId xmlns="" xmlns:a16="http://schemas.microsoft.com/office/drawing/2014/main" id="{E04DEF9F-3D52-EA42-A251-6BBC68CA2840}"/>
+                <a16:creationId xmlns:a16="http://schemas.microsoft.com/office/drawing/2014/main" xmlns="" id="{E04DEF9F-3D52-EA42-A251-6BBC68CA2840}"/>
               </a:ext>
             </a:extLst>
           </p:cNvPr>
@@ -1573,7 +1573,7 @@
           <p:cNvPr id="4" name="Date Placeholder 3">
             <a:extLst>
               <a:ext uri="{FF2B5EF4-FFF2-40B4-BE49-F238E27FC236}">
-                <a16:creationId xmlns="" xmlns:a16="http://schemas.microsoft.com/office/drawing/2014/main" id="{8CCF364C-9E01-AC4B-8956-A3CA7F933DC5}"/>
+                <a16:creationId xmlns:a16="http://schemas.microsoft.com/office/drawing/2014/main" xmlns="" id="{8CCF364C-9E01-AC4B-8956-A3CA7F933DC5}"/>
               </a:ext>
             </a:extLst>
           </p:cNvPr>
@@ -1591,7 +1591,7 @@
           <a:p>
             <a:fld id="{78B47234-53AC-8043-A516-617C886D296F}" type="datetimeFigureOut">
               <a:rPr lang="en-US" smtClean="0"/>
-              <a:t>7/14/2018</a:t>
+              <a:t>7/15/18</a:t>
             </a:fld>
             <a:endParaRPr lang="en-US"/>
           </a:p>
@@ -1602,7 +1602,7 @@
           <p:cNvPr id="5" name="Footer Placeholder 4">
             <a:extLst>
               <a:ext uri="{FF2B5EF4-FFF2-40B4-BE49-F238E27FC236}">
-                <a16:creationId xmlns="" xmlns:a16="http://schemas.microsoft.com/office/drawing/2014/main" id="{F9491D2F-6667-2045-B0E3-3B59533F60B8}"/>
+                <a16:creationId xmlns:a16="http://schemas.microsoft.com/office/drawing/2014/main" xmlns="" id="{F9491D2F-6667-2045-B0E3-3B59533F60B8}"/>
               </a:ext>
             </a:extLst>
           </p:cNvPr>
@@ -1627,7 +1627,7 @@
           <p:cNvPr id="6" name="Slide Number Placeholder 5">
             <a:extLst>
               <a:ext uri="{FF2B5EF4-FFF2-40B4-BE49-F238E27FC236}">
-                <a16:creationId xmlns="" xmlns:a16="http://schemas.microsoft.com/office/drawing/2014/main" id="{09C9B69E-23BA-C249-810D-D2E9E59ED31A}"/>
+                <a16:creationId xmlns:a16="http://schemas.microsoft.com/office/drawing/2014/main" xmlns="" id="{09C9B69E-23BA-C249-810D-D2E9E59ED31A}"/>
               </a:ext>
             </a:extLst>
           </p:cNvPr>
@@ -1686,7 +1686,7 @@
           <p:cNvPr id="2" name="Title 1">
             <a:extLst>
               <a:ext uri="{FF2B5EF4-FFF2-40B4-BE49-F238E27FC236}">
-                <a16:creationId xmlns="" xmlns:a16="http://schemas.microsoft.com/office/drawing/2014/main" id="{5B8B828C-D880-F249-BE16-570D9024F9B0}"/>
+                <a16:creationId xmlns:a16="http://schemas.microsoft.com/office/drawing/2014/main" xmlns="" id="{5B8B828C-D880-F249-BE16-570D9024F9B0}"/>
               </a:ext>
             </a:extLst>
           </p:cNvPr>
@@ -1723,7 +1723,7 @@
           <p:cNvPr id="3" name="Text Placeholder 2">
             <a:extLst>
               <a:ext uri="{FF2B5EF4-FFF2-40B4-BE49-F238E27FC236}">
-                <a16:creationId xmlns="" xmlns:a16="http://schemas.microsoft.com/office/drawing/2014/main" id="{4C7D967E-A3BC-704C-8BE0-47E50CF4A6D1}"/>
+                <a16:creationId xmlns:a16="http://schemas.microsoft.com/office/drawing/2014/main" xmlns="" id="{4C7D967E-A3BC-704C-8BE0-47E50CF4A6D1}"/>
               </a:ext>
             </a:extLst>
           </p:cNvPr>
@@ -1848,7 +1848,7 @@
           <p:cNvPr id="4" name="Date Placeholder 3">
             <a:extLst>
               <a:ext uri="{FF2B5EF4-FFF2-40B4-BE49-F238E27FC236}">
-                <a16:creationId xmlns="" xmlns:a16="http://schemas.microsoft.com/office/drawing/2014/main" id="{9CD24214-1CEB-924E-BA0F-678FDDC63234}"/>
+                <a16:creationId xmlns:a16="http://schemas.microsoft.com/office/drawing/2014/main" xmlns="" id="{9CD24214-1CEB-924E-BA0F-678FDDC63234}"/>
               </a:ext>
             </a:extLst>
           </p:cNvPr>
@@ -1866,7 +1866,7 @@
           <a:p>
             <a:fld id="{78B47234-53AC-8043-A516-617C886D296F}" type="datetimeFigureOut">
               <a:rPr lang="en-US" smtClean="0"/>
-              <a:t>7/14/2018</a:t>
+              <a:t>7/15/18</a:t>
             </a:fld>
             <a:endParaRPr lang="en-US"/>
           </a:p>
@@ -1877,7 +1877,7 @@
           <p:cNvPr id="5" name="Footer Placeholder 4">
             <a:extLst>
               <a:ext uri="{FF2B5EF4-FFF2-40B4-BE49-F238E27FC236}">
-                <a16:creationId xmlns="" xmlns:a16="http://schemas.microsoft.com/office/drawing/2014/main" id="{9C51C64C-C860-6642-B490-152F1A5D2DBB}"/>
+                <a16:creationId xmlns:a16="http://schemas.microsoft.com/office/drawing/2014/main" xmlns="" id="{9C51C64C-C860-6642-B490-152F1A5D2DBB}"/>
               </a:ext>
             </a:extLst>
           </p:cNvPr>
@@ -1902,7 +1902,7 @@
           <p:cNvPr id="6" name="Slide Number Placeholder 5">
             <a:extLst>
               <a:ext uri="{FF2B5EF4-FFF2-40B4-BE49-F238E27FC236}">
-                <a16:creationId xmlns="" xmlns:a16="http://schemas.microsoft.com/office/drawing/2014/main" id="{9D8E4ACB-F6AA-8D4F-827E-ED0A9BA97A20}"/>
+                <a16:creationId xmlns:a16="http://schemas.microsoft.com/office/drawing/2014/main" xmlns="" id="{9D8E4ACB-F6AA-8D4F-827E-ED0A9BA97A20}"/>
               </a:ext>
             </a:extLst>
           </p:cNvPr>
@@ -1961,7 +1961,7 @@
           <p:cNvPr id="2" name="Title 1">
             <a:extLst>
               <a:ext uri="{FF2B5EF4-FFF2-40B4-BE49-F238E27FC236}">
-                <a16:creationId xmlns="" xmlns:a16="http://schemas.microsoft.com/office/drawing/2014/main" id="{A04E8F34-342F-B24F-9215-4B63484C289F}"/>
+                <a16:creationId xmlns:a16="http://schemas.microsoft.com/office/drawing/2014/main" xmlns="" id="{A04E8F34-342F-B24F-9215-4B63484C289F}"/>
               </a:ext>
             </a:extLst>
           </p:cNvPr>
@@ -1989,7 +1989,7 @@
           <p:cNvPr id="3" name="Content Placeholder 2">
             <a:extLst>
               <a:ext uri="{FF2B5EF4-FFF2-40B4-BE49-F238E27FC236}">
-                <a16:creationId xmlns="" xmlns:a16="http://schemas.microsoft.com/office/drawing/2014/main" id="{211DE7C9-B278-8243-B037-39F354F55D5B}"/>
+                <a16:creationId xmlns:a16="http://schemas.microsoft.com/office/drawing/2014/main" xmlns="" id="{211DE7C9-B278-8243-B037-39F354F55D5B}"/>
               </a:ext>
             </a:extLst>
           </p:cNvPr>
@@ -2051,7 +2051,7 @@
           <p:cNvPr id="4" name="Content Placeholder 3">
             <a:extLst>
               <a:ext uri="{FF2B5EF4-FFF2-40B4-BE49-F238E27FC236}">
-                <a16:creationId xmlns="" xmlns:a16="http://schemas.microsoft.com/office/drawing/2014/main" id="{37612CA0-CF97-034C-BDBC-05D6E5D06ED7}"/>
+                <a16:creationId xmlns:a16="http://schemas.microsoft.com/office/drawing/2014/main" xmlns="" id="{37612CA0-CF97-034C-BDBC-05D6E5D06ED7}"/>
               </a:ext>
             </a:extLst>
           </p:cNvPr>
@@ -2113,7 +2113,7 @@
           <p:cNvPr id="5" name="Date Placeholder 4">
             <a:extLst>
               <a:ext uri="{FF2B5EF4-FFF2-40B4-BE49-F238E27FC236}">
-                <a16:creationId xmlns="" xmlns:a16="http://schemas.microsoft.com/office/drawing/2014/main" id="{C7CC72AB-88BC-9440-A593-C5B2FD5D3089}"/>
+                <a16:creationId xmlns:a16="http://schemas.microsoft.com/office/drawing/2014/main" xmlns="" id="{C7CC72AB-88BC-9440-A593-C5B2FD5D3089}"/>
               </a:ext>
             </a:extLst>
           </p:cNvPr>
@@ -2131,7 +2131,7 @@
           <a:p>
             <a:fld id="{78B47234-53AC-8043-A516-617C886D296F}" type="datetimeFigureOut">
               <a:rPr lang="en-US" smtClean="0"/>
-              <a:t>7/14/2018</a:t>
+              <a:t>7/15/18</a:t>
             </a:fld>
             <a:endParaRPr lang="en-US"/>
           </a:p>
@@ -2142,7 +2142,7 @@
           <p:cNvPr id="6" name="Footer Placeholder 5">
             <a:extLst>
               <a:ext uri="{FF2B5EF4-FFF2-40B4-BE49-F238E27FC236}">
-                <a16:creationId xmlns="" xmlns:a16="http://schemas.microsoft.com/office/drawing/2014/main" id="{D576DC99-D148-A846-A641-77C6C6A9386A}"/>
+                <a16:creationId xmlns:a16="http://schemas.microsoft.com/office/drawing/2014/main" xmlns="" id="{D576DC99-D148-A846-A641-77C6C6A9386A}"/>
               </a:ext>
             </a:extLst>
           </p:cNvPr>
@@ -2167,7 +2167,7 @@
           <p:cNvPr id="7" name="Slide Number Placeholder 6">
             <a:extLst>
               <a:ext uri="{FF2B5EF4-FFF2-40B4-BE49-F238E27FC236}">
-                <a16:creationId xmlns="" xmlns:a16="http://schemas.microsoft.com/office/drawing/2014/main" id="{25271D62-6C05-E44F-9D92-80BC423C6E54}"/>
+                <a16:creationId xmlns:a16="http://schemas.microsoft.com/office/drawing/2014/main" xmlns="" id="{25271D62-6C05-E44F-9D92-80BC423C6E54}"/>
               </a:ext>
             </a:extLst>
           </p:cNvPr>
@@ -2226,7 +2226,7 @@
           <p:cNvPr id="2" name="Title 1">
             <a:extLst>
               <a:ext uri="{FF2B5EF4-FFF2-40B4-BE49-F238E27FC236}">
-                <a16:creationId xmlns="" xmlns:a16="http://schemas.microsoft.com/office/drawing/2014/main" id="{FEB2632A-9528-AD4A-97DD-D29E6A41B71E}"/>
+                <a16:creationId xmlns:a16="http://schemas.microsoft.com/office/drawing/2014/main" xmlns="" id="{FEB2632A-9528-AD4A-97DD-D29E6A41B71E}"/>
               </a:ext>
             </a:extLst>
           </p:cNvPr>
@@ -2259,7 +2259,7 @@
           <p:cNvPr id="3" name="Text Placeholder 2">
             <a:extLst>
               <a:ext uri="{FF2B5EF4-FFF2-40B4-BE49-F238E27FC236}">
-                <a16:creationId xmlns="" xmlns:a16="http://schemas.microsoft.com/office/drawing/2014/main" id="{2C87BFCF-EABB-594F-8195-CED98CDCACB2}"/>
+                <a16:creationId xmlns:a16="http://schemas.microsoft.com/office/drawing/2014/main" xmlns="" id="{2C87BFCF-EABB-594F-8195-CED98CDCACB2}"/>
               </a:ext>
             </a:extLst>
           </p:cNvPr>
@@ -2330,7 +2330,7 @@
           <p:cNvPr id="4" name="Content Placeholder 3">
             <a:extLst>
               <a:ext uri="{FF2B5EF4-FFF2-40B4-BE49-F238E27FC236}">
-                <a16:creationId xmlns="" xmlns:a16="http://schemas.microsoft.com/office/drawing/2014/main" id="{CCE2A19C-E5AE-2E44-A284-492D44FDCBE3}"/>
+                <a16:creationId xmlns:a16="http://schemas.microsoft.com/office/drawing/2014/main" xmlns="" id="{CCE2A19C-E5AE-2E44-A284-492D44FDCBE3}"/>
               </a:ext>
             </a:extLst>
           </p:cNvPr>
@@ -2392,7 +2392,7 @@
           <p:cNvPr id="5" name="Text Placeholder 4">
             <a:extLst>
               <a:ext uri="{FF2B5EF4-FFF2-40B4-BE49-F238E27FC236}">
-                <a16:creationId xmlns="" xmlns:a16="http://schemas.microsoft.com/office/drawing/2014/main" id="{27CD3272-96BA-2B40-9FD6-4DEAF845E9BF}"/>
+                <a16:creationId xmlns:a16="http://schemas.microsoft.com/office/drawing/2014/main" xmlns="" id="{27CD3272-96BA-2B40-9FD6-4DEAF845E9BF}"/>
               </a:ext>
             </a:extLst>
           </p:cNvPr>
@@ -2463,7 +2463,7 @@
           <p:cNvPr id="6" name="Content Placeholder 5">
             <a:extLst>
               <a:ext uri="{FF2B5EF4-FFF2-40B4-BE49-F238E27FC236}">
-                <a16:creationId xmlns="" xmlns:a16="http://schemas.microsoft.com/office/drawing/2014/main" id="{C3D4691F-CD87-774F-9D27-562FF4234DAE}"/>
+                <a16:creationId xmlns:a16="http://schemas.microsoft.com/office/drawing/2014/main" xmlns="" id="{C3D4691F-CD87-774F-9D27-562FF4234DAE}"/>
               </a:ext>
             </a:extLst>
           </p:cNvPr>
@@ -2525,7 +2525,7 @@
           <p:cNvPr id="7" name="Date Placeholder 6">
             <a:extLst>
               <a:ext uri="{FF2B5EF4-FFF2-40B4-BE49-F238E27FC236}">
-                <a16:creationId xmlns="" xmlns:a16="http://schemas.microsoft.com/office/drawing/2014/main" id="{066E261A-BC8C-9949-8DC7-FF512E3047E3}"/>
+                <a16:creationId xmlns:a16="http://schemas.microsoft.com/office/drawing/2014/main" xmlns="" id="{066E261A-BC8C-9949-8DC7-FF512E3047E3}"/>
               </a:ext>
             </a:extLst>
           </p:cNvPr>
@@ -2543,7 +2543,7 @@
           <a:p>
             <a:fld id="{78B47234-53AC-8043-A516-617C886D296F}" type="datetimeFigureOut">
               <a:rPr lang="en-US" smtClean="0"/>
-              <a:t>7/14/2018</a:t>
+              <a:t>7/15/18</a:t>
             </a:fld>
             <a:endParaRPr lang="en-US"/>
           </a:p>
@@ -2554,7 +2554,7 @@
           <p:cNvPr id="8" name="Footer Placeholder 7">
             <a:extLst>
               <a:ext uri="{FF2B5EF4-FFF2-40B4-BE49-F238E27FC236}">
-                <a16:creationId xmlns="" xmlns:a16="http://schemas.microsoft.com/office/drawing/2014/main" id="{F634FFE3-D327-CF46-82F8-54436D3BD616}"/>
+                <a16:creationId xmlns:a16="http://schemas.microsoft.com/office/drawing/2014/main" xmlns="" id="{F634FFE3-D327-CF46-82F8-54436D3BD616}"/>
               </a:ext>
             </a:extLst>
           </p:cNvPr>
@@ -2579,7 +2579,7 @@
           <p:cNvPr id="9" name="Slide Number Placeholder 8">
             <a:extLst>
               <a:ext uri="{FF2B5EF4-FFF2-40B4-BE49-F238E27FC236}">
-                <a16:creationId xmlns="" xmlns:a16="http://schemas.microsoft.com/office/drawing/2014/main" id="{88CCD6E9-BDD1-A740-9E6B-61D9C14818B4}"/>
+                <a16:creationId xmlns:a16="http://schemas.microsoft.com/office/drawing/2014/main" xmlns="" id="{88CCD6E9-BDD1-A740-9E6B-61D9C14818B4}"/>
               </a:ext>
             </a:extLst>
           </p:cNvPr>
@@ -2638,7 +2638,7 @@
           <p:cNvPr id="2" name="Title 1">
             <a:extLst>
               <a:ext uri="{FF2B5EF4-FFF2-40B4-BE49-F238E27FC236}">
-                <a16:creationId xmlns="" xmlns:a16="http://schemas.microsoft.com/office/drawing/2014/main" id="{1A61B9ED-E5EE-FF44-9FAD-9C8F18497869}"/>
+                <a16:creationId xmlns:a16="http://schemas.microsoft.com/office/drawing/2014/main" xmlns="" id="{1A61B9ED-E5EE-FF44-9FAD-9C8F18497869}"/>
               </a:ext>
             </a:extLst>
           </p:cNvPr>
@@ -2666,7 +2666,7 @@
           <p:cNvPr id="3" name="Date Placeholder 2">
             <a:extLst>
               <a:ext uri="{FF2B5EF4-FFF2-40B4-BE49-F238E27FC236}">
-                <a16:creationId xmlns="" xmlns:a16="http://schemas.microsoft.com/office/drawing/2014/main" id="{D0697767-373A-8746-8C34-2819E756DB40}"/>
+                <a16:creationId xmlns:a16="http://schemas.microsoft.com/office/drawing/2014/main" xmlns="" id="{D0697767-373A-8746-8C34-2819E756DB40}"/>
               </a:ext>
             </a:extLst>
           </p:cNvPr>
@@ -2684,7 +2684,7 @@
           <a:p>
             <a:fld id="{78B47234-53AC-8043-A516-617C886D296F}" type="datetimeFigureOut">
               <a:rPr lang="en-US" smtClean="0"/>
-              <a:t>7/14/2018</a:t>
+              <a:t>7/15/18</a:t>
             </a:fld>
             <a:endParaRPr lang="en-US"/>
           </a:p>
@@ -2695,7 +2695,7 @@
           <p:cNvPr id="4" name="Footer Placeholder 3">
             <a:extLst>
               <a:ext uri="{FF2B5EF4-FFF2-40B4-BE49-F238E27FC236}">
-                <a16:creationId xmlns="" xmlns:a16="http://schemas.microsoft.com/office/drawing/2014/main" id="{510C92D9-5C9E-D944-A177-8B77A7A885E5}"/>
+                <a16:creationId xmlns:a16="http://schemas.microsoft.com/office/drawing/2014/main" xmlns="" id="{510C92D9-5C9E-D944-A177-8B77A7A885E5}"/>
               </a:ext>
             </a:extLst>
           </p:cNvPr>
@@ -2720,7 +2720,7 @@
           <p:cNvPr id="5" name="Slide Number Placeholder 4">
             <a:extLst>
               <a:ext uri="{FF2B5EF4-FFF2-40B4-BE49-F238E27FC236}">
-                <a16:creationId xmlns="" xmlns:a16="http://schemas.microsoft.com/office/drawing/2014/main" id="{01AD7849-60FD-254E-8FB7-49BDBC771602}"/>
+                <a16:creationId xmlns:a16="http://schemas.microsoft.com/office/drawing/2014/main" xmlns="" id="{01AD7849-60FD-254E-8FB7-49BDBC771602}"/>
               </a:ext>
             </a:extLst>
           </p:cNvPr>
@@ -2779,7 +2779,7 @@
           <p:cNvPr id="2" name="Date Placeholder 1">
             <a:extLst>
               <a:ext uri="{FF2B5EF4-FFF2-40B4-BE49-F238E27FC236}">
-                <a16:creationId xmlns="" xmlns:a16="http://schemas.microsoft.com/office/drawing/2014/main" id="{208D5D25-5BBB-1D43-B957-A648B6FCE440}"/>
+                <a16:creationId xmlns:a16="http://schemas.microsoft.com/office/drawing/2014/main" xmlns="" id="{208D5D25-5BBB-1D43-B957-A648B6FCE440}"/>
               </a:ext>
             </a:extLst>
           </p:cNvPr>
@@ -2797,7 +2797,7 @@
           <a:p>
             <a:fld id="{78B47234-53AC-8043-A516-617C886D296F}" type="datetimeFigureOut">
               <a:rPr lang="en-US" smtClean="0"/>
-              <a:t>7/14/2018</a:t>
+              <a:t>7/15/18</a:t>
             </a:fld>
             <a:endParaRPr lang="en-US"/>
           </a:p>
@@ -2808,7 +2808,7 @@
           <p:cNvPr id="3" name="Footer Placeholder 2">
             <a:extLst>
               <a:ext uri="{FF2B5EF4-FFF2-40B4-BE49-F238E27FC236}">
-                <a16:creationId xmlns="" xmlns:a16="http://schemas.microsoft.com/office/drawing/2014/main" id="{7310285F-9A07-5448-B8B6-34CB4A65BDB9}"/>
+                <a16:creationId xmlns:a16="http://schemas.microsoft.com/office/drawing/2014/main" xmlns="" id="{7310285F-9A07-5448-B8B6-34CB4A65BDB9}"/>
               </a:ext>
             </a:extLst>
           </p:cNvPr>
@@ -2833,7 +2833,7 @@
           <p:cNvPr id="4" name="Slide Number Placeholder 3">
             <a:extLst>
               <a:ext uri="{FF2B5EF4-FFF2-40B4-BE49-F238E27FC236}">
-                <a16:creationId xmlns="" xmlns:a16="http://schemas.microsoft.com/office/drawing/2014/main" id="{FBC69B27-BC7F-A94B-A487-83F9BEEB6D33}"/>
+                <a16:creationId xmlns:a16="http://schemas.microsoft.com/office/drawing/2014/main" xmlns="" id="{FBC69B27-BC7F-A94B-A487-83F9BEEB6D33}"/>
               </a:ext>
             </a:extLst>
           </p:cNvPr>
@@ -2892,7 +2892,7 @@
           <p:cNvPr id="2" name="Title 1">
             <a:extLst>
               <a:ext uri="{FF2B5EF4-FFF2-40B4-BE49-F238E27FC236}">
-                <a16:creationId xmlns="" xmlns:a16="http://schemas.microsoft.com/office/drawing/2014/main" id="{E338C7EC-EA5F-2F48-BBA4-5F5CB2725401}"/>
+                <a16:creationId xmlns:a16="http://schemas.microsoft.com/office/drawing/2014/main" xmlns="" id="{E338C7EC-EA5F-2F48-BBA4-5F5CB2725401}"/>
               </a:ext>
             </a:extLst>
           </p:cNvPr>
@@ -2929,7 +2929,7 @@
           <p:cNvPr id="3" name="Content Placeholder 2">
             <a:extLst>
               <a:ext uri="{FF2B5EF4-FFF2-40B4-BE49-F238E27FC236}">
-                <a16:creationId xmlns="" xmlns:a16="http://schemas.microsoft.com/office/drawing/2014/main" id="{49C82EEC-9455-274A-8AC0-6708B79C01A3}"/>
+                <a16:creationId xmlns:a16="http://schemas.microsoft.com/office/drawing/2014/main" xmlns="" id="{49C82EEC-9455-274A-8AC0-6708B79C01A3}"/>
               </a:ext>
             </a:extLst>
           </p:cNvPr>
@@ -3019,7 +3019,7 @@
           <p:cNvPr id="4" name="Text Placeholder 3">
             <a:extLst>
               <a:ext uri="{FF2B5EF4-FFF2-40B4-BE49-F238E27FC236}">
-                <a16:creationId xmlns="" xmlns:a16="http://schemas.microsoft.com/office/drawing/2014/main" id="{6A1CA6A7-37E1-6745-80FB-57BF13EAA4A9}"/>
+                <a16:creationId xmlns:a16="http://schemas.microsoft.com/office/drawing/2014/main" xmlns="" id="{6A1CA6A7-37E1-6745-80FB-57BF13EAA4A9}"/>
               </a:ext>
             </a:extLst>
           </p:cNvPr>
@@ -3090,7 +3090,7 @@
           <p:cNvPr id="5" name="Date Placeholder 4">
             <a:extLst>
               <a:ext uri="{FF2B5EF4-FFF2-40B4-BE49-F238E27FC236}">
-                <a16:creationId xmlns="" xmlns:a16="http://schemas.microsoft.com/office/drawing/2014/main" id="{4DB4A479-6736-C243-8DAD-312D47569788}"/>
+                <a16:creationId xmlns:a16="http://schemas.microsoft.com/office/drawing/2014/main" xmlns="" id="{4DB4A479-6736-C243-8DAD-312D47569788}"/>
               </a:ext>
             </a:extLst>
           </p:cNvPr>
@@ -3108,7 +3108,7 @@
           <a:p>
             <a:fld id="{78B47234-53AC-8043-A516-617C886D296F}" type="datetimeFigureOut">
               <a:rPr lang="en-US" smtClean="0"/>
-              <a:t>7/14/2018</a:t>
+              <a:t>7/15/18</a:t>
             </a:fld>
             <a:endParaRPr lang="en-US"/>
           </a:p>
@@ -3119,7 +3119,7 @@
           <p:cNvPr id="6" name="Footer Placeholder 5">
             <a:extLst>
               <a:ext uri="{FF2B5EF4-FFF2-40B4-BE49-F238E27FC236}">
-                <a16:creationId xmlns="" xmlns:a16="http://schemas.microsoft.com/office/drawing/2014/main" id="{FF664A04-96A0-E04F-8DB7-F0FE034DC578}"/>
+                <a16:creationId xmlns:a16="http://schemas.microsoft.com/office/drawing/2014/main" xmlns="" id="{FF664A04-96A0-E04F-8DB7-F0FE034DC578}"/>
               </a:ext>
             </a:extLst>
           </p:cNvPr>
@@ -3144,7 +3144,7 @@
           <p:cNvPr id="7" name="Slide Number Placeholder 6">
             <a:extLst>
               <a:ext uri="{FF2B5EF4-FFF2-40B4-BE49-F238E27FC236}">
-                <a16:creationId xmlns="" xmlns:a16="http://schemas.microsoft.com/office/drawing/2014/main" id="{DB92E314-6ADA-624D-8F8B-935A0C976A1B}"/>
+                <a16:creationId xmlns:a16="http://schemas.microsoft.com/office/drawing/2014/main" xmlns="" id="{DB92E314-6ADA-624D-8F8B-935A0C976A1B}"/>
               </a:ext>
             </a:extLst>
           </p:cNvPr>
@@ -3203,7 +3203,7 @@
           <p:cNvPr id="2" name="Title 1">
             <a:extLst>
               <a:ext uri="{FF2B5EF4-FFF2-40B4-BE49-F238E27FC236}">
-                <a16:creationId xmlns="" xmlns:a16="http://schemas.microsoft.com/office/drawing/2014/main" id="{C890D1E4-1EB2-B644-AB64-3E7CE9687CC8}"/>
+                <a16:creationId xmlns:a16="http://schemas.microsoft.com/office/drawing/2014/main" xmlns="" id="{C890D1E4-1EB2-B644-AB64-3E7CE9687CC8}"/>
               </a:ext>
             </a:extLst>
           </p:cNvPr>
@@ -3240,7 +3240,7 @@
           <p:cNvPr id="3" name="Picture Placeholder 2">
             <a:extLst>
               <a:ext uri="{FF2B5EF4-FFF2-40B4-BE49-F238E27FC236}">
-                <a16:creationId xmlns="" xmlns:a16="http://schemas.microsoft.com/office/drawing/2014/main" id="{53B71092-2B32-C742-A558-4F5FC6C3CEF8}"/>
+                <a16:creationId xmlns:a16="http://schemas.microsoft.com/office/drawing/2014/main" xmlns="" id="{53B71092-2B32-C742-A558-4F5FC6C3CEF8}"/>
               </a:ext>
             </a:extLst>
           </p:cNvPr>
@@ -3307,7 +3307,7 @@
           <p:cNvPr id="4" name="Text Placeholder 3">
             <a:extLst>
               <a:ext uri="{FF2B5EF4-FFF2-40B4-BE49-F238E27FC236}">
-                <a16:creationId xmlns="" xmlns:a16="http://schemas.microsoft.com/office/drawing/2014/main" id="{393E7232-314C-6A4E-A3B6-F7D0B784631A}"/>
+                <a16:creationId xmlns:a16="http://schemas.microsoft.com/office/drawing/2014/main" xmlns="" id="{393E7232-314C-6A4E-A3B6-F7D0B784631A}"/>
               </a:ext>
             </a:extLst>
           </p:cNvPr>
@@ -3378,7 +3378,7 @@
           <p:cNvPr id="5" name="Date Placeholder 4">
             <a:extLst>
               <a:ext uri="{FF2B5EF4-FFF2-40B4-BE49-F238E27FC236}">
-                <a16:creationId xmlns="" xmlns:a16="http://schemas.microsoft.com/office/drawing/2014/main" id="{5194B589-8520-9D46-AF98-3339E6B190CD}"/>
+                <a16:creationId xmlns:a16="http://schemas.microsoft.com/office/drawing/2014/main" xmlns="" id="{5194B589-8520-9D46-AF98-3339E6B190CD}"/>
               </a:ext>
             </a:extLst>
           </p:cNvPr>
@@ -3396,7 +3396,7 @@
           <a:p>
             <a:fld id="{78B47234-53AC-8043-A516-617C886D296F}" type="datetimeFigureOut">
               <a:rPr lang="en-US" smtClean="0"/>
-              <a:t>7/14/2018</a:t>
+              <a:t>7/15/18</a:t>
             </a:fld>
             <a:endParaRPr lang="en-US"/>
           </a:p>
@@ -3407,7 +3407,7 @@
           <p:cNvPr id="6" name="Footer Placeholder 5">
             <a:extLst>
               <a:ext uri="{FF2B5EF4-FFF2-40B4-BE49-F238E27FC236}">
-                <a16:creationId xmlns="" xmlns:a16="http://schemas.microsoft.com/office/drawing/2014/main" id="{F8F589D9-28F4-BB44-9A49-B477821FDA2E}"/>
+                <a16:creationId xmlns:a16="http://schemas.microsoft.com/office/drawing/2014/main" xmlns="" id="{F8F589D9-28F4-BB44-9A49-B477821FDA2E}"/>
               </a:ext>
             </a:extLst>
           </p:cNvPr>
@@ -3432,7 +3432,7 @@
           <p:cNvPr id="7" name="Slide Number Placeholder 6">
             <a:extLst>
               <a:ext uri="{FF2B5EF4-FFF2-40B4-BE49-F238E27FC236}">
-                <a16:creationId xmlns="" xmlns:a16="http://schemas.microsoft.com/office/drawing/2014/main" id="{AE0D1EF8-B587-AA40-8886-205AFAC5A93E}"/>
+                <a16:creationId xmlns:a16="http://schemas.microsoft.com/office/drawing/2014/main" xmlns="" id="{AE0D1EF8-B587-AA40-8886-205AFAC5A93E}"/>
               </a:ext>
             </a:extLst>
           </p:cNvPr>
@@ -3496,7 +3496,7 @@
           <p:cNvPr id="2" name="Title Placeholder 1">
             <a:extLst>
               <a:ext uri="{FF2B5EF4-FFF2-40B4-BE49-F238E27FC236}">
-                <a16:creationId xmlns="" xmlns:a16="http://schemas.microsoft.com/office/drawing/2014/main" id="{D2BE094A-6476-5F48-8E35-EE84223201CE}"/>
+                <a16:creationId xmlns:a16="http://schemas.microsoft.com/office/drawing/2014/main" xmlns="" id="{D2BE094A-6476-5F48-8E35-EE84223201CE}"/>
               </a:ext>
             </a:extLst>
           </p:cNvPr>
@@ -3534,7 +3534,7 @@
           <p:cNvPr id="3" name="Text Placeholder 2">
             <a:extLst>
               <a:ext uri="{FF2B5EF4-FFF2-40B4-BE49-F238E27FC236}">
-                <a16:creationId xmlns="" xmlns:a16="http://schemas.microsoft.com/office/drawing/2014/main" id="{5CFCC1FB-0387-A149-AD84-D2FB087FF41F}"/>
+                <a16:creationId xmlns:a16="http://schemas.microsoft.com/office/drawing/2014/main" xmlns="" id="{5CFCC1FB-0387-A149-AD84-D2FB087FF41F}"/>
               </a:ext>
             </a:extLst>
           </p:cNvPr>
@@ -3601,7 +3601,7 @@
           <p:cNvPr id="4" name="Date Placeholder 3">
             <a:extLst>
               <a:ext uri="{FF2B5EF4-FFF2-40B4-BE49-F238E27FC236}">
-                <a16:creationId xmlns="" xmlns:a16="http://schemas.microsoft.com/office/drawing/2014/main" id="{B24634F2-42F1-DD4F-947A-9674AD4FC865}"/>
+                <a16:creationId xmlns:a16="http://schemas.microsoft.com/office/drawing/2014/main" xmlns="" id="{B24634F2-42F1-DD4F-947A-9674AD4FC865}"/>
               </a:ext>
             </a:extLst>
           </p:cNvPr>
@@ -3637,7 +3637,7 @@
           <a:p>
             <a:fld id="{78B47234-53AC-8043-A516-617C886D296F}" type="datetimeFigureOut">
               <a:rPr lang="en-US" smtClean="0"/>
-              <a:t>7/14/2018</a:t>
+              <a:t>7/15/18</a:t>
             </a:fld>
             <a:endParaRPr lang="en-US"/>
           </a:p>
@@ -3648,7 +3648,7 @@
           <p:cNvPr id="5" name="Footer Placeholder 4">
             <a:extLst>
               <a:ext uri="{FF2B5EF4-FFF2-40B4-BE49-F238E27FC236}">
-                <a16:creationId xmlns="" xmlns:a16="http://schemas.microsoft.com/office/drawing/2014/main" id="{1F3B806D-A4D8-DF49-8359-8656490D6726}"/>
+                <a16:creationId xmlns:a16="http://schemas.microsoft.com/office/drawing/2014/main" xmlns="" id="{1F3B806D-A4D8-DF49-8359-8656490D6726}"/>
               </a:ext>
             </a:extLst>
           </p:cNvPr>
@@ -3691,7 +3691,7 @@
           <p:cNvPr id="6" name="Slide Number Placeholder 5">
             <a:extLst>
               <a:ext uri="{FF2B5EF4-FFF2-40B4-BE49-F238E27FC236}">
-                <a16:creationId xmlns="" xmlns:a16="http://schemas.microsoft.com/office/drawing/2014/main" id="{1C073CC9-A5AE-5649-8C77-6AB016C10589}"/>
+                <a16:creationId xmlns:a16="http://schemas.microsoft.com/office/drawing/2014/main" xmlns="" id="{1C073CC9-A5AE-5649-8C77-6AB016C10589}"/>
               </a:ext>
             </a:extLst>
           </p:cNvPr>
@@ -4088,7 +4088,7 @@
               <p:cNvPr id="24" name="Picture 23">
                 <a:extLst>
                   <a:ext uri="{FF2B5EF4-FFF2-40B4-BE49-F238E27FC236}">
-                    <a16:creationId xmlns="" xmlns:a16="http://schemas.microsoft.com/office/drawing/2014/main" id="{34E0CED9-750C-2D41-9BB7-17026667CCE9}"/>
+                    <a16:creationId xmlns:a16="http://schemas.microsoft.com/office/drawing/2014/main" xmlns="" id="{34E0CED9-750C-2D41-9BB7-17026667CCE9}"/>
                   </a:ext>
                 </a:extLst>
               </p:cNvPr>
@@ -4118,7 +4118,7 @@
               <p:cNvPr id="25" name="Straight Arrow Connector 24">
                 <a:extLst>
                   <a:ext uri="{FF2B5EF4-FFF2-40B4-BE49-F238E27FC236}">
-                    <a16:creationId xmlns="" xmlns:a16="http://schemas.microsoft.com/office/drawing/2014/main" id="{F27EDF7D-9821-124F-BFAC-296397795C0B}"/>
+                    <a16:creationId xmlns:a16="http://schemas.microsoft.com/office/drawing/2014/main" xmlns="" id="{F27EDF7D-9821-124F-BFAC-296397795C0B}"/>
                   </a:ext>
                 </a:extLst>
               </p:cNvPr>
@@ -4163,7 +4163,7 @@
               <p:cNvPr id="26" name="Straight Arrow Connector 25">
                 <a:extLst>
                   <a:ext uri="{FF2B5EF4-FFF2-40B4-BE49-F238E27FC236}">
-                    <a16:creationId xmlns="" xmlns:a16="http://schemas.microsoft.com/office/drawing/2014/main" id="{5FB60EE6-D5F0-CF4E-90B2-7E7F694AF255}"/>
+                    <a16:creationId xmlns:a16="http://schemas.microsoft.com/office/drawing/2014/main" xmlns="" id="{5FB60EE6-D5F0-CF4E-90B2-7E7F694AF255}"/>
                   </a:ext>
                 </a:extLst>
               </p:cNvPr>
@@ -4207,7 +4207,7 @@
               <p:cNvPr id="27" name="Straight Arrow Connector 26">
                 <a:extLst>
                   <a:ext uri="{FF2B5EF4-FFF2-40B4-BE49-F238E27FC236}">
-                    <a16:creationId xmlns="" xmlns:a16="http://schemas.microsoft.com/office/drawing/2014/main" id="{AD5AC55D-2189-FC44-A267-0F2F0D446C3C}"/>
+                    <a16:creationId xmlns:a16="http://schemas.microsoft.com/office/drawing/2014/main" xmlns="" id="{AD5AC55D-2189-FC44-A267-0F2F0D446C3C}"/>
                   </a:ext>
                 </a:extLst>
               </p:cNvPr>
@@ -4252,7 +4252,7 @@
               <p:cNvPr id="28" name="Straight Arrow Connector 27">
                 <a:extLst>
                   <a:ext uri="{FF2B5EF4-FFF2-40B4-BE49-F238E27FC236}">
-                    <a16:creationId xmlns="" xmlns:a16="http://schemas.microsoft.com/office/drawing/2014/main" id="{5E5BCC3D-0641-9940-9C9F-B07FE0D1B902}"/>
+                    <a16:creationId xmlns:a16="http://schemas.microsoft.com/office/drawing/2014/main" xmlns="" id="{5E5BCC3D-0641-9940-9C9F-B07FE0D1B902}"/>
                   </a:ext>
                 </a:extLst>
               </p:cNvPr>
@@ -4297,7 +4297,7 @@
               <p:cNvPr id="29" name="Straight Arrow Connector 28">
                 <a:extLst>
                   <a:ext uri="{FF2B5EF4-FFF2-40B4-BE49-F238E27FC236}">
-                    <a16:creationId xmlns="" xmlns:a16="http://schemas.microsoft.com/office/drawing/2014/main" id="{CB89DCB6-D9C8-BF44-AF0D-8A829FF9C9EC}"/>
+                    <a16:creationId xmlns:a16="http://schemas.microsoft.com/office/drawing/2014/main" xmlns="" id="{CB89DCB6-D9C8-BF44-AF0D-8A829FF9C9EC}"/>
                   </a:ext>
                 </a:extLst>
               </p:cNvPr>
@@ -4342,7 +4342,7 @@
               <p:cNvPr id="30" name="TextBox 29">
                 <a:extLst>
                   <a:ext uri="{FF2B5EF4-FFF2-40B4-BE49-F238E27FC236}">
-                    <a16:creationId xmlns="" xmlns:a16="http://schemas.microsoft.com/office/drawing/2014/main" id="{E9AFA60E-8F2C-1E45-BBEB-604E2B535E5F}"/>
+                    <a16:creationId xmlns:a16="http://schemas.microsoft.com/office/drawing/2014/main" xmlns="" id="{E9AFA60E-8F2C-1E45-BBEB-604E2B535E5F}"/>
                   </a:ext>
                 </a:extLst>
               </p:cNvPr>
@@ -4388,7 +4388,7 @@
               <p:cNvPr id="31" name="TextBox 30">
                 <a:extLst>
                   <a:ext uri="{FF2B5EF4-FFF2-40B4-BE49-F238E27FC236}">
-                    <a16:creationId xmlns="" xmlns:a16="http://schemas.microsoft.com/office/drawing/2014/main" id="{7C81964B-463F-7846-9E82-5CEB1DD032B1}"/>
+                    <a16:creationId xmlns:a16="http://schemas.microsoft.com/office/drawing/2014/main" xmlns="" id="{7C81964B-463F-7846-9E82-5CEB1DD032B1}"/>
                   </a:ext>
                 </a:extLst>
               </p:cNvPr>
@@ -4434,7 +4434,7 @@
               <p:cNvPr id="32" name="TextBox 31">
                 <a:extLst>
                   <a:ext uri="{FF2B5EF4-FFF2-40B4-BE49-F238E27FC236}">
-                    <a16:creationId xmlns="" xmlns:a16="http://schemas.microsoft.com/office/drawing/2014/main" id="{C8C064BC-BF2E-4D49-8022-E28B3775C626}"/>
+                    <a16:creationId xmlns:a16="http://schemas.microsoft.com/office/drawing/2014/main" xmlns="" id="{C8C064BC-BF2E-4D49-8022-E28B3775C626}"/>
                   </a:ext>
                 </a:extLst>
               </p:cNvPr>
@@ -4475,7 +4475,7 @@
               <p:cNvPr id="33" name="TextBox 32">
                 <a:extLst>
                   <a:ext uri="{FF2B5EF4-FFF2-40B4-BE49-F238E27FC236}">
-                    <a16:creationId xmlns="" xmlns:a16="http://schemas.microsoft.com/office/drawing/2014/main" id="{E4756D17-1F3F-E64B-AB67-230A59782D9A}"/>
+                    <a16:creationId xmlns:a16="http://schemas.microsoft.com/office/drawing/2014/main" xmlns="" id="{E4756D17-1F3F-E64B-AB67-230A59782D9A}"/>
                   </a:ext>
                 </a:extLst>
               </p:cNvPr>
@@ -4525,7 +4525,7 @@
               <p:cNvPr id="34" name="TextBox 33">
                 <a:extLst>
                   <a:ext uri="{FF2B5EF4-FFF2-40B4-BE49-F238E27FC236}">
-                    <a16:creationId xmlns="" xmlns:a16="http://schemas.microsoft.com/office/drawing/2014/main" id="{6221F280-C9B2-0646-9521-492845846219}"/>
+                    <a16:creationId xmlns:a16="http://schemas.microsoft.com/office/drawing/2014/main" xmlns="" id="{6221F280-C9B2-0646-9521-492845846219}"/>
                   </a:ext>
                 </a:extLst>
               </p:cNvPr>
@@ -4571,7 +4571,7 @@
               <p:cNvPr id="35" name="TextBox 34">
                 <a:extLst>
                   <a:ext uri="{FF2B5EF4-FFF2-40B4-BE49-F238E27FC236}">
-                    <a16:creationId xmlns="" xmlns:a16="http://schemas.microsoft.com/office/drawing/2014/main" id="{316E6191-DDC2-5047-A3F1-2CE068D8ED21}"/>
+                    <a16:creationId xmlns:a16="http://schemas.microsoft.com/office/drawing/2014/main" xmlns="" id="{316E6191-DDC2-5047-A3F1-2CE068D8ED21}"/>
                   </a:ext>
                 </a:extLst>
               </p:cNvPr>
@@ -4616,7 +4616,7 @@
               <p:cNvPr id="36" name="Straight Arrow Connector 35">
                 <a:extLst>
                   <a:ext uri="{FF2B5EF4-FFF2-40B4-BE49-F238E27FC236}">
-                    <a16:creationId xmlns="" xmlns:a16="http://schemas.microsoft.com/office/drawing/2014/main" id="{CB89DCB6-D9C8-BF44-AF0D-8A829FF9C9EC}"/>
+                    <a16:creationId xmlns:a16="http://schemas.microsoft.com/office/drawing/2014/main" xmlns="" id="{CB89DCB6-D9C8-BF44-AF0D-8A829FF9C9EC}"/>
                   </a:ext>
                 </a:extLst>
               </p:cNvPr>
@@ -4661,7 +4661,7 @@
               <p:cNvPr id="37" name="TextBox 36">
                 <a:extLst>
                   <a:ext uri="{FF2B5EF4-FFF2-40B4-BE49-F238E27FC236}">
-                    <a16:creationId xmlns="" xmlns:a16="http://schemas.microsoft.com/office/drawing/2014/main" id="{E4756D17-1F3F-E64B-AB67-230A59782D9A}"/>
+                    <a16:creationId xmlns:a16="http://schemas.microsoft.com/office/drawing/2014/main" xmlns="" id="{E4756D17-1F3F-E64B-AB67-230A59782D9A}"/>
                   </a:ext>
                 </a:extLst>
               </p:cNvPr>
@@ -4712,7 +4712,7 @@
             <p:cNvPr id="17" name="Straight Arrow Connector 16">
               <a:extLst>
                 <a:ext uri="{FF2B5EF4-FFF2-40B4-BE49-F238E27FC236}">
-                  <a16:creationId xmlns="" xmlns:a16="http://schemas.microsoft.com/office/drawing/2014/main" id="{5E5BCC3D-0641-9940-9C9F-B07FE0D1B902}"/>
+                  <a16:creationId xmlns:a16="http://schemas.microsoft.com/office/drawing/2014/main" xmlns="" id="{5E5BCC3D-0641-9940-9C9F-B07FE0D1B902}"/>
                 </a:ext>
               </a:extLst>
             </p:cNvPr>
@@ -4757,7 +4757,7 @@
             <p:cNvPr id="18" name="TextBox 17">
               <a:extLst>
                 <a:ext uri="{FF2B5EF4-FFF2-40B4-BE49-F238E27FC236}">
-                  <a16:creationId xmlns="" xmlns:a16="http://schemas.microsoft.com/office/drawing/2014/main" id="{E9AFA60E-8F2C-1E45-BBEB-604E2B535E5F}"/>
+                  <a16:creationId xmlns:a16="http://schemas.microsoft.com/office/drawing/2014/main" xmlns="" id="{E9AFA60E-8F2C-1E45-BBEB-604E2B535E5F}"/>
                 </a:ext>
               </a:extLst>
             </p:cNvPr>
@@ -4795,6 +4795,51 @@
           </p:txBody>
         </p:sp>
       </p:grpSp>
+      <p:sp>
+        <p:nvSpPr>
+          <p:cNvPr id="20" name="Arc 19"/>
+          <p:cNvSpPr/>
+          <p:nvPr/>
+        </p:nvSpPr>
+        <p:spPr>
+          <a:xfrm>
+            <a:off x="2444750" y="622299"/>
+            <a:ext cx="3790950" cy="3217317"/>
+          </a:xfrm>
+          <a:prstGeom prst="arc">
+            <a:avLst>
+              <a:gd name="adj1" fmla="val 11578188"/>
+              <a:gd name="adj2" fmla="val 15893574"/>
+            </a:avLst>
+          </a:prstGeom>
+          <a:ln>
+            <a:headEnd type="triangle"/>
+            <a:tailEnd type="triangle"/>
+          </a:ln>
+        </p:spPr>
+        <p:style>
+          <a:lnRef idx="2">
+            <a:schemeClr val="accent1"/>
+          </a:lnRef>
+          <a:fillRef idx="0">
+            <a:schemeClr val="accent1"/>
+          </a:fillRef>
+          <a:effectRef idx="1">
+            <a:schemeClr val="accent1"/>
+          </a:effectRef>
+          <a:fontRef idx="minor">
+            <a:schemeClr val="tx1"/>
+          </a:fontRef>
+        </p:style>
+        <p:txBody>
+          <a:bodyPr rtlCol="0" anchor="ctr"/>
+          <a:lstStyle/>
+          <a:p>
+            <a:pPr algn="ctr"/>
+            <a:endParaRPr lang="en-US" dirty="0"/>
+          </a:p>
+        </p:txBody>
+      </p:sp>
     </p:spTree>
     <p:extLst>
       <p:ext uri="{BB962C8B-B14F-4D97-AF65-F5344CB8AC3E}">
@@ -4825,748 +4870,26 @@
           <a:chExt cx="0" cy="0"/>
         </a:xfrm>
       </p:grpSpPr>
-      <p:cxnSp>
-        <p:nvCxnSpPr>
-          <p:cNvPr id="20" name="Straight Arrow Connector 19">
-            <a:extLst>
-              <a:ext uri="{FF2B5EF4-FFF2-40B4-BE49-F238E27FC236}">
-                <a16:creationId xmlns="" xmlns:a16="http://schemas.microsoft.com/office/drawing/2014/main" id="{CB89DCB6-D9C8-BF44-AF0D-8A829FF9C9EC}"/>
-              </a:ext>
-            </a:extLst>
-          </p:cNvPr>
-          <p:cNvCxnSpPr>
-            <a:cxnSpLocks/>
-          </p:cNvCxnSpPr>
-          <p:nvPr/>
-        </p:nvCxnSpPr>
-        <p:spPr>
-          <a:xfrm rot="2640000">
-            <a:off x="7079552" y="6114341"/>
-            <a:ext cx="711725" cy="206950"/>
-          </a:xfrm>
-          <a:prstGeom prst="straightConnector1">
-            <a:avLst/>
-          </a:prstGeom>
-          <a:ln w="28575">
-            <a:solidFill>
-              <a:srgbClr val="FFC000"/>
-            </a:solidFill>
-            <a:tailEnd type="triangle" w="lg" len="lg"/>
-          </a:ln>
-        </p:spPr>
-        <p:style>
-          <a:lnRef idx="1">
-            <a:schemeClr val="accent1"/>
-          </a:lnRef>
-          <a:fillRef idx="0">
-            <a:schemeClr val="accent1"/>
-          </a:fillRef>
-          <a:effectRef idx="0">
-            <a:schemeClr val="accent1"/>
-          </a:effectRef>
-          <a:fontRef idx="minor">
-            <a:schemeClr val="tx1"/>
-          </a:fontRef>
-        </p:style>
-      </p:cxnSp>
       <p:grpSp>
         <p:nvGrpSpPr>
-          <p:cNvPr id="3" name="Group 2"/>
+          <p:cNvPr id="12" name="Group 11"/>
           <p:cNvGrpSpPr/>
           <p:nvPr/>
         </p:nvGrpSpPr>
         <p:grpSpPr>
           <a:xfrm>
-            <a:off x="278294" y="9331"/>
-            <a:ext cx="7652713" cy="6858000"/>
-            <a:chOff x="278294" y="9331"/>
-            <a:chExt cx="7652713" cy="6858000"/>
+            <a:off x="278294" y="-2075792"/>
+            <a:ext cx="7748105" cy="8943123"/>
+            <a:chOff x="278294" y="-2075792"/>
+            <a:chExt cx="7748105" cy="8943123"/>
           </a:xfrm>
         </p:grpSpPr>
-        <p:grpSp>
-          <p:nvGrpSpPr>
-            <p:cNvPr id="10" name="Group 9"/>
-            <p:cNvGrpSpPr/>
-            <p:nvPr/>
-          </p:nvGrpSpPr>
-          <p:grpSpPr>
-            <a:xfrm>
-              <a:off x="278294" y="9331"/>
-              <a:ext cx="7652713" cy="6858000"/>
-              <a:chOff x="278294" y="9331"/>
-              <a:chExt cx="7652713" cy="6858000"/>
-            </a:xfrm>
-          </p:grpSpPr>
-          <p:pic>
-            <p:nvPicPr>
-              <p:cNvPr id="24" name="Picture 23">
-                <a:extLst>
-                  <a:ext uri="{FF2B5EF4-FFF2-40B4-BE49-F238E27FC236}">
-                    <a16:creationId xmlns="" xmlns:a16="http://schemas.microsoft.com/office/drawing/2014/main" id="{34E0CED9-750C-2D41-9BB7-17026667CCE9}"/>
-                  </a:ext>
-                </a:extLst>
-              </p:cNvPr>
-              <p:cNvPicPr>
-                <a:picLocks noChangeAspect="1"/>
-              </p:cNvPicPr>
-              <p:nvPr/>
-            </p:nvPicPr>
-            <p:blipFill>
-              <a:blip r:embed="rId2">
-                <a:extLst>
-                  <a:ext uri="{28A0092B-C50C-407E-A947-70E740481C1C}">
-                    <a14:useLocalDpi xmlns:a14="http://schemas.microsoft.com/office/drawing/2010/main" val="0"/>
-                  </a:ext>
-                </a:extLst>
-              </a:blip>
-              <a:stretch>
-                <a:fillRect/>
-              </a:stretch>
-            </p:blipFill>
-            <p:spPr>
-              <a:xfrm>
-                <a:off x="1399238" y="9331"/>
-                <a:ext cx="5546234" cy="6858000"/>
-              </a:xfrm>
-              <a:prstGeom prst="rect">
-                <a:avLst/>
-              </a:prstGeom>
-            </p:spPr>
-          </p:pic>
-          <p:cxnSp>
-            <p:nvCxnSpPr>
-              <p:cNvPr id="25" name="Straight Arrow Connector 24">
-                <a:extLst>
-                  <a:ext uri="{FF2B5EF4-FFF2-40B4-BE49-F238E27FC236}">
-                    <a16:creationId xmlns="" xmlns:a16="http://schemas.microsoft.com/office/drawing/2014/main" id="{F27EDF7D-9821-124F-BFAC-296397795C0B}"/>
-                  </a:ext>
-                </a:extLst>
-              </p:cNvPr>
-              <p:cNvCxnSpPr>
-                <a:cxnSpLocks/>
-                <a:stCxn id="34" idx="2"/>
-              </p:cNvCxnSpPr>
-              <p:nvPr/>
-            </p:nvCxnSpPr>
-            <p:spPr>
-              <a:xfrm>
-                <a:off x="1270719" y="2698309"/>
-                <a:ext cx="2704381" cy="873345"/>
-              </a:xfrm>
-              <a:prstGeom prst="straightConnector1">
-                <a:avLst/>
-              </a:prstGeom>
-              <a:ln w="19050">
-                <a:solidFill>
-                  <a:schemeClr val="tx1"/>
-                </a:solidFill>
-                <a:tailEnd type="triangle" w="lg" len="lg"/>
-              </a:ln>
-            </p:spPr>
-            <p:style>
-              <a:lnRef idx="1">
-                <a:schemeClr val="accent1"/>
-              </a:lnRef>
-              <a:fillRef idx="0">
-                <a:schemeClr val="accent1"/>
-              </a:fillRef>
-              <a:effectRef idx="0">
-                <a:schemeClr val="accent1"/>
-              </a:effectRef>
-              <a:fontRef idx="minor">
-                <a:schemeClr val="tx1"/>
-              </a:fontRef>
-            </p:style>
-          </p:cxnSp>
-          <p:cxnSp>
-            <p:nvCxnSpPr>
-              <p:cNvPr id="26" name="Straight Arrow Connector 25">
-                <a:extLst>
-                  <a:ext uri="{FF2B5EF4-FFF2-40B4-BE49-F238E27FC236}">
-                    <a16:creationId xmlns="" xmlns:a16="http://schemas.microsoft.com/office/drawing/2014/main" id="{5FB60EE6-D5F0-CF4E-90B2-7E7F694AF255}"/>
-                  </a:ext>
-                </a:extLst>
-              </p:cNvPr>
-              <p:cNvCxnSpPr>
-                <a:cxnSpLocks/>
-              </p:cNvCxnSpPr>
-              <p:nvPr/>
-            </p:nvCxnSpPr>
-            <p:spPr>
-              <a:xfrm flipH="1">
-                <a:off x="5555240" y="1847490"/>
-                <a:ext cx="1375261" cy="667715"/>
-              </a:xfrm>
-              <a:prstGeom prst="straightConnector1">
-                <a:avLst/>
-              </a:prstGeom>
-              <a:ln w="19050">
-                <a:solidFill>
-                  <a:schemeClr val="tx1"/>
-                </a:solidFill>
-                <a:tailEnd type="triangle" w="lg" len="lg"/>
-              </a:ln>
-            </p:spPr>
-            <p:style>
-              <a:lnRef idx="1">
-                <a:schemeClr val="accent1"/>
-              </a:lnRef>
-              <a:fillRef idx="0">
-                <a:schemeClr val="accent1"/>
-              </a:fillRef>
-              <a:effectRef idx="0">
-                <a:schemeClr val="accent1"/>
-              </a:effectRef>
-              <a:fontRef idx="minor">
-                <a:schemeClr val="tx1"/>
-              </a:fontRef>
-            </p:style>
-          </p:cxnSp>
-          <p:cxnSp>
-            <p:nvCxnSpPr>
-              <p:cNvPr id="27" name="Straight Arrow Connector 26">
-                <a:extLst>
-                  <a:ext uri="{FF2B5EF4-FFF2-40B4-BE49-F238E27FC236}">
-                    <a16:creationId xmlns="" xmlns:a16="http://schemas.microsoft.com/office/drawing/2014/main" id="{AD5AC55D-2189-FC44-A267-0F2F0D446C3C}"/>
-                  </a:ext>
-                </a:extLst>
-              </p:cNvPr>
-              <p:cNvCxnSpPr>
-                <a:cxnSpLocks/>
-                <a:stCxn id="31" idx="2"/>
-              </p:cNvCxnSpPr>
-              <p:nvPr/>
-            </p:nvCxnSpPr>
-            <p:spPr>
-              <a:xfrm flipH="1">
-                <a:off x="4397686" y="1042504"/>
-                <a:ext cx="1736348" cy="486892"/>
-              </a:xfrm>
-              <a:prstGeom prst="straightConnector1">
-                <a:avLst/>
-              </a:prstGeom>
-              <a:ln w="19050">
-                <a:solidFill>
-                  <a:schemeClr val="tx1"/>
-                </a:solidFill>
-                <a:tailEnd type="triangle" w="lg" len="lg"/>
-              </a:ln>
-            </p:spPr>
-            <p:style>
-              <a:lnRef idx="1">
-                <a:schemeClr val="accent1"/>
-              </a:lnRef>
-              <a:fillRef idx="0">
-                <a:schemeClr val="accent1"/>
-              </a:fillRef>
-              <a:effectRef idx="0">
-                <a:schemeClr val="accent1"/>
-              </a:effectRef>
-              <a:fontRef idx="minor">
-                <a:schemeClr val="tx1"/>
-              </a:fontRef>
-            </p:style>
-          </p:cxnSp>
-          <p:cxnSp>
-            <p:nvCxnSpPr>
-              <p:cNvPr id="28" name="Straight Arrow Connector 27">
-                <a:extLst>
-                  <a:ext uri="{FF2B5EF4-FFF2-40B4-BE49-F238E27FC236}">
-                    <a16:creationId xmlns="" xmlns:a16="http://schemas.microsoft.com/office/drawing/2014/main" id="{5E5BCC3D-0641-9940-9C9F-B07FE0D1B902}"/>
-                  </a:ext>
-                </a:extLst>
-              </p:cNvPr>
-              <p:cNvCxnSpPr>
-                <a:cxnSpLocks/>
-                <a:stCxn id="30" idx="1"/>
-              </p:cNvCxnSpPr>
-              <p:nvPr/>
-            </p:nvCxnSpPr>
-            <p:spPr>
-              <a:xfrm flipH="1">
-                <a:off x="4907333" y="4759652"/>
-                <a:ext cx="1501554" cy="91087"/>
-              </a:xfrm>
-              <a:prstGeom prst="straightConnector1">
-                <a:avLst/>
-              </a:prstGeom>
-              <a:ln w="19050">
-                <a:solidFill>
-                  <a:schemeClr val="tx1"/>
-                </a:solidFill>
-                <a:tailEnd type="triangle" w="lg" len="lg"/>
-              </a:ln>
-            </p:spPr>
-            <p:style>
-              <a:lnRef idx="1">
-                <a:schemeClr val="accent1"/>
-              </a:lnRef>
-              <a:fillRef idx="0">
-                <a:schemeClr val="accent1"/>
-              </a:fillRef>
-              <a:effectRef idx="0">
-                <a:schemeClr val="accent1"/>
-              </a:effectRef>
-              <a:fontRef idx="minor">
-                <a:schemeClr val="tx1"/>
-              </a:fontRef>
-            </p:style>
-          </p:cxnSp>
-          <p:cxnSp>
-            <p:nvCxnSpPr>
-              <p:cNvPr id="29" name="Straight Arrow Connector 28">
-                <a:extLst>
-                  <a:ext uri="{FF2B5EF4-FFF2-40B4-BE49-F238E27FC236}">
-                    <a16:creationId xmlns="" xmlns:a16="http://schemas.microsoft.com/office/drawing/2014/main" id="{CB89DCB6-D9C8-BF44-AF0D-8A829FF9C9EC}"/>
-                  </a:ext>
-                </a:extLst>
-              </p:cNvPr>
-              <p:cNvCxnSpPr>
-                <a:cxnSpLocks/>
-                <a:stCxn id="33" idx="3"/>
-              </p:cNvCxnSpPr>
-              <p:nvPr/>
-            </p:nvCxnSpPr>
-            <p:spPr>
-              <a:xfrm flipV="1">
-                <a:off x="1726977" y="3571654"/>
-                <a:ext cx="1760899" cy="130317"/>
-              </a:xfrm>
-              <a:prstGeom prst="straightConnector1">
-                <a:avLst/>
-              </a:prstGeom>
-              <a:ln w="19050">
-                <a:solidFill>
-                  <a:schemeClr val="tx1"/>
-                </a:solidFill>
-                <a:tailEnd type="triangle" w="lg" len="lg"/>
-              </a:ln>
-            </p:spPr>
-            <p:style>
-              <a:lnRef idx="1">
-                <a:schemeClr val="accent1"/>
-              </a:lnRef>
-              <a:fillRef idx="0">
-                <a:schemeClr val="accent1"/>
-              </a:fillRef>
-              <a:effectRef idx="0">
-                <a:schemeClr val="accent1"/>
-              </a:effectRef>
-              <a:fontRef idx="minor">
-                <a:schemeClr val="tx1"/>
-              </a:fontRef>
-            </p:style>
-          </p:cxnSp>
-          <p:sp>
-            <p:nvSpPr>
-              <p:cNvPr id="30" name="TextBox 29">
-                <a:extLst>
-                  <a:ext uri="{FF2B5EF4-FFF2-40B4-BE49-F238E27FC236}">
-                    <a16:creationId xmlns="" xmlns:a16="http://schemas.microsoft.com/office/drawing/2014/main" id="{E9AFA60E-8F2C-1E45-BBEB-604E2B535E5F}"/>
-                  </a:ext>
-                </a:extLst>
-              </p:cNvPr>
-              <p:cNvSpPr txBox="1"/>
-              <p:nvPr/>
-            </p:nvSpPr>
-            <p:spPr>
-              <a:xfrm>
-                <a:off x="6408887" y="4436486"/>
-                <a:ext cx="1522120" cy="646331"/>
-              </a:xfrm>
-              <a:prstGeom prst="rect">
-                <a:avLst/>
-              </a:prstGeom>
-              <a:noFill/>
-              <a:ln>
-                <a:solidFill>
-                  <a:schemeClr val="tx1"/>
-                </a:solidFill>
-              </a:ln>
-            </p:spPr>
-            <p:txBody>
-              <a:bodyPr wrap="square" rtlCol="0">
-                <a:spAutoFit/>
-              </a:bodyPr>
-              <a:lstStyle/>
-              <a:p>
-                <a:pPr algn="ctr"/>
-                <a:r>
-                  <a:rPr lang="en-US" dirty="0"/>
-                  <a:t>Secondary </a:t>
-                </a:r>
-                <a:r>
-                  <a:rPr lang="en-US" dirty="0" smtClean="0"/>
-                  <a:t>Reflector, 10 K</a:t>
-                </a:r>
-                <a:endParaRPr lang="en-US" dirty="0"/>
-              </a:p>
-            </p:txBody>
-          </p:sp>
-          <p:sp>
-            <p:nvSpPr>
-              <p:cNvPr id="31" name="TextBox 30">
-                <a:extLst>
-                  <a:ext uri="{FF2B5EF4-FFF2-40B4-BE49-F238E27FC236}">
-                    <a16:creationId xmlns="" xmlns:a16="http://schemas.microsoft.com/office/drawing/2014/main" id="{7C81964B-463F-7846-9E82-5CEB1DD032B1}"/>
-                  </a:ext>
-                </a:extLst>
-              </p:cNvPr>
-              <p:cNvSpPr txBox="1"/>
-              <p:nvPr/>
-            </p:nvSpPr>
-            <p:spPr>
-              <a:xfrm>
-                <a:off x="4907331" y="673172"/>
-                <a:ext cx="2453407" cy="369332"/>
-              </a:xfrm>
-              <a:prstGeom prst="rect">
-                <a:avLst/>
-              </a:prstGeom>
-              <a:noFill/>
-              <a:ln>
-                <a:solidFill>
-                  <a:schemeClr val="tx1"/>
-                </a:solidFill>
-              </a:ln>
-            </p:spPr>
-            <p:txBody>
-              <a:bodyPr wrap="square" rtlCol="0">
-                <a:spAutoFit/>
-              </a:bodyPr>
-              <a:lstStyle/>
-              <a:p>
-                <a:pPr algn="ctr"/>
-                <a:r>
-                  <a:rPr lang="en-US" dirty="0"/>
-                  <a:t>Primary </a:t>
-                </a:r>
-                <a:r>
-                  <a:rPr lang="en-US" dirty="0" smtClean="0"/>
-                  <a:t>Reflector, 20 K</a:t>
-                </a:r>
-                <a:endParaRPr lang="en-US" dirty="0"/>
-              </a:p>
-            </p:txBody>
-          </p:sp>
-          <p:sp>
-            <p:nvSpPr>
-              <p:cNvPr id="32" name="TextBox 31">
-                <a:extLst>
-                  <a:ext uri="{FF2B5EF4-FFF2-40B4-BE49-F238E27FC236}">
-                    <a16:creationId xmlns="" xmlns:a16="http://schemas.microsoft.com/office/drawing/2014/main" id="{C8C064BC-BF2E-4D49-8022-E28B3775C626}"/>
-                  </a:ext>
-                </a:extLst>
-              </p:cNvPr>
-              <p:cNvSpPr txBox="1"/>
-              <p:nvPr/>
-            </p:nvSpPr>
-            <p:spPr>
-              <a:xfrm>
-                <a:off x="6151916" y="1478158"/>
-                <a:ext cx="1557175" cy="369332"/>
-              </a:xfrm>
-              <a:prstGeom prst="rect">
-                <a:avLst/>
-              </a:prstGeom>
-              <a:noFill/>
-              <a:ln>
-                <a:solidFill>
-                  <a:schemeClr val="tx1"/>
-                </a:solidFill>
-              </a:ln>
-            </p:spPr>
-            <p:txBody>
-              <a:bodyPr wrap="square" rtlCol="0">
-                <a:spAutoFit/>
-              </a:bodyPr>
-              <a:lstStyle/>
-              <a:p>
-                <a:pPr algn="ctr"/>
-                <a:r>
-                  <a:rPr lang="en-US" dirty="0"/>
-                  <a:t>Shadow Cone</a:t>
-                </a:r>
-              </a:p>
-            </p:txBody>
-          </p:sp>
-          <p:sp>
-            <p:nvSpPr>
-              <p:cNvPr id="33" name="TextBox 32">
-                <a:extLst>
-                  <a:ext uri="{FF2B5EF4-FFF2-40B4-BE49-F238E27FC236}">
-                    <a16:creationId xmlns="" xmlns:a16="http://schemas.microsoft.com/office/drawing/2014/main" id="{E4756D17-1F3F-E64B-AB67-230A59782D9A}"/>
-                  </a:ext>
-                </a:extLst>
-              </p:cNvPr>
-              <p:cNvSpPr txBox="1"/>
-              <p:nvPr/>
-            </p:nvSpPr>
-            <p:spPr>
-              <a:xfrm>
-                <a:off x="278294" y="3378805"/>
-                <a:ext cx="1448683" cy="646331"/>
-              </a:xfrm>
-              <a:prstGeom prst="rect">
-                <a:avLst/>
-              </a:prstGeom>
-              <a:noFill/>
-              <a:ln>
-                <a:solidFill>
-                  <a:schemeClr val="tx1"/>
-                </a:solidFill>
-              </a:ln>
-            </p:spPr>
-            <p:txBody>
-              <a:bodyPr wrap="square" rtlCol="0">
-                <a:spAutoFit/>
-              </a:bodyPr>
-              <a:lstStyle/>
-              <a:p>
-                <a:pPr algn="ctr"/>
-                <a:r>
-                  <a:rPr lang="en-US" dirty="0"/>
-                  <a:t>Focal </a:t>
-                </a:r>
-                <a:r>
-                  <a:rPr lang="en-US" dirty="0" smtClean="0"/>
-                  <a:t>Plane, 100 </a:t>
-                </a:r>
-                <a:r>
-                  <a:rPr lang="en-US" dirty="0" err="1" smtClean="0"/>
-                  <a:t>mK</a:t>
-                </a:r>
-                <a:endParaRPr lang="en-US" dirty="0"/>
-              </a:p>
-            </p:txBody>
-          </p:sp>
-          <p:sp>
-            <p:nvSpPr>
-              <p:cNvPr id="34" name="TextBox 33">
-                <a:extLst>
-                  <a:ext uri="{FF2B5EF4-FFF2-40B4-BE49-F238E27FC236}">
-                    <a16:creationId xmlns="" xmlns:a16="http://schemas.microsoft.com/office/drawing/2014/main" id="{6221F280-C9B2-0646-9521-492845846219}"/>
-                  </a:ext>
-                </a:extLst>
-              </p:cNvPr>
-              <p:cNvSpPr txBox="1"/>
-              <p:nvPr/>
-            </p:nvSpPr>
-            <p:spPr>
-              <a:xfrm>
-                <a:off x="309955" y="2328977"/>
-                <a:ext cx="1921528" cy="369332"/>
-              </a:xfrm>
-              <a:prstGeom prst="rect">
-                <a:avLst/>
-              </a:prstGeom>
-              <a:noFill/>
-              <a:ln>
-                <a:solidFill>
-                  <a:schemeClr val="tx1"/>
-                </a:solidFill>
-              </a:ln>
-            </p:spPr>
-            <p:txBody>
-              <a:bodyPr wrap="square" rtlCol="0">
-                <a:spAutoFit/>
-              </a:bodyPr>
-              <a:lstStyle/>
-              <a:p>
-                <a:pPr algn="ctr"/>
-                <a:r>
-                  <a:rPr lang="en-US" dirty="0"/>
-                  <a:t>Aperture </a:t>
-                </a:r>
-                <a:r>
-                  <a:rPr lang="en-US" dirty="0" smtClean="0"/>
-                  <a:t>Stop, 6 K</a:t>
-                </a:r>
-                <a:endParaRPr lang="en-US" dirty="0"/>
-              </a:p>
-            </p:txBody>
-          </p:sp>
-          <p:cxnSp>
-            <p:nvCxnSpPr>
-              <p:cNvPr id="36" name="Straight Arrow Connector 35">
-                <a:extLst>
-                  <a:ext uri="{FF2B5EF4-FFF2-40B4-BE49-F238E27FC236}">
-                    <a16:creationId xmlns="" xmlns:a16="http://schemas.microsoft.com/office/drawing/2014/main" id="{CB89DCB6-D9C8-BF44-AF0D-8A829FF9C9EC}"/>
-                  </a:ext>
-                </a:extLst>
-              </p:cNvPr>
-              <p:cNvCxnSpPr>
-                <a:cxnSpLocks/>
-                <a:stCxn id="37" idx="3"/>
-              </p:cNvCxnSpPr>
-              <p:nvPr/>
-            </p:nvCxnSpPr>
-            <p:spPr>
-              <a:xfrm flipV="1">
-                <a:off x="2029899" y="4553339"/>
-                <a:ext cx="1385105" cy="346089"/>
-              </a:xfrm>
-              <a:prstGeom prst="straightConnector1">
-                <a:avLst/>
-              </a:prstGeom>
-              <a:ln w="19050">
-                <a:solidFill>
-                  <a:schemeClr val="tx1"/>
-                </a:solidFill>
-                <a:tailEnd type="triangle" w="lg" len="lg"/>
-              </a:ln>
-            </p:spPr>
-            <p:style>
-              <a:lnRef idx="1">
-                <a:schemeClr val="accent1"/>
-              </a:lnRef>
-              <a:fillRef idx="0">
-                <a:schemeClr val="accent1"/>
-              </a:fillRef>
-              <a:effectRef idx="0">
-                <a:schemeClr val="accent1"/>
-              </a:effectRef>
-              <a:fontRef idx="minor">
-                <a:schemeClr val="tx1"/>
-              </a:fontRef>
-            </p:style>
-          </p:cxnSp>
-          <p:sp>
-            <p:nvSpPr>
-              <p:cNvPr id="37" name="TextBox 36">
-                <a:extLst>
-                  <a:ext uri="{FF2B5EF4-FFF2-40B4-BE49-F238E27FC236}">
-                    <a16:creationId xmlns="" xmlns:a16="http://schemas.microsoft.com/office/drawing/2014/main" id="{E4756D17-1F3F-E64B-AB67-230A59782D9A}"/>
-                  </a:ext>
-                </a:extLst>
-              </p:cNvPr>
-              <p:cNvSpPr txBox="1"/>
-              <p:nvPr/>
-            </p:nvSpPr>
-            <p:spPr>
-              <a:xfrm>
-                <a:off x="461704" y="4714762"/>
-                <a:ext cx="1568195" cy="369332"/>
-              </a:xfrm>
-              <a:prstGeom prst="rect">
-                <a:avLst/>
-              </a:prstGeom>
-              <a:noFill/>
-              <a:ln>
-                <a:solidFill>
-                  <a:schemeClr val="tx1"/>
-                </a:solidFill>
-              </a:ln>
-            </p:spPr>
-            <p:txBody>
-              <a:bodyPr wrap="square" rtlCol="0">
-                <a:spAutoFit/>
-              </a:bodyPr>
-              <a:lstStyle/>
-              <a:p>
-                <a:pPr algn="ctr"/>
-                <a:r>
-                  <a:rPr lang="en-US" dirty="0" smtClean="0"/>
-                  <a:t>Optics Box, 6 K</a:t>
-                </a:r>
-                <a:endParaRPr lang="en-US" dirty="0"/>
-              </a:p>
-            </p:txBody>
-          </p:sp>
-          <p:cxnSp>
-            <p:nvCxnSpPr>
-              <p:cNvPr id="17" name="Straight Arrow Connector 16">
-                <a:extLst>
-                  <a:ext uri="{FF2B5EF4-FFF2-40B4-BE49-F238E27FC236}">
-                    <a16:creationId xmlns="" xmlns:a16="http://schemas.microsoft.com/office/drawing/2014/main" id="{5E5BCC3D-0641-9940-9C9F-B07FE0D1B902}"/>
-                  </a:ext>
-                </a:extLst>
-              </p:cNvPr>
-              <p:cNvCxnSpPr>
-                <a:cxnSpLocks/>
-                <a:stCxn id="18" idx="1"/>
-              </p:cNvCxnSpPr>
-              <p:nvPr/>
-            </p:nvCxnSpPr>
-            <p:spPr>
-              <a:xfrm flipH="1">
-                <a:off x="5952931" y="3484702"/>
-                <a:ext cx="727786" cy="676751"/>
-              </a:xfrm>
-              <a:prstGeom prst="straightConnector1">
-                <a:avLst/>
-              </a:prstGeom>
-              <a:ln w="19050">
-                <a:solidFill>
-                  <a:schemeClr val="tx1"/>
-                </a:solidFill>
-                <a:tailEnd type="triangle" w="lg" len="lg"/>
-              </a:ln>
-            </p:spPr>
-            <p:style>
-              <a:lnRef idx="1">
-                <a:schemeClr val="accent1"/>
-              </a:lnRef>
-              <a:fillRef idx="0">
-                <a:schemeClr val="accent1"/>
-              </a:fillRef>
-              <a:effectRef idx="0">
-                <a:schemeClr val="accent1"/>
-              </a:effectRef>
-              <a:fontRef idx="minor">
-                <a:schemeClr val="tx1"/>
-              </a:fontRef>
-            </p:style>
-          </p:cxnSp>
-          <p:sp>
-            <p:nvSpPr>
-              <p:cNvPr id="18" name="TextBox 17">
-                <a:extLst>
-                  <a:ext uri="{FF2B5EF4-FFF2-40B4-BE49-F238E27FC236}">
-                    <a16:creationId xmlns="" xmlns:a16="http://schemas.microsoft.com/office/drawing/2014/main" id="{E9AFA60E-8F2C-1E45-BBEB-604E2B535E5F}"/>
-                  </a:ext>
-                </a:extLst>
-              </p:cNvPr>
-              <p:cNvSpPr txBox="1"/>
-              <p:nvPr/>
-            </p:nvSpPr>
-            <p:spPr>
-              <a:xfrm>
-                <a:off x="6680717" y="3161536"/>
-                <a:ext cx="1168297" cy="646331"/>
-              </a:xfrm>
-              <a:prstGeom prst="rect">
-                <a:avLst/>
-              </a:prstGeom>
-              <a:noFill/>
-              <a:ln>
-                <a:solidFill>
-                  <a:schemeClr val="tx1"/>
-                </a:solidFill>
-              </a:ln>
-            </p:spPr>
-            <p:txBody>
-              <a:bodyPr wrap="square" rtlCol="0">
-                <a:spAutoFit/>
-              </a:bodyPr>
-              <a:lstStyle/>
-              <a:p>
-                <a:pPr algn="ctr"/>
-                <a:r>
-                  <a:rPr lang="en-US" dirty="0" smtClean="0"/>
-                  <a:t>V-Groove Shields</a:t>
-                </a:r>
-                <a:endParaRPr lang="en-US" dirty="0"/>
-              </a:p>
-            </p:txBody>
-          </p:sp>
-        </p:grpSp>
         <p:cxnSp>
           <p:nvCxnSpPr>
-            <p:cNvPr id="19" name="Straight Arrow Connector 18">
+            <p:cNvPr id="20" name="Straight Arrow Connector 19">
               <a:extLst>
                 <a:ext uri="{FF2B5EF4-FFF2-40B4-BE49-F238E27FC236}">
-                  <a16:creationId xmlns="" xmlns:a16="http://schemas.microsoft.com/office/drawing/2014/main" id="{CB89DCB6-D9C8-BF44-AF0D-8A829FF9C9EC}"/>
+                  <a16:creationId xmlns:a16="http://schemas.microsoft.com/office/drawing/2014/main" xmlns="" id="{CB89DCB6-D9C8-BF44-AF0D-8A829FF9C9EC}"/>
                 </a:ext>
               </a:extLst>
             </p:cNvPr>
@@ -5576,9 +4899,9 @@
             <p:nvPr/>
           </p:nvCxnSpPr>
           <p:spPr>
-            <a:xfrm rot="4380000">
-              <a:off x="889929" y="5797878"/>
-              <a:ext cx="1146242" cy="366626"/>
+            <a:xfrm rot="2640000">
+              <a:off x="7079552" y="6114341"/>
+              <a:ext cx="711725" cy="206950"/>
             </a:xfrm>
             <a:prstGeom prst="straightConnector1">
               <a:avLst/>
@@ -5605,16 +4928,923 @@
             </a:fontRef>
           </p:style>
         </p:cxnSp>
+        <p:grpSp>
+          <p:nvGrpSpPr>
+            <p:cNvPr id="3" name="Group 2"/>
+            <p:cNvGrpSpPr/>
+            <p:nvPr/>
+          </p:nvGrpSpPr>
+          <p:grpSpPr>
+            <a:xfrm>
+              <a:off x="278294" y="9331"/>
+              <a:ext cx="7748105" cy="6858000"/>
+              <a:chOff x="278294" y="9331"/>
+              <a:chExt cx="7748105" cy="6858000"/>
+            </a:xfrm>
+          </p:grpSpPr>
+          <p:grpSp>
+            <p:nvGrpSpPr>
+              <p:cNvPr id="10" name="Group 9"/>
+              <p:cNvGrpSpPr/>
+              <p:nvPr/>
+            </p:nvGrpSpPr>
+            <p:grpSpPr>
+              <a:xfrm>
+                <a:off x="278294" y="9331"/>
+                <a:ext cx="7748105" cy="6858000"/>
+                <a:chOff x="278294" y="9331"/>
+                <a:chExt cx="7748105" cy="6858000"/>
+              </a:xfrm>
+            </p:grpSpPr>
+            <p:pic>
+              <p:nvPicPr>
+                <p:cNvPr id="24" name="Picture 23">
+                  <a:extLst>
+                    <a:ext uri="{FF2B5EF4-FFF2-40B4-BE49-F238E27FC236}">
+                      <a16:creationId xmlns:a16="http://schemas.microsoft.com/office/drawing/2014/main" xmlns="" id="{34E0CED9-750C-2D41-9BB7-17026667CCE9}"/>
+                    </a:ext>
+                  </a:extLst>
+                </p:cNvPr>
+                <p:cNvPicPr>
+                  <a:picLocks noChangeAspect="1"/>
+                </p:cNvPicPr>
+                <p:nvPr/>
+              </p:nvPicPr>
+              <p:blipFill>
+                <a:blip r:embed="rId2">
+                  <a:extLst>
+                    <a:ext uri="{28A0092B-C50C-407E-A947-70E740481C1C}">
+                      <a14:useLocalDpi xmlns:a14="http://schemas.microsoft.com/office/drawing/2010/main" val="0"/>
+                    </a:ext>
+                  </a:extLst>
+                </a:blip>
+                <a:stretch>
+                  <a:fillRect/>
+                </a:stretch>
+              </p:blipFill>
+              <p:spPr>
+                <a:xfrm>
+                  <a:off x="1399238" y="9331"/>
+                  <a:ext cx="5546234" cy="6858000"/>
+                </a:xfrm>
+                <a:prstGeom prst="rect">
+                  <a:avLst/>
+                </a:prstGeom>
+              </p:spPr>
+            </p:pic>
+            <p:cxnSp>
+              <p:nvCxnSpPr>
+                <p:cNvPr id="25" name="Straight Arrow Connector 24">
+                  <a:extLst>
+                    <a:ext uri="{FF2B5EF4-FFF2-40B4-BE49-F238E27FC236}">
+                      <a16:creationId xmlns:a16="http://schemas.microsoft.com/office/drawing/2014/main" xmlns="" id="{F27EDF7D-9821-124F-BFAC-296397795C0B}"/>
+                    </a:ext>
+                  </a:extLst>
+                </p:cNvPr>
+                <p:cNvCxnSpPr>
+                  <a:cxnSpLocks/>
+                  <a:stCxn id="34" idx="2"/>
+                </p:cNvCxnSpPr>
+                <p:nvPr/>
+              </p:nvCxnSpPr>
+              <p:spPr>
+                <a:xfrm>
+                  <a:off x="1270719" y="2698309"/>
+                  <a:ext cx="2704381" cy="873345"/>
+                </a:xfrm>
+                <a:prstGeom prst="straightConnector1">
+                  <a:avLst/>
+                </a:prstGeom>
+                <a:ln w="19050">
+                  <a:solidFill>
+                    <a:schemeClr val="tx1"/>
+                  </a:solidFill>
+                  <a:tailEnd type="triangle" w="lg" len="lg"/>
+                </a:ln>
+              </p:spPr>
+              <p:style>
+                <a:lnRef idx="1">
+                  <a:schemeClr val="accent1"/>
+                </a:lnRef>
+                <a:fillRef idx="0">
+                  <a:schemeClr val="accent1"/>
+                </a:fillRef>
+                <a:effectRef idx="0">
+                  <a:schemeClr val="accent1"/>
+                </a:effectRef>
+                <a:fontRef idx="minor">
+                  <a:schemeClr val="tx1"/>
+                </a:fontRef>
+              </p:style>
+            </p:cxnSp>
+            <p:cxnSp>
+              <p:nvCxnSpPr>
+                <p:cNvPr id="26" name="Straight Arrow Connector 25">
+                  <a:extLst>
+                    <a:ext uri="{FF2B5EF4-FFF2-40B4-BE49-F238E27FC236}">
+                      <a16:creationId xmlns:a16="http://schemas.microsoft.com/office/drawing/2014/main" xmlns="" id="{5FB60EE6-D5F0-CF4E-90B2-7E7F694AF255}"/>
+                    </a:ext>
+                  </a:extLst>
+                </p:cNvPr>
+                <p:cNvCxnSpPr>
+                  <a:cxnSpLocks/>
+                  <a:stCxn id="32" idx="1"/>
+                </p:cNvCxnSpPr>
+                <p:nvPr/>
+              </p:nvCxnSpPr>
+              <p:spPr>
+                <a:xfrm flipH="1">
+                  <a:off x="5555241" y="2330539"/>
+                  <a:ext cx="773719" cy="184666"/>
+                </a:xfrm>
+                <a:prstGeom prst="straightConnector1">
+                  <a:avLst/>
+                </a:prstGeom>
+                <a:ln w="19050">
+                  <a:solidFill>
+                    <a:schemeClr val="tx1"/>
+                  </a:solidFill>
+                  <a:tailEnd type="triangle" w="lg" len="lg"/>
+                </a:ln>
+              </p:spPr>
+              <p:style>
+                <a:lnRef idx="1">
+                  <a:schemeClr val="accent1"/>
+                </a:lnRef>
+                <a:fillRef idx="0">
+                  <a:schemeClr val="accent1"/>
+                </a:fillRef>
+                <a:effectRef idx="0">
+                  <a:schemeClr val="accent1"/>
+                </a:effectRef>
+                <a:fontRef idx="minor">
+                  <a:schemeClr val="tx1"/>
+                </a:fontRef>
+              </p:style>
+            </p:cxnSp>
+            <p:cxnSp>
+              <p:nvCxnSpPr>
+                <p:cNvPr id="27" name="Straight Arrow Connector 26">
+                  <a:extLst>
+                    <a:ext uri="{FF2B5EF4-FFF2-40B4-BE49-F238E27FC236}">
+                      <a16:creationId xmlns:a16="http://schemas.microsoft.com/office/drawing/2014/main" xmlns="" id="{AD5AC55D-2189-FC44-A267-0F2F0D446C3C}"/>
+                    </a:ext>
+                  </a:extLst>
+                </p:cNvPr>
+                <p:cNvCxnSpPr>
+                  <a:cxnSpLocks/>
+                  <a:stCxn id="31" idx="2"/>
+                </p:cNvCxnSpPr>
+                <p:nvPr/>
+              </p:nvCxnSpPr>
+              <p:spPr>
+                <a:xfrm flipH="1">
+                  <a:off x="4756150" y="1843189"/>
+                  <a:ext cx="1866161" cy="436461"/>
+                </a:xfrm>
+                <a:prstGeom prst="straightConnector1">
+                  <a:avLst/>
+                </a:prstGeom>
+                <a:ln w="19050">
+                  <a:solidFill>
+                    <a:schemeClr val="tx1"/>
+                  </a:solidFill>
+                  <a:tailEnd type="triangle" w="lg" len="lg"/>
+                </a:ln>
+              </p:spPr>
+              <p:style>
+                <a:lnRef idx="1">
+                  <a:schemeClr val="accent1"/>
+                </a:lnRef>
+                <a:fillRef idx="0">
+                  <a:schemeClr val="accent1"/>
+                </a:fillRef>
+                <a:effectRef idx="0">
+                  <a:schemeClr val="accent1"/>
+                </a:effectRef>
+                <a:fontRef idx="minor">
+                  <a:schemeClr val="tx1"/>
+                </a:fontRef>
+              </p:style>
+            </p:cxnSp>
+            <p:cxnSp>
+              <p:nvCxnSpPr>
+                <p:cNvPr id="28" name="Straight Arrow Connector 27">
+                  <a:extLst>
+                    <a:ext uri="{FF2B5EF4-FFF2-40B4-BE49-F238E27FC236}">
+                      <a16:creationId xmlns:a16="http://schemas.microsoft.com/office/drawing/2014/main" xmlns="" id="{5E5BCC3D-0641-9940-9C9F-B07FE0D1B902}"/>
+                    </a:ext>
+                  </a:extLst>
+                </p:cNvPr>
+                <p:cNvCxnSpPr>
+                  <a:cxnSpLocks/>
+                  <a:stCxn id="30" idx="1"/>
+                </p:cNvCxnSpPr>
+                <p:nvPr/>
+              </p:nvCxnSpPr>
+              <p:spPr>
+                <a:xfrm flipH="1">
+                  <a:off x="4907334" y="4759652"/>
+                  <a:ext cx="1501552" cy="91087"/>
+                </a:xfrm>
+                <a:prstGeom prst="straightConnector1">
+                  <a:avLst/>
+                </a:prstGeom>
+                <a:ln w="19050">
+                  <a:solidFill>
+                    <a:schemeClr val="tx1"/>
+                  </a:solidFill>
+                  <a:tailEnd type="triangle" w="lg" len="lg"/>
+                </a:ln>
+              </p:spPr>
+              <p:style>
+                <a:lnRef idx="1">
+                  <a:schemeClr val="accent1"/>
+                </a:lnRef>
+                <a:fillRef idx="0">
+                  <a:schemeClr val="accent1"/>
+                </a:fillRef>
+                <a:effectRef idx="0">
+                  <a:schemeClr val="accent1"/>
+                </a:effectRef>
+                <a:fontRef idx="minor">
+                  <a:schemeClr val="tx1"/>
+                </a:fontRef>
+              </p:style>
+            </p:cxnSp>
+            <p:cxnSp>
+              <p:nvCxnSpPr>
+                <p:cNvPr id="29" name="Straight Arrow Connector 28">
+                  <a:extLst>
+                    <a:ext uri="{FF2B5EF4-FFF2-40B4-BE49-F238E27FC236}">
+                      <a16:creationId xmlns:a16="http://schemas.microsoft.com/office/drawing/2014/main" xmlns="" id="{CB89DCB6-D9C8-BF44-AF0D-8A829FF9C9EC}"/>
+                    </a:ext>
+                  </a:extLst>
+                </p:cNvPr>
+                <p:cNvCxnSpPr>
+                  <a:cxnSpLocks/>
+                  <a:stCxn id="33" idx="3"/>
+                </p:cNvCxnSpPr>
+                <p:nvPr/>
+              </p:nvCxnSpPr>
+              <p:spPr>
+                <a:xfrm flipV="1">
+                  <a:off x="1726977" y="3571654"/>
+                  <a:ext cx="1760899" cy="130317"/>
+                </a:xfrm>
+                <a:prstGeom prst="straightConnector1">
+                  <a:avLst/>
+                </a:prstGeom>
+                <a:ln w="19050">
+                  <a:solidFill>
+                    <a:schemeClr val="tx1"/>
+                  </a:solidFill>
+                  <a:tailEnd type="triangle" w="lg" len="lg"/>
+                </a:ln>
+              </p:spPr>
+              <p:style>
+                <a:lnRef idx="1">
+                  <a:schemeClr val="accent1"/>
+                </a:lnRef>
+                <a:fillRef idx="0">
+                  <a:schemeClr val="accent1"/>
+                </a:fillRef>
+                <a:effectRef idx="0">
+                  <a:schemeClr val="accent1"/>
+                </a:effectRef>
+                <a:fontRef idx="minor">
+                  <a:schemeClr val="tx1"/>
+                </a:fontRef>
+              </p:style>
+            </p:cxnSp>
+            <p:sp>
+              <p:nvSpPr>
+                <p:cNvPr id="30" name="TextBox 29">
+                  <a:extLst>
+                    <a:ext uri="{FF2B5EF4-FFF2-40B4-BE49-F238E27FC236}">
+                      <a16:creationId xmlns:a16="http://schemas.microsoft.com/office/drawing/2014/main" xmlns="" id="{E9AFA60E-8F2C-1E45-BBEB-604E2B535E5F}"/>
+                    </a:ext>
+                  </a:extLst>
+                </p:cNvPr>
+                <p:cNvSpPr txBox="1"/>
+                <p:nvPr/>
+              </p:nvSpPr>
+              <p:spPr>
+                <a:xfrm>
+                  <a:off x="6408886" y="4436486"/>
+                  <a:ext cx="1617513" cy="646331"/>
+                </a:xfrm>
+                <a:prstGeom prst="rect">
+                  <a:avLst/>
+                </a:prstGeom>
+                <a:noFill/>
+                <a:ln>
+                  <a:solidFill>
+                    <a:schemeClr val="tx1"/>
+                  </a:solidFill>
+                </a:ln>
+              </p:spPr>
+              <p:txBody>
+                <a:bodyPr wrap="square" rtlCol="0">
+                  <a:spAutoFit/>
+                </a:bodyPr>
+                <a:lstStyle/>
+                <a:p>
+                  <a:pPr algn="ctr"/>
+                  <a:r>
+                    <a:rPr lang="en-US" dirty="0"/>
+                    <a:t>Secondary </a:t>
+                  </a:r>
+                  <a:r>
+                    <a:rPr lang="en-US" dirty="0" smtClean="0"/>
+                    <a:t>Reflector, 10 K</a:t>
+                  </a:r>
+                  <a:endParaRPr lang="en-US" dirty="0"/>
+                </a:p>
+              </p:txBody>
+            </p:sp>
+            <p:sp>
+              <p:nvSpPr>
+                <p:cNvPr id="31" name="TextBox 30">
+                  <a:extLst>
+                    <a:ext uri="{FF2B5EF4-FFF2-40B4-BE49-F238E27FC236}">
+                      <a16:creationId xmlns:a16="http://schemas.microsoft.com/office/drawing/2014/main" xmlns="" id="{7C81964B-463F-7846-9E82-5CEB1DD032B1}"/>
+                    </a:ext>
+                  </a:extLst>
+                </p:cNvPr>
+                <p:cNvSpPr txBox="1"/>
+                <p:nvPr/>
+              </p:nvSpPr>
+              <p:spPr>
+                <a:xfrm>
+                  <a:off x="5395607" y="1473857"/>
+                  <a:ext cx="2453407" cy="369332"/>
+                </a:xfrm>
+                <a:prstGeom prst="rect">
+                  <a:avLst/>
+                </a:prstGeom>
+                <a:noFill/>
+                <a:ln>
+                  <a:solidFill>
+                    <a:schemeClr val="tx1"/>
+                  </a:solidFill>
+                </a:ln>
+              </p:spPr>
+              <p:txBody>
+                <a:bodyPr wrap="square" rtlCol="0">
+                  <a:spAutoFit/>
+                </a:bodyPr>
+                <a:lstStyle/>
+                <a:p>
+                  <a:pPr algn="ctr"/>
+                  <a:r>
+                    <a:rPr lang="en-US" dirty="0"/>
+                    <a:t>Primary </a:t>
+                  </a:r>
+                  <a:r>
+                    <a:rPr lang="en-US" dirty="0" smtClean="0"/>
+                    <a:t>Reflector, 20 K</a:t>
+                  </a:r>
+                  <a:endParaRPr lang="en-US" dirty="0"/>
+                </a:p>
+              </p:txBody>
+            </p:sp>
+            <p:sp>
+              <p:nvSpPr>
+                <p:cNvPr id="32" name="TextBox 31">
+                  <a:extLst>
+                    <a:ext uri="{FF2B5EF4-FFF2-40B4-BE49-F238E27FC236}">
+                      <a16:creationId xmlns:a16="http://schemas.microsoft.com/office/drawing/2014/main" xmlns="" id="{C8C064BC-BF2E-4D49-8022-E28B3775C626}"/>
+                    </a:ext>
+                  </a:extLst>
+                </p:cNvPr>
+                <p:cNvSpPr txBox="1"/>
+                <p:nvPr/>
+              </p:nvSpPr>
+              <p:spPr>
+                <a:xfrm>
+                  <a:off x="6328960" y="2145873"/>
+                  <a:ext cx="1557175" cy="369332"/>
+                </a:xfrm>
+                <a:prstGeom prst="rect">
+                  <a:avLst/>
+                </a:prstGeom>
+                <a:noFill/>
+                <a:ln>
+                  <a:solidFill>
+                    <a:schemeClr val="tx1"/>
+                  </a:solidFill>
+                </a:ln>
+              </p:spPr>
+              <p:txBody>
+                <a:bodyPr wrap="square" rtlCol="0">
+                  <a:spAutoFit/>
+                </a:bodyPr>
+                <a:lstStyle/>
+                <a:p>
+                  <a:pPr algn="ctr"/>
+                  <a:r>
+                    <a:rPr lang="en-US" dirty="0"/>
+                    <a:t>Shadow Cone</a:t>
+                  </a:r>
+                </a:p>
+              </p:txBody>
+            </p:sp>
+            <p:sp>
+              <p:nvSpPr>
+                <p:cNvPr id="33" name="TextBox 32">
+                  <a:extLst>
+                    <a:ext uri="{FF2B5EF4-FFF2-40B4-BE49-F238E27FC236}">
+                      <a16:creationId xmlns:a16="http://schemas.microsoft.com/office/drawing/2014/main" xmlns="" id="{E4756D17-1F3F-E64B-AB67-230A59782D9A}"/>
+                    </a:ext>
+                  </a:extLst>
+                </p:cNvPr>
+                <p:cNvSpPr txBox="1"/>
+                <p:nvPr/>
+              </p:nvSpPr>
+              <p:spPr>
+                <a:xfrm>
+                  <a:off x="278294" y="3378805"/>
+                  <a:ext cx="1448683" cy="646331"/>
+                </a:xfrm>
+                <a:prstGeom prst="rect">
+                  <a:avLst/>
+                </a:prstGeom>
+                <a:noFill/>
+                <a:ln>
+                  <a:solidFill>
+                    <a:schemeClr val="tx1"/>
+                  </a:solidFill>
+                </a:ln>
+              </p:spPr>
+              <p:txBody>
+                <a:bodyPr wrap="square" rtlCol="0">
+                  <a:spAutoFit/>
+                </a:bodyPr>
+                <a:lstStyle/>
+                <a:p>
+                  <a:pPr algn="ctr"/>
+                  <a:r>
+                    <a:rPr lang="en-US" dirty="0"/>
+                    <a:t>Focal </a:t>
+                  </a:r>
+                  <a:r>
+                    <a:rPr lang="en-US" dirty="0" smtClean="0"/>
+                    <a:t>Plane, 100 </a:t>
+                  </a:r>
+                  <a:r>
+                    <a:rPr lang="en-US" dirty="0" err="1" smtClean="0"/>
+                    <a:t>mK</a:t>
+                  </a:r>
+                  <a:endParaRPr lang="en-US" dirty="0"/>
+                </a:p>
+              </p:txBody>
+            </p:sp>
+            <p:sp>
+              <p:nvSpPr>
+                <p:cNvPr id="34" name="TextBox 33">
+                  <a:extLst>
+                    <a:ext uri="{FF2B5EF4-FFF2-40B4-BE49-F238E27FC236}">
+                      <a16:creationId xmlns:a16="http://schemas.microsoft.com/office/drawing/2014/main" xmlns="" id="{6221F280-C9B2-0646-9521-492845846219}"/>
+                    </a:ext>
+                  </a:extLst>
+                </p:cNvPr>
+                <p:cNvSpPr txBox="1"/>
+                <p:nvPr/>
+              </p:nvSpPr>
+              <p:spPr>
+                <a:xfrm>
+                  <a:off x="309955" y="2328977"/>
+                  <a:ext cx="1921528" cy="369332"/>
+                </a:xfrm>
+                <a:prstGeom prst="rect">
+                  <a:avLst/>
+                </a:prstGeom>
+                <a:noFill/>
+                <a:ln>
+                  <a:solidFill>
+                    <a:schemeClr val="tx1"/>
+                  </a:solidFill>
+                </a:ln>
+              </p:spPr>
+              <p:txBody>
+                <a:bodyPr wrap="square" rtlCol="0">
+                  <a:spAutoFit/>
+                </a:bodyPr>
+                <a:lstStyle/>
+                <a:p>
+                  <a:pPr algn="ctr"/>
+                  <a:r>
+                    <a:rPr lang="en-US" dirty="0"/>
+                    <a:t>Aperture </a:t>
+                  </a:r>
+                  <a:r>
+                    <a:rPr lang="en-US" dirty="0" smtClean="0"/>
+                    <a:t>Stop, 6 K</a:t>
+                  </a:r>
+                  <a:endParaRPr lang="en-US" dirty="0"/>
+                </a:p>
+              </p:txBody>
+            </p:sp>
+            <p:cxnSp>
+              <p:nvCxnSpPr>
+                <p:cNvPr id="36" name="Straight Arrow Connector 35">
+                  <a:extLst>
+                    <a:ext uri="{FF2B5EF4-FFF2-40B4-BE49-F238E27FC236}">
+                      <a16:creationId xmlns:a16="http://schemas.microsoft.com/office/drawing/2014/main" xmlns="" id="{CB89DCB6-D9C8-BF44-AF0D-8A829FF9C9EC}"/>
+                    </a:ext>
+                  </a:extLst>
+                </p:cNvPr>
+                <p:cNvCxnSpPr>
+                  <a:cxnSpLocks/>
+                  <a:stCxn id="37" idx="3"/>
+                </p:cNvCxnSpPr>
+                <p:nvPr/>
+              </p:nvCxnSpPr>
+              <p:spPr>
+                <a:xfrm flipV="1">
+                  <a:off x="2029899" y="4553339"/>
+                  <a:ext cx="1385105" cy="346089"/>
+                </a:xfrm>
+                <a:prstGeom prst="straightConnector1">
+                  <a:avLst/>
+                </a:prstGeom>
+                <a:ln w="19050">
+                  <a:solidFill>
+                    <a:schemeClr val="tx1"/>
+                  </a:solidFill>
+                  <a:tailEnd type="triangle" w="lg" len="lg"/>
+                </a:ln>
+              </p:spPr>
+              <p:style>
+                <a:lnRef idx="1">
+                  <a:schemeClr val="accent1"/>
+                </a:lnRef>
+                <a:fillRef idx="0">
+                  <a:schemeClr val="accent1"/>
+                </a:fillRef>
+                <a:effectRef idx="0">
+                  <a:schemeClr val="accent1"/>
+                </a:effectRef>
+                <a:fontRef idx="minor">
+                  <a:schemeClr val="tx1"/>
+                </a:fontRef>
+              </p:style>
+            </p:cxnSp>
+            <p:sp>
+              <p:nvSpPr>
+                <p:cNvPr id="37" name="TextBox 36">
+                  <a:extLst>
+                    <a:ext uri="{FF2B5EF4-FFF2-40B4-BE49-F238E27FC236}">
+                      <a16:creationId xmlns:a16="http://schemas.microsoft.com/office/drawing/2014/main" xmlns="" id="{E4756D17-1F3F-E64B-AB67-230A59782D9A}"/>
+                    </a:ext>
+                  </a:extLst>
+                </p:cNvPr>
+                <p:cNvSpPr txBox="1"/>
+                <p:nvPr/>
+              </p:nvSpPr>
+              <p:spPr>
+                <a:xfrm>
+                  <a:off x="461704" y="4714762"/>
+                  <a:ext cx="1568195" cy="369332"/>
+                </a:xfrm>
+                <a:prstGeom prst="rect">
+                  <a:avLst/>
+                </a:prstGeom>
+                <a:noFill/>
+                <a:ln>
+                  <a:solidFill>
+                    <a:schemeClr val="tx1"/>
+                  </a:solidFill>
+                </a:ln>
+              </p:spPr>
+              <p:txBody>
+                <a:bodyPr wrap="square" rtlCol="0">
+                  <a:spAutoFit/>
+                </a:bodyPr>
+                <a:lstStyle/>
+                <a:p>
+                  <a:pPr algn="ctr"/>
+                  <a:r>
+                    <a:rPr lang="en-US" dirty="0" smtClean="0"/>
+                    <a:t>Optics Box, 6 K</a:t>
+                  </a:r>
+                  <a:endParaRPr lang="en-US" dirty="0"/>
+                </a:p>
+              </p:txBody>
+            </p:sp>
+            <p:cxnSp>
+              <p:nvCxnSpPr>
+                <p:cNvPr id="17" name="Straight Arrow Connector 16">
+                  <a:extLst>
+                    <a:ext uri="{FF2B5EF4-FFF2-40B4-BE49-F238E27FC236}">
+                      <a16:creationId xmlns:a16="http://schemas.microsoft.com/office/drawing/2014/main" xmlns="" id="{5E5BCC3D-0641-9940-9C9F-B07FE0D1B902}"/>
+                    </a:ext>
+                  </a:extLst>
+                </p:cNvPr>
+                <p:cNvCxnSpPr>
+                  <a:cxnSpLocks/>
+                  <a:stCxn id="18" idx="1"/>
+                </p:cNvCxnSpPr>
+                <p:nvPr/>
+              </p:nvCxnSpPr>
+              <p:spPr>
+                <a:xfrm flipH="1">
+                  <a:off x="5952931" y="3484702"/>
+                  <a:ext cx="727786" cy="676751"/>
+                </a:xfrm>
+                <a:prstGeom prst="straightConnector1">
+                  <a:avLst/>
+                </a:prstGeom>
+                <a:ln w="19050">
+                  <a:solidFill>
+                    <a:schemeClr val="tx1"/>
+                  </a:solidFill>
+                  <a:tailEnd type="triangle" w="lg" len="lg"/>
+                </a:ln>
+              </p:spPr>
+              <p:style>
+                <a:lnRef idx="1">
+                  <a:schemeClr val="accent1"/>
+                </a:lnRef>
+                <a:fillRef idx="0">
+                  <a:schemeClr val="accent1"/>
+                </a:fillRef>
+                <a:effectRef idx="0">
+                  <a:schemeClr val="accent1"/>
+                </a:effectRef>
+                <a:fontRef idx="minor">
+                  <a:schemeClr val="tx1"/>
+                </a:fontRef>
+              </p:style>
+            </p:cxnSp>
+            <p:sp>
+              <p:nvSpPr>
+                <p:cNvPr id="18" name="TextBox 17">
+                  <a:extLst>
+                    <a:ext uri="{FF2B5EF4-FFF2-40B4-BE49-F238E27FC236}">
+                      <a16:creationId xmlns:a16="http://schemas.microsoft.com/office/drawing/2014/main" xmlns="" id="{E9AFA60E-8F2C-1E45-BBEB-604E2B535E5F}"/>
+                    </a:ext>
+                  </a:extLst>
+                </p:cNvPr>
+                <p:cNvSpPr txBox="1"/>
+                <p:nvPr/>
+              </p:nvSpPr>
+              <p:spPr>
+                <a:xfrm>
+                  <a:off x="6680717" y="3161536"/>
+                  <a:ext cx="1168297" cy="646331"/>
+                </a:xfrm>
+                <a:prstGeom prst="rect">
+                  <a:avLst/>
+                </a:prstGeom>
+                <a:noFill/>
+                <a:ln>
+                  <a:solidFill>
+                    <a:schemeClr val="tx1"/>
+                  </a:solidFill>
+                </a:ln>
+              </p:spPr>
+              <p:txBody>
+                <a:bodyPr wrap="square" rtlCol="0">
+                  <a:spAutoFit/>
+                </a:bodyPr>
+                <a:lstStyle/>
+                <a:p>
+                  <a:pPr algn="ctr"/>
+                  <a:r>
+                    <a:rPr lang="en-US" dirty="0" smtClean="0"/>
+                    <a:t>V-Groove Shields</a:t>
+                  </a:r>
+                  <a:endParaRPr lang="en-US" dirty="0"/>
+                </a:p>
+              </p:txBody>
+            </p:sp>
+          </p:grpSp>
+          <p:sp>
+            <p:nvSpPr>
+              <p:cNvPr id="2" name="TextBox 1"/>
+              <p:cNvSpPr txBox="1"/>
+              <p:nvPr/>
+            </p:nvSpPr>
+            <p:spPr>
+              <a:xfrm>
+                <a:off x="6716872" y="5470742"/>
+                <a:ext cx="1101969" cy="369332"/>
+              </a:xfrm>
+              <a:prstGeom prst="rect">
+                <a:avLst/>
+              </a:prstGeom>
+              <a:noFill/>
+              <a:ln>
+                <a:noFill/>
+              </a:ln>
+            </p:spPr>
+            <p:txBody>
+              <a:bodyPr wrap="square" rtlCol="0">
+                <a:spAutoFit/>
+              </a:bodyPr>
+              <a:lstStyle/>
+              <a:p>
+                <a:pPr algn="ctr"/>
+                <a:r>
+                  <a:rPr lang="en-US" b="1" dirty="0" smtClean="0">
+                    <a:solidFill>
+                      <a:srgbClr val="FFC000"/>
+                    </a:solidFill>
+                  </a:rPr>
+                  <a:t>Sun</a:t>
+                </a:r>
+                <a:endParaRPr lang="en-US" b="1" dirty="0">
+                  <a:solidFill>
+                    <a:srgbClr val="FFC000"/>
+                  </a:solidFill>
+                </a:endParaRPr>
+              </a:p>
+            </p:txBody>
+          </p:sp>
+        </p:grpSp>
+        <p:cxnSp>
+          <p:nvCxnSpPr>
+            <p:cNvPr id="23" name="Straight Arrow Connector 22">
+              <a:extLst>
+                <a:ext uri="{FF2B5EF4-FFF2-40B4-BE49-F238E27FC236}">
+                  <a16:creationId xmlns:a16="http://schemas.microsoft.com/office/drawing/2014/main" xmlns="" id="{5FB60EE6-D5F0-CF4E-90B2-7E7F694AF255}"/>
+                </a:ext>
+              </a:extLst>
+            </p:cNvPr>
+            <p:cNvCxnSpPr>
+              <a:cxnSpLocks/>
+              <a:stCxn id="35" idx="1"/>
+            </p:cNvCxnSpPr>
+            <p:nvPr/>
+          </p:nvCxnSpPr>
+          <p:spPr>
+            <a:xfrm flipH="1">
+              <a:off x="4188376" y="108466"/>
+              <a:ext cx="1057962" cy="259834"/>
+            </a:xfrm>
+            <a:prstGeom prst="straightConnector1">
+              <a:avLst/>
+            </a:prstGeom>
+            <a:ln w="19050">
+              <a:solidFill>
+                <a:schemeClr val="tx1"/>
+              </a:solidFill>
+              <a:tailEnd type="triangle" w="lg" len="lg"/>
+            </a:ln>
+          </p:spPr>
+          <p:style>
+            <a:lnRef idx="1">
+              <a:schemeClr val="accent1"/>
+            </a:lnRef>
+            <a:fillRef idx="0">
+              <a:schemeClr val="accent1"/>
+            </a:fillRef>
+            <a:effectRef idx="0">
+              <a:schemeClr val="accent1"/>
+            </a:effectRef>
+            <a:fontRef idx="minor">
+              <a:schemeClr val="tx1"/>
+            </a:fontRef>
+          </p:style>
+        </p:cxnSp>
         <p:sp>
           <p:nvSpPr>
-            <p:cNvPr id="2" name="TextBox 1"/>
+            <p:cNvPr id="35" name="TextBox 34">
+              <a:extLst>
+                <a:ext uri="{FF2B5EF4-FFF2-40B4-BE49-F238E27FC236}">
+                  <a16:creationId xmlns:a16="http://schemas.microsoft.com/office/drawing/2014/main" xmlns="" id="{C8C064BC-BF2E-4D49-8022-E28B3775C626}"/>
+                </a:ext>
+              </a:extLst>
+            </p:cNvPr>
             <p:cNvSpPr txBox="1"/>
             <p:nvPr/>
           </p:nvSpPr>
           <p:spPr>
             <a:xfrm>
-              <a:off x="6716872" y="5470742"/>
-              <a:ext cx="1101969" cy="369332"/>
+              <a:off x="5246338" y="-76200"/>
+              <a:ext cx="1063572" cy="369332"/>
+            </a:xfrm>
+            <a:prstGeom prst="rect">
+              <a:avLst/>
+            </a:prstGeom>
+            <a:noFill/>
+            <a:ln>
+              <a:solidFill>
+                <a:schemeClr val="tx1"/>
+              </a:solidFill>
+            </a:ln>
+          </p:spPr>
+          <p:txBody>
+            <a:bodyPr wrap="square" rtlCol="0">
+              <a:spAutoFit/>
+            </a:bodyPr>
+            <a:lstStyle/>
+            <a:p>
+              <a:pPr algn="ctr"/>
+              <a:r>
+                <a:rPr lang="en-US" dirty="0" smtClean="0"/>
+                <a:t>Spin Axis</a:t>
+              </a:r>
+              <a:endParaRPr lang="en-US" dirty="0"/>
+            </a:p>
+          </p:txBody>
+        </p:sp>
+        <p:sp>
+          <p:nvSpPr>
+            <p:cNvPr id="38" name="TextBox 37">
+              <a:extLst>
+                <a:ext uri="{FF2B5EF4-FFF2-40B4-BE49-F238E27FC236}">
+                  <a16:creationId xmlns:a16="http://schemas.microsoft.com/office/drawing/2014/main" xmlns="" id="{C8C064BC-BF2E-4D49-8022-E28B3775C626}"/>
+                </a:ext>
+              </a:extLst>
+            </p:cNvPr>
+            <p:cNvSpPr txBox="1"/>
+            <p:nvPr/>
+          </p:nvSpPr>
+          <p:spPr>
+            <a:xfrm>
+              <a:off x="521721" y="1148909"/>
+              <a:ext cx="1063572" cy="369332"/>
+            </a:xfrm>
+            <a:prstGeom prst="rect">
+              <a:avLst/>
+            </a:prstGeom>
+            <a:noFill/>
+            <a:ln>
+              <a:solidFill>
+                <a:schemeClr val="tx1"/>
+              </a:solidFill>
+            </a:ln>
+          </p:spPr>
+          <p:txBody>
+            <a:bodyPr wrap="square" rtlCol="0">
+              <a:spAutoFit/>
+            </a:bodyPr>
+            <a:lstStyle/>
+            <a:p>
+              <a:pPr algn="ctr"/>
+              <a:r>
+                <a:rPr lang="en-US" dirty="0" err="1" smtClean="0"/>
+                <a:t>Boresight</a:t>
+              </a:r>
+              <a:endParaRPr lang="en-US" dirty="0"/>
+            </a:p>
+          </p:txBody>
+        </p:sp>
+        <p:cxnSp>
+          <p:nvCxnSpPr>
+            <p:cNvPr id="11" name="Straight Connector 10"/>
+            <p:cNvCxnSpPr/>
+            <p:nvPr/>
+          </p:nvCxnSpPr>
+          <p:spPr>
+            <a:xfrm rot="20640000" flipH="1" flipV="1">
+              <a:off x="1739243" y="1130372"/>
+              <a:ext cx="1994557" cy="1508175"/>
+            </a:xfrm>
+            <a:prstGeom prst="line">
+              <a:avLst/>
+            </a:prstGeom>
+            <a:ln w="19050">
+              <a:solidFill>
+                <a:srgbClr val="C00000"/>
+              </a:solidFill>
+              <a:prstDash val="dash"/>
+            </a:ln>
+          </p:spPr>
+          <p:style>
+            <a:lnRef idx="1">
+              <a:schemeClr val="accent1"/>
+            </a:lnRef>
+            <a:fillRef idx="0">
+              <a:schemeClr val="accent1"/>
+            </a:fillRef>
+            <a:effectRef idx="0">
+              <a:schemeClr val="accent1"/>
+            </a:effectRef>
+            <a:fontRef idx="minor">
+              <a:schemeClr val="tx1"/>
+            </a:fontRef>
+          </p:style>
+        </p:cxnSp>
+        <p:sp>
+          <p:nvSpPr>
+            <p:cNvPr id="39" name="TextBox 38">
+              <a:extLst>
+                <a:ext uri="{FF2B5EF4-FFF2-40B4-BE49-F238E27FC236}">
+                  <a16:creationId xmlns:a16="http://schemas.microsoft.com/office/drawing/2014/main" xmlns="" id="{316E6191-DDC2-5047-A3F1-2CE068D8ED21}"/>
+                </a:ext>
+              </a:extLst>
+            </p:cNvPr>
+            <p:cNvSpPr txBox="1"/>
+            <p:nvPr/>
+          </p:nvSpPr>
+          <p:spPr>
+            <a:xfrm>
+              <a:off x="4605089" y="652061"/>
+              <a:ext cx="538412" cy="369332"/>
             </a:xfrm>
             <a:prstGeom prst="rect">
               <a:avLst/>
@@ -5632,272 +5862,185 @@
             <a:p>
               <a:pPr algn="ctr"/>
               <a:r>
-                <a:rPr lang="en-US" b="1" dirty="0" smtClean="0">
+                <a:rPr lang="en-US" dirty="0" smtClean="0"/>
+                <a:t>26</a:t>
+              </a:r>
+              <a:r>
+                <a:rPr lang="en-US" dirty="0" smtClean="0"/>
+                <a:t>° </a:t>
+              </a:r>
+              <a:endParaRPr lang="en-US" dirty="0"/>
+            </a:p>
+          </p:txBody>
+        </p:sp>
+        <p:sp>
+          <p:nvSpPr>
+            <p:cNvPr id="40" name="Arc 39"/>
+            <p:cNvSpPr/>
+            <p:nvPr/>
+          </p:nvSpPr>
+          <p:spPr>
+            <a:xfrm>
+              <a:off x="2444750" y="622299"/>
+              <a:ext cx="3790950" cy="3217317"/>
+            </a:xfrm>
+            <a:prstGeom prst="arc">
+              <a:avLst>
+                <a:gd name="adj1" fmla="val 11578188"/>
+                <a:gd name="adj2" fmla="val 15893574"/>
+              </a:avLst>
+            </a:prstGeom>
+            <a:ln>
+              <a:solidFill>
+                <a:schemeClr val="tx1">
+                  <a:lumMod val="75000"/>
+                  <a:lumOff val="25000"/>
+                </a:schemeClr>
+              </a:solidFill>
+              <a:headEnd type="triangle"/>
+              <a:tailEnd type="triangle"/>
+            </a:ln>
+          </p:spPr>
+          <p:style>
+            <a:lnRef idx="2">
+              <a:schemeClr val="accent1"/>
+            </a:lnRef>
+            <a:fillRef idx="0">
+              <a:schemeClr val="accent1"/>
+            </a:fillRef>
+            <a:effectRef idx="1">
+              <a:schemeClr val="accent1"/>
+            </a:effectRef>
+            <a:fontRef idx="minor">
+              <a:schemeClr val="tx1"/>
+            </a:fontRef>
+          </p:style>
+          <p:txBody>
+            <a:bodyPr rtlCol="0" anchor="ctr"/>
+            <a:lstStyle/>
+            <a:p>
+              <a:pPr algn="ctr"/>
+              <a:endParaRPr lang="en-US" dirty="0">
+                <a:ln>
                   <a:solidFill>
-                    <a:srgbClr val="FFC000"/>
+                    <a:schemeClr val="tx1"/>
+                  </a:solidFill>
+                </a:ln>
+              </a:endParaRPr>
+            </a:p>
+          </p:txBody>
+        </p:sp>
+        <p:sp>
+          <p:nvSpPr>
+            <p:cNvPr id="22" name="TextBox 21">
+              <a:extLst>
+                <a:ext uri="{FF2B5EF4-FFF2-40B4-BE49-F238E27FC236}">
+                  <a16:creationId xmlns:a16="http://schemas.microsoft.com/office/drawing/2014/main" xmlns="" id="{316E6191-DDC2-5047-A3F1-2CE068D8ED21}"/>
+                </a:ext>
+              </a:extLst>
+            </p:cNvPr>
+            <p:cNvSpPr txBox="1"/>
+            <p:nvPr/>
+          </p:nvSpPr>
+          <p:spPr>
+            <a:xfrm>
+              <a:off x="2849797" y="893877"/>
+              <a:ext cx="534753" cy="369332"/>
+            </a:xfrm>
+            <a:prstGeom prst="rect">
+              <a:avLst/>
+            </a:prstGeom>
+            <a:solidFill>
+              <a:schemeClr val="bg1"/>
+            </a:solidFill>
+            <a:ln>
+              <a:noFill/>
+            </a:ln>
+          </p:spPr>
+          <p:txBody>
+            <a:bodyPr wrap="square" rtlCol="0">
+              <a:spAutoFit/>
+            </a:bodyPr>
+            <a:lstStyle/>
+            <a:p>
+              <a:pPr algn="ctr"/>
+              <a:r>
+                <a:rPr lang="en-US" dirty="0" smtClean="0">
+                  <a:solidFill>
+                    <a:srgbClr val="000000"/>
                   </a:solidFill>
                 </a:rPr>
-                <a:t>Sun</a:t>
+                <a:t>69</a:t>
               </a:r>
-              <a:endParaRPr lang="en-US" b="1" dirty="0">
-                <a:solidFill>
-                  <a:srgbClr val="FFC000"/>
-                </a:solidFill>
+              <a:r>
+                <a:rPr lang="en-US" dirty="0">
+                  <a:solidFill>
+                    <a:srgbClr val="000000"/>
+                  </a:solidFill>
+                </a:rPr>
+                <a:t>°</a:t>
+              </a:r>
+            </a:p>
+          </p:txBody>
+        </p:sp>
+        <p:sp>
+          <p:nvSpPr>
+            <p:cNvPr id="41" name="Arc 40"/>
+            <p:cNvSpPr/>
+            <p:nvPr/>
+          </p:nvSpPr>
+          <p:spPr>
+            <a:xfrm rot="10800000">
+              <a:off x="2320731" y="-2075792"/>
+              <a:ext cx="3418660" cy="3023471"/>
+            </a:xfrm>
+            <a:prstGeom prst="arc">
+              <a:avLst>
+                <a:gd name="adj1" fmla="val 14825045"/>
+                <a:gd name="adj2" fmla="val 15853664"/>
+              </a:avLst>
+            </a:prstGeom>
+            <a:ln>
+              <a:solidFill>
+                <a:schemeClr val="tx1">
+                  <a:lumMod val="75000"/>
+                  <a:lumOff val="25000"/>
+                </a:schemeClr>
+              </a:solidFill>
+              <a:headEnd type="triangle"/>
+              <a:tailEnd type="triangle"/>
+            </a:ln>
+          </p:spPr>
+          <p:style>
+            <a:lnRef idx="2">
+              <a:schemeClr val="accent1"/>
+            </a:lnRef>
+            <a:fillRef idx="0">
+              <a:schemeClr val="accent1"/>
+            </a:fillRef>
+            <a:effectRef idx="1">
+              <a:schemeClr val="accent1"/>
+            </a:effectRef>
+            <a:fontRef idx="minor">
+              <a:schemeClr val="tx1"/>
+            </a:fontRef>
+          </p:style>
+          <p:txBody>
+            <a:bodyPr rtlCol="0" anchor="ctr"/>
+            <a:lstStyle/>
+            <a:p>
+              <a:pPr algn="ctr"/>
+              <a:endParaRPr lang="en-US" dirty="0">
+                <a:ln>
+                  <a:solidFill>
+                    <a:schemeClr val="tx1"/>
+                  </a:solidFill>
+                </a:ln>
               </a:endParaRPr>
             </a:p>
           </p:txBody>
         </p:sp>
       </p:grpSp>
-      <p:sp>
-        <p:nvSpPr>
-          <p:cNvPr id="22" name="TextBox 21">
-            <a:extLst>
-              <a:ext uri="{FF2B5EF4-FFF2-40B4-BE49-F238E27FC236}">
-                <a16:creationId xmlns="" xmlns:a16="http://schemas.microsoft.com/office/drawing/2014/main" id="{316E6191-DDC2-5047-A3F1-2CE068D8ED21}"/>
-              </a:ext>
-            </a:extLst>
-          </p:cNvPr>
-          <p:cNvSpPr txBox="1"/>
-          <p:nvPr/>
-        </p:nvSpPr>
-        <p:spPr>
-          <a:xfrm>
-            <a:off x="2567222" y="927766"/>
-            <a:ext cx="758729" cy="369332"/>
-          </a:xfrm>
-          <a:prstGeom prst="rect">
-            <a:avLst/>
-          </a:prstGeom>
-          <a:solidFill>
-            <a:schemeClr val="bg1"/>
-          </a:solidFill>
-          <a:ln>
-            <a:noFill/>
-          </a:ln>
-        </p:spPr>
-        <p:txBody>
-          <a:bodyPr wrap="square" rtlCol="0">
-            <a:spAutoFit/>
-          </a:bodyPr>
-          <a:lstStyle/>
-          <a:p>
-            <a:pPr algn="ctr"/>
-            <a:r>
-              <a:rPr lang="en-US" dirty="0" smtClean="0"/>
-              <a:t>69</a:t>
-            </a:r>
-            <a:r>
-              <a:rPr lang="en-US" dirty="0"/>
-              <a:t>°</a:t>
-            </a:r>
-          </a:p>
-        </p:txBody>
-      </p:sp>
-      <p:cxnSp>
-        <p:nvCxnSpPr>
-          <p:cNvPr id="23" name="Straight Arrow Connector 22">
-            <a:extLst>
-              <a:ext uri="{FF2B5EF4-FFF2-40B4-BE49-F238E27FC236}">
-                <a16:creationId xmlns="" xmlns:a16="http://schemas.microsoft.com/office/drawing/2014/main" id="{5FB60EE6-D5F0-CF4E-90B2-7E7F694AF255}"/>
-              </a:ext>
-            </a:extLst>
-          </p:cNvPr>
-          <p:cNvCxnSpPr>
-            <a:cxnSpLocks/>
-            <a:stCxn id="35" idx="1"/>
-          </p:cNvCxnSpPr>
-          <p:nvPr/>
-        </p:nvCxnSpPr>
-        <p:spPr>
-          <a:xfrm flipH="1">
-            <a:off x="4172355" y="253124"/>
-            <a:ext cx="1057962" cy="420048"/>
-          </a:xfrm>
-          <a:prstGeom prst="straightConnector1">
-            <a:avLst/>
-          </a:prstGeom>
-          <a:ln w="19050">
-            <a:solidFill>
-              <a:schemeClr val="tx1"/>
-            </a:solidFill>
-            <a:tailEnd type="triangle" w="lg" len="lg"/>
-          </a:ln>
-        </p:spPr>
-        <p:style>
-          <a:lnRef idx="1">
-            <a:schemeClr val="accent1"/>
-          </a:lnRef>
-          <a:fillRef idx="0">
-            <a:schemeClr val="accent1"/>
-          </a:fillRef>
-          <a:effectRef idx="0">
-            <a:schemeClr val="accent1"/>
-          </a:effectRef>
-          <a:fontRef idx="minor">
-            <a:schemeClr val="tx1"/>
-          </a:fontRef>
-        </p:style>
-      </p:cxnSp>
-      <p:sp>
-        <p:nvSpPr>
-          <p:cNvPr id="35" name="TextBox 34">
-            <a:extLst>
-              <a:ext uri="{FF2B5EF4-FFF2-40B4-BE49-F238E27FC236}">
-                <a16:creationId xmlns="" xmlns:a16="http://schemas.microsoft.com/office/drawing/2014/main" id="{C8C064BC-BF2E-4D49-8022-E28B3775C626}"/>
-              </a:ext>
-            </a:extLst>
-          </p:cNvPr>
-          <p:cNvSpPr txBox="1"/>
-          <p:nvPr/>
-        </p:nvSpPr>
-        <p:spPr>
-          <a:xfrm>
-            <a:off x="5230317" y="68458"/>
-            <a:ext cx="1063572" cy="369332"/>
-          </a:xfrm>
-          <a:prstGeom prst="rect">
-            <a:avLst/>
-          </a:prstGeom>
-          <a:noFill/>
-          <a:ln>
-            <a:solidFill>
-              <a:schemeClr val="tx1"/>
-            </a:solidFill>
-          </a:ln>
-        </p:spPr>
-        <p:txBody>
-          <a:bodyPr wrap="square" rtlCol="0">
-            <a:spAutoFit/>
-          </a:bodyPr>
-          <a:lstStyle/>
-          <a:p>
-            <a:pPr algn="ctr"/>
-            <a:r>
-              <a:rPr lang="en-US" dirty="0" smtClean="0"/>
-              <a:t>Spin Axis</a:t>
-            </a:r>
-            <a:endParaRPr lang="en-US" dirty="0"/>
-          </a:p>
-        </p:txBody>
-      </p:sp>
-      <p:sp>
-        <p:nvSpPr>
-          <p:cNvPr id="38" name="TextBox 37">
-            <a:extLst>
-              <a:ext uri="{FF2B5EF4-FFF2-40B4-BE49-F238E27FC236}">
-                <a16:creationId xmlns="" xmlns:a16="http://schemas.microsoft.com/office/drawing/2014/main" id="{C8C064BC-BF2E-4D49-8022-E28B3775C626}"/>
-              </a:ext>
-            </a:extLst>
-          </p:cNvPr>
-          <p:cNvSpPr txBox="1"/>
-          <p:nvPr/>
-        </p:nvSpPr>
-        <p:spPr>
-          <a:xfrm>
-            <a:off x="521721" y="1148909"/>
-            <a:ext cx="1063572" cy="369332"/>
-          </a:xfrm>
-          <a:prstGeom prst="rect">
-            <a:avLst/>
-          </a:prstGeom>
-          <a:noFill/>
-          <a:ln>
-            <a:solidFill>
-              <a:schemeClr val="tx1"/>
-            </a:solidFill>
-          </a:ln>
-        </p:spPr>
-        <p:txBody>
-          <a:bodyPr wrap="square" rtlCol="0">
-            <a:spAutoFit/>
-          </a:bodyPr>
-          <a:lstStyle/>
-          <a:p>
-            <a:pPr algn="ctr"/>
-            <a:r>
-              <a:rPr lang="en-US" dirty="0" err="1" smtClean="0"/>
-              <a:t>Boresight</a:t>
-            </a:r>
-            <a:endParaRPr lang="en-US" dirty="0"/>
-          </a:p>
-        </p:txBody>
-      </p:sp>
-      <p:cxnSp>
-        <p:nvCxnSpPr>
-          <p:cNvPr id="11" name="Straight Connector 10"/>
-          <p:cNvCxnSpPr/>
-          <p:nvPr/>
-        </p:nvCxnSpPr>
-        <p:spPr>
-          <a:xfrm rot="20640000" flipH="1" flipV="1">
-            <a:off x="1739243" y="1130372"/>
-            <a:ext cx="1994557" cy="1508175"/>
-          </a:xfrm>
-          <a:prstGeom prst="line">
-            <a:avLst/>
-          </a:prstGeom>
-          <a:ln w="19050">
-            <a:solidFill>
-              <a:srgbClr val="C00000"/>
-            </a:solidFill>
-            <a:prstDash val="dash"/>
-          </a:ln>
-        </p:spPr>
-        <p:style>
-          <a:lnRef idx="1">
-            <a:schemeClr val="accent1"/>
-          </a:lnRef>
-          <a:fillRef idx="0">
-            <a:schemeClr val="accent1"/>
-          </a:fillRef>
-          <a:effectRef idx="0">
-            <a:schemeClr val="accent1"/>
-          </a:effectRef>
-          <a:fontRef idx="minor">
-            <a:schemeClr val="tx1"/>
-          </a:fontRef>
-        </p:style>
-      </p:cxnSp>
-      <p:sp>
-        <p:nvSpPr>
-          <p:cNvPr id="39" name="TextBox 38">
-            <a:extLst>
-              <a:ext uri="{FF2B5EF4-FFF2-40B4-BE49-F238E27FC236}">
-                <a16:creationId xmlns="" xmlns:a16="http://schemas.microsoft.com/office/drawing/2014/main" id="{316E6191-DDC2-5047-A3F1-2CE068D8ED21}"/>
-              </a:ext>
-            </a:extLst>
-          </p:cNvPr>
-          <p:cNvSpPr txBox="1"/>
-          <p:nvPr/>
-        </p:nvSpPr>
-        <p:spPr>
-          <a:xfrm>
-            <a:off x="3639975" y="994441"/>
-            <a:ext cx="518223" cy="369332"/>
-          </a:xfrm>
-          <a:prstGeom prst="rect">
-            <a:avLst/>
-          </a:prstGeom>
-          <a:noFill/>
-          <a:ln>
-            <a:noFill/>
-          </a:ln>
-        </p:spPr>
-        <p:txBody>
-          <a:bodyPr wrap="square" rtlCol="0">
-            <a:spAutoFit/>
-          </a:bodyPr>
-          <a:lstStyle/>
-          <a:p>
-            <a:pPr algn="ctr"/>
-            <a:r>
-              <a:rPr lang="en-US" dirty="0" smtClean="0"/>
-              <a:t>26°</a:t>
-            </a:r>
-            <a:endParaRPr lang="en-US" dirty="0"/>
-          </a:p>
-        </p:txBody>
-      </p:sp>
     </p:spTree>
     <p:extLst>
       <p:ext uri="{BB962C8B-B14F-4D97-AF65-F5344CB8AC3E}">
@@ -5908,6 +6051,13 @@
   <p:clrMapOvr>
     <a:masterClrMapping/>
   </p:clrMapOvr>
+  <p:timing>
+    <p:tnLst>
+      <p:par>
+        <p:cTn xmlns:p14="http://schemas.microsoft.com/office/powerpoint/2010/main" id="1" dur="indefinite" restart="never" nodeType="tmRoot"/>
+      </p:par>
+    </p:tnLst>
+  </p:timing>
 </p:sld>
 </file>
 
@@ -5991,7 +6141,7 @@
           <p:cNvPr id="5" name="TextBox 4">
             <a:extLst>
               <a:ext uri="{FF2B5EF4-FFF2-40B4-BE49-F238E27FC236}">
-                <a16:creationId xmlns="" xmlns:a16="http://schemas.microsoft.com/office/drawing/2014/main" id="{59926AD0-851B-CB41-A4FC-69794C44B8BD}"/>
+                <a16:creationId xmlns:a16="http://schemas.microsoft.com/office/drawing/2014/main" xmlns="" id="{59926AD0-851B-CB41-A4FC-69794C44B8BD}"/>
               </a:ext>
             </a:extLst>
           </p:cNvPr>
@@ -6229,7 +6379,7 @@
     </a:clrScheme>
     <a:fontScheme name="Office">
       <a:majorFont>
-        <a:latin typeface="Calibri Light" panose="020F0302020204030204"/>
+        <a:latin typeface="Calibri Light"/>
         <a:ea typeface=""/>
         <a:cs typeface=""/>
         <a:font script="Jpan" typeface="游ゴシック Light"/>
@@ -6281,7 +6431,7 @@
         <a:font script="Tfng" typeface="Ebrima"/>
       </a:majorFont>
       <a:minorFont>
-        <a:latin typeface="Calibri" panose="020F0502020204030204"/>
+        <a:latin typeface="Calibri"/>
         <a:ea typeface=""/>
         <a:cs typeface=""/>
         <a:font script="Jpan" typeface="游ゴシック"/>
@@ -6475,7 +6625,7 @@
   <a:extraClrSchemeLst/>
   <a:extLst>
     <a:ext uri="{05A4C25C-085E-4340-85A3-A5531E510DB2}">
-      <thm15:themeFamily xmlns="" xmlns:thm15="http://schemas.microsoft.com/office/thememl/2012/main" name="Office Theme" id="{62F939B6-93AF-4DB8-9C6B-D6C7DFDC589F}" vid="{4A3C46E8-61CC-4603-A589-7422A47A8E4A}"/>
+      <thm15:themeFamily xmlns:thm15="http://schemas.microsoft.com/office/thememl/2012/main" xmlns="" name="Office Theme" id="{62F939B6-93AF-4DB8-9C6B-D6C7DFDC589F}" vid="{4A3C46E8-61CC-4603-A589-7422A47A8E4A}"/>
     </a:ext>
   </a:extLst>
 </a:theme>
@@ -6524,7 +6674,7 @@
     </a:clrScheme>
     <a:fontScheme name="Office">
       <a:majorFont>
-        <a:latin typeface="Calibri Light" panose="020F0302020204030204"/>
+        <a:latin typeface="Calibri Light"/>
         <a:ea typeface=""/>
         <a:cs typeface=""/>
         <a:font script="Jpan" typeface="游ゴシック Light"/>
@@ -6576,7 +6726,7 @@
         <a:font script="Tfng" typeface="Ebrima"/>
       </a:majorFont>
       <a:minorFont>
-        <a:latin typeface="Calibri" panose="020F0502020204030204"/>
+        <a:latin typeface="Calibri"/>
         <a:ea typeface=""/>
         <a:cs typeface=""/>
         <a:font script="Jpan" typeface="游ゴシック"/>
@@ -6770,7 +6920,7 @@
   <a:extraClrSchemeLst/>
   <a:extLst>
     <a:ext uri="{05A4C25C-085E-4340-85A3-A5531E510DB2}">
-      <thm15:themeFamily xmlns="" xmlns:thm15="http://schemas.microsoft.com/office/thememl/2012/main" name="Office Theme" id="{62F939B6-93AF-4DB8-9C6B-D6C7DFDC589F}" vid="{4A3C46E8-61CC-4603-A589-7422A47A8E4A}"/>
+      <thm15:themeFamily xmlns:thm15="http://schemas.microsoft.com/office/thememl/2012/main" xmlns="" name="Office Theme" id="{62F939B6-93AF-4DB8-9C6B-D6C7DFDC589F}" vid="{4A3C46E8-61CC-4603-A589-7422A47A8E4A}"/>
     </a:ext>
   </a:extLst>
 </a:theme>

</xml_diff>